<commit_message>
Se agrega un script unificiado y los scripts por separado
</commit_message>
<xml_diff>
--- a/EcommerceVideojuegos+HubertFerrer.pptx
+++ b/EcommerceVideojuegos+HubertFerrer.pptx
@@ -5,10 +5,10 @@
     <p:sldMasterId id="2147483660" r:id="rId4"/>
   </p:sldMasterIdLst>
   <p:notesMasterIdLst>
-    <p:notesMasterId r:id="rId25"/>
+    <p:notesMasterId r:id="rId31"/>
   </p:notesMasterIdLst>
   <p:handoutMasterIdLst>
-    <p:handoutMasterId r:id="rId26"/>
+    <p:handoutMasterId r:id="rId32"/>
   </p:handoutMasterIdLst>
   <p:sldIdLst>
     <p:sldId id="257" r:id="rId5"/>
@@ -17,20 +17,26 @@
     <p:sldId id="286" r:id="rId8"/>
     <p:sldId id="270" r:id="rId9"/>
     <p:sldId id="271" r:id="rId10"/>
-    <p:sldId id="272" r:id="rId11"/>
-    <p:sldId id="273" r:id="rId12"/>
-    <p:sldId id="274" r:id="rId13"/>
-    <p:sldId id="275" r:id="rId14"/>
-    <p:sldId id="276" r:id="rId15"/>
-    <p:sldId id="277" r:id="rId16"/>
-    <p:sldId id="278" r:id="rId17"/>
-    <p:sldId id="279" r:id="rId18"/>
-    <p:sldId id="280" r:id="rId19"/>
-    <p:sldId id="281" r:id="rId20"/>
-    <p:sldId id="287" r:id="rId21"/>
-    <p:sldId id="283" r:id="rId22"/>
-    <p:sldId id="282" r:id="rId23"/>
-    <p:sldId id="288" r:id="rId24"/>
+    <p:sldId id="289" r:id="rId11"/>
+    <p:sldId id="272" r:id="rId12"/>
+    <p:sldId id="273" r:id="rId13"/>
+    <p:sldId id="292" r:id="rId14"/>
+    <p:sldId id="291" r:id="rId15"/>
+    <p:sldId id="274" r:id="rId16"/>
+    <p:sldId id="275" r:id="rId17"/>
+    <p:sldId id="276" r:id="rId18"/>
+    <p:sldId id="277" r:id="rId19"/>
+    <p:sldId id="293" r:id="rId20"/>
+    <p:sldId id="290" r:id="rId21"/>
+    <p:sldId id="278" r:id="rId22"/>
+    <p:sldId id="279" r:id="rId23"/>
+    <p:sldId id="281" r:id="rId24"/>
+    <p:sldId id="295" r:id="rId25"/>
+    <p:sldId id="296" r:id="rId26"/>
+    <p:sldId id="287" r:id="rId27"/>
+    <p:sldId id="283" r:id="rId28"/>
+    <p:sldId id="282" r:id="rId29"/>
+    <p:sldId id="288" r:id="rId30"/>
   </p:sldIdLst>
   <p:sldSz cx="12188825" cy="6858000"/>
   <p:notesSz cx="6858000" cy="9144000"/>
@@ -9574,7 +9580,7 @@
       </p:grpSpPr>
       <p:sp>
         <p:nvSpPr>
-          <p:cNvPr id="2" name="Título 1"/>
+          <p:cNvPr id="4" name="Título 3"/>
           <p:cNvSpPr>
             <a:spLocks noGrp="1"/>
           </p:cNvSpPr>
@@ -9594,7 +9600,7 @@
           <a:p>
             <a:r>
               <a:rPr lang="es-419" dirty="0" smtClean="0"/>
-              <a:t>ENVIO</a:t>
+              <a:t>CIUDAD</a:t>
             </a:r>
             <a:endParaRPr lang="es-ES" dirty="0"/>
           </a:p>
@@ -9602,7 +9608,7 @@
       </p:sp>
       <p:sp>
         <p:nvSpPr>
-          <p:cNvPr id="3" name="Marcador de texto 2"/>
+          <p:cNvPr id="6" name="Marcador de texto 5"/>
           <p:cNvSpPr>
             <a:spLocks noGrp="1"/>
           </p:cNvSpPr>
@@ -9612,7 +9618,7 @@
         </p:nvSpPr>
         <p:spPr>
           <a:xfrm>
-            <a:off x="1247196" y="2852936"/>
+            <a:off x="1125860" y="2924944"/>
             <a:ext cx="4062942" cy="1930400"/>
           </a:xfrm>
         </p:spPr>
@@ -9622,15 +9628,7 @@
           <a:p>
             <a:r>
               <a:rPr lang="es-ES" dirty="0"/>
-              <a:t>Esta tabla esta creada para guardar toda la información de los envíos que se deben hacer en el </a:t>
-            </a:r>
-            <a:r>
-              <a:rPr lang="es-ES" dirty="0" err="1"/>
-              <a:t>ecommerce</a:t>
-            </a:r>
-            <a:r>
-              <a:rPr lang="es-ES" dirty="0"/>
-              <a:t>.</a:t>
+              <a:t>Esta tabla esta creada para indicar la ciudad de las partes interesadas (cliente, proveedor, etc.)</a:t>
             </a:r>
           </a:p>
           <a:p>
@@ -9640,13 +9638,11 @@
       </p:sp>
       <p:pic>
         <p:nvPicPr>
-          <p:cNvPr id="6" name="Marcador de contenido 5"/>
+          <p:cNvPr id="2" name="Imagen 1"/>
           <p:cNvPicPr>
-            <a:picLocks noGrp="1" noChangeAspect="1"/>
+            <a:picLocks noChangeAspect="1"/>
           </p:cNvPicPr>
-          <p:nvPr>
-            <p:ph idx="1"/>
-          </p:nvPr>
+          <p:nvPr/>
         </p:nvPicPr>
         <p:blipFill>
           <a:blip r:embed="rId2"/>
@@ -9656,8 +9652,8 @@
         </p:blipFill>
         <p:spPr>
           <a:xfrm>
-            <a:off x="5367641" y="2276873"/>
-            <a:ext cx="6079028" cy="2115740"/>
+            <a:off x="5590356" y="2097348"/>
+            <a:ext cx="5934075" cy="1838325"/>
           </a:xfrm>
           <a:prstGeom prst="rect">
             <a:avLst/>
@@ -9667,7 +9663,7 @@
     </p:spTree>
     <p:extLst>
       <p:ext uri="{BB962C8B-B14F-4D97-AF65-F5344CB8AC3E}">
-        <p14:creationId xmlns:p14="http://schemas.microsoft.com/office/powerpoint/2010/main" val="2151429548"/>
+        <p14:creationId xmlns:p14="http://schemas.microsoft.com/office/powerpoint/2010/main" val="3969985584"/>
       </p:ext>
     </p:extLst>
   </p:cSld>
@@ -9708,7 +9704,7 @@
       </p:grpSpPr>
       <p:sp>
         <p:nvSpPr>
-          <p:cNvPr id="2" name="Título 1"/>
+          <p:cNvPr id="4" name="Título 3"/>
           <p:cNvSpPr>
             <a:spLocks noGrp="1"/>
           </p:cNvSpPr>
@@ -9728,7 +9724,7 @@
           <a:p>
             <a:r>
               <a:rPr lang="es-419" dirty="0" smtClean="0"/>
-              <a:t>producto</a:t>
+              <a:t>Cliente</a:t>
             </a:r>
             <a:endParaRPr lang="es-ES" dirty="0"/>
           </a:p>
@@ -9736,7 +9732,7 @@
       </p:sp>
       <p:sp>
         <p:nvSpPr>
-          <p:cNvPr id="3" name="Marcador de texto 2"/>
+          <p:cNvPr id="6" name="Marcador de texto 5"/>
           <p:cNvSpPr>
             <a:spLocks noGrp="1"/>
           </p:cNvSpPr>
@@ -9746,7 +9742,7 @@
         </p:nvSpPr>
         <p:spPr>
           <a:xfrm>
-            <a:off x="1247196" y="2852936"/>
+            <a:off x="1125860" y="2924944"/>
             <a:ext cx="4062942" cy="1930400"/>
           </a:xfrm>
         </p:spPr>
@@ -9756,7 +9752,7 @@
           <a:p>
             <a:r>
               <a:rPr lang="es-ES" dirty="0"/>
-              <a:t>Esta tabla esta creada para guardar toda la información del listado de productos a la venta.</a:t>
+              <a:t>Esta tabla esta creada para guardar toda la información relevante del cliente.</a:t>
             </a:r>
           </a:p>
           <a:p>
@@ -9766,13 +9762,11 @@
       </p:sp>
       <p:pic>
         <p:nvPicPr>
-          <p:cNvPr id="5" name="Marcador de contenido 4"/>
+          <p:cNvPr id="2" name="Imagen 1"/>
           <p:cNvPicPr>
-            <a:picLocks noGrp="1" noChangeAspect="1"/>
+            <a:picLocks noChangeAspect="1"/>
           </p:cNvPicPr>
-          <p:nvPr>
-            <p:ph idx="1"/>
-          </p:nvPr>
+          <p:nvPr/>
         </p:nvPicPr>
         <p:blipFill>
           <a:blip r:embed="rId2"/>
@@ -9782,8 +9776,8 @@
         </p:blipFill>
         <p:spPr>
           <a:xfrm>
-            <a:off x="5593556" y="2239962"/>
-            <a:ext cx="5876925" cy="2276475"/>
+            <a:off x="5518348" y="1340768"/>
+            <a:ext cx="5962650" cy="4010025"/>
           </a:xfrm>
           <a:prstGeom prst="rect">
             <a:avLst/>
@@ -9793,7 +9787,7 @@
     </p:spTree>
     <p:extLst>
       <p:ext uri="{BB962C8B-B14F-4D97-AF65-F5344CB8AC3E}">
-        <p14:creationId xmlns:p14="http://schemas.microsoft.com/office/powerpoint/2010/main" val="952908357"/>
+        <p14:creationId xmlns:p14="http://schemas.microsoft.com/office/powerpoint/2010/main" val="1467829569"/>
       </p:ext>
     </p:extLst>
   </p:cSld>
@@ -9853,8 +9847,8 @@
           <a:lstStyle/>
           <a:p>
             <a:r>
-              <a:rPr lang="es-419" dirty="0" err="1" smtClean="0"/>
-              <a:t>categoria</a:t>
+              <a:rPr lang="es-419" dirty="0" smtClean="0"/>
+              <a:t>pedido</a:t>
             </a:r>
             <a:endParaRPr lang="es-ES" dirty="0"/>
           </a:p>
@@ -9882,15 +9876,7 @@
           <a:p>
             <a:r>
               <a:rPr lang="es-ES" dirty="0"/>
-              <a:t>Esta tabla esta creada para categorizar los productos del </a:t>
-            </a:r>
-            <a:r>
-              <a:rPr lang="es-ES" dirty="0" err="1"/>
-              <a:t>ecommerce</a:t>
-            </a:r>
-            <a:r>
-              <a:rPr lang="es-ES" dirty="0"/>
-              <a:t>.</a:t>
+              <a:t>Esta tabla esta creada para guardar toda la información de los pedidos realizados por los clientes.</a:t>
             </a:r>
           </a:p>
           <a:p>
@@ -9900,7 +9886,7 @@
       </p:sp>
       <p:pic>
         <p:nvPicPr>
-          <p:cNvPr id="6" name="Marcador de contenido 5"/>
+          <p:cNvPr id="5" name="Marcador de contenido 4"/>
           <p:cNvPicPr>
             <a:picLocks noGrp="1" noChangeAspect="1"/>
           </p:cNvPicPr>
@@ -9916,8 +9902,8 @@
         </p:blipFill>
         <p:spPr>
           <a:xfrm>
-            <a:off x="4707225" y="2636912"/>
-            <a:ext cx="6748969" cy="1308025"/>
+            <a:off x="5626894" y="2363787"/>
+            <a:ext cx="5810250" cy="2028825"/>
           </a:xfrm>
           <a:prstGeom prst="rect">
             <a:avLst/>
@@ -9927,7 +9913,7 @@
     </p:spTree>
     <p:extLst>
       <p:ext uri="{BB962C8B-B14F-4D97-AF65-F5344CB8AC3E}">
-        <p14:creationId xmlns:p14="http://schemas.microsoft.com/office/powerpoint/2010/main" val="2445807200"/>
+        <p14:creationId xmlns:p14="http://schemas.microsoft.com/office/powerpoint/2010/main" val="2904289431"/>
       </p:ext>
     </p:extLst>
   </p:cSld>
@@ -9988,7 +9974,7 @@
           <a:p>
             <a:r>
               <a:rPr lang="es-419" dirty="0" smtClean="0"/>
-              <a:t>PROVEEDOR</a:t>
+              <a:t>ENVIO</a:t>
             </a:r>
             <a:endParaRPr lang="es-ES" dirty="0"/>
           </a:p>
@@ -10016,15 +10002,7 @@
           <a:p>
             <a:r>
               <a:rPr lang="es-ES" dirty="0"/>
-              <a:t>Esta tabla esta creada para guardar toda la información relevante de los proveedores del </a:t>
-            </a:r>
-            <a:r>
-              <a:rPr lang="es-ES" dirty="0" err="1"/>
-              <a:t>ecommerce</a:t>
-            </a:r>
-            <a:r>
-              <a:rPr lang="es-ES" dirty="0"/>
-              <a:t>.</a:t>
+              <a:t>Esta tabla esta creada para guardar toda la información de los envíos que se deben hacer en el ecommerce.</a:t>
             </a:r>
           </a:p>
           <a:p>
@@ -10034,7 +10012,7 @@
       </p:sp>
       <p:pic>
         <p:nvPicPr>
-          <p:cNvPr id="7" name="Marcador de contenido 6"/>
+          <p:cNvPr id="6" name="Marcador de contenido 5"/>
           <p:cNvPicPr>
             <a:picLocks noGrp="1" noChangeAspect="1"/>
           </p:cNvPicPr>
@@ -10050,8 +10028,8 @@
         </p:blipFill>
         <p:spPr>
           <a:xfrm>
-            <a:off x="5477961" y="2132856"/>
-            <a:ext cx="5997283" cy="2445494"/>
+            <a:off x="5367641" y="2276873"/>
+            <a:ext cx="6079028" cy="2115740"/>
           </a:xfrm>
           <a:prstGeom prst="rect">
             <a:avLst/>
@@ -10061,7 +10039,7 @@
     </p:spTree>
     <p:extLst>
       <p:ext uri="{BB962C8B-B14F-4D97-AF65-F5344CB8AC3E}">
-        <p14:creationId xmlns:p14="http://schemas.microsoft.com/office/powerpoint/2010/main" val="2675120001"/>
+        <p14:creationId xmlns:p14="http://schemas.microsoft.com/office/powerpoint/2010/main" val="2151429548"/>
       </p:ext>
     </p:extLst>
   </p:cSld>
@@ -10122,7 +10100,7 @@
           <a:p>
             <a:r>
               <a:rPr lang="es-419" dirty="0" smtClean="0"/>
-              <a:t>detallepedido</a:t>
+              <a:t>producto</a:t>
             </a:r>
             <a:endParaRPr lang="es-ES" dirty="0"/>
           </a:p>
@@ -10150,7 +10128,7 @@
           <a:p>
             <a:r>
               <a:rPr lang="es-ES" dirty="0"/>
-              <a:t>Esta tabla esta creada para describir el detalle de un pedido.</a:t>
+              <a:t>Esta tabla esta creada para guardar toda la información del listado de productos a la venta.</a:t>
             </a:r>
           </a:p>
           <a:p>
@@ -10160,13 +10138,11 @@
       </p:sp>
       <p:pic>
         <p:nvPicPr>
-          <p:cNvPr id="5" name="Marcador de contenido 4"/>
+          <p:cNvPr id="6" name="Imagen 5"/>
           <p:cNvPicPr>
-            <a:picLocks noGrp="1" noChangeAspect="1"/>
+            <a:picLocks noChangeAspect="1"/>
           </p:cNvPicPr>
-          <p:nvPr>
-            <p:ph idx="1"/>
-          </p:nvPr>
+          <p:nvPr/>
         </p:nvPicPr>
         <p:blipFill>
           <a:blip r:embed="rId2"/>
@@ -10176,8 +10152,8 @@
         </p:blipFill>
         <p:spPr>
           <a:xfrm>
-            <a:off x="5617369" y="2206625"/>
-            <a:ext cx="5829300" cy="2343150"/>
+            <a:off x="5806380" y="1844824"/>
+            <a:ext cx="5867400" cy="2762250"/>
           </a:xfrm>
           <a:prstGeom prst="rect">
             <a:avLst/>
@@ -10187,7 +10163,7 @@
     </p:spTree>
     <p:extLst>
       <p:ext uri="{BB962C8B-B14F-4D97-AF65-F5344CB8AC3E}">
-        <p14:creationId xmlns:p14="http://schemas.microsoft.com/office/powerpoint/2010/main" val="1725642590"/>
+        <p14:creationId xmlns:p14="http://schemas.microsoft.com/office/powerpoint/2010/main" val="952908357"/>
       </p:ext>
     </p:extLst>
   </p:cSld>
@@ -10248,6 +10224,507 @@
           <a:p>
             <a:r>
               <a:rPr lang="es-419" dirty="0" smtClean="0"/>
+              <a:t>categoria</a:t>
+            </a:r>
+            <a:endParaRPr lang="es-ES" dirty="0"/>
+          </a:p>
+        </p:txBody>
+      </p:sp>
+      <p:sp>
+        <p:nvSpPr>
+          <p:cNvPr id="3" name="Marcador de texto 2"/>
+          <p:cNvSpPr>
+            <a:spLocks noGrp="1"/>
+          </p:cNvSpPr>
+          <p:nvPr>
+            <p:ph type="body" sz="half" idx="2"/>
+          </p:nvPr>
+        </p:nvSpPr>
+        <p:spPr>
+          <a:xfrm>
+            <a:off x="1247196" y="2852936"/>
+            <a:ext cx="4062942" cy="1930400"/>
+          </a:xfrm>
+        </p:spPr>
+        <p:txBody>
+          <a:bodyPr/>
+          <a:lstStyle/>
+          <a:p>
+            <a:r>
+              <a:rPr lang="es-ES" dirty="0"/>
+              <a:t>Esta tabla esta creada para categorizar los productos del ecommerce.</a:t>
+            </a:r>
+          </a:p>
+          <a:p>
+            <a:endParaRPr lang="es-ES" dirty="0"/>
+          </a:p>
+        </p:txBody>
+      </p:sp>
+      <p:pic>
+        <p:nvPicPr>
+          <p:cNvPr id="6" name="Marcador de contenido 5"/>
+          <p:cNvPicPr>
+            <a:picLocks noGrp="1" noChangeAspect="1"/>
+          </p:cNvPicPr>
+          <p:nvPr>
+            <p:ph idx="1"/>
+          </p:nvPr>
+        </p:nvPicPr>
+        <p:blipFill>
+          <a:blip r:embed="rId2"/>
+          <a:stretch>
+            <a:fillRect/>
+          </a:stretch>
+        </p:blipFill>
+        <p:spPr>
+          <a:xfrm>
+            <a:off x="4942284" y="2636912"/>
+            <a:ext cx="6748969" cy="1308025"/>
+          </a:xfrm>
+          <a:prstGeom prst="rect">
+            <a:avLst/>
+          </a:prstGeom>
+        </p:spPr>
+      </p:pic>
+    </p:spTree>
+    <p:extLst>
+      <p:ext uri="{BB962C8B-B14F-4D97-AF65-F5344CB8AC3E}">
+        <p14:creationId xmlns:p14="http://schemas.microsoft.com/office/powerpoint/2010/main" val="2445807200"/>
+      </p:ext>
+    </p:extLst>
+  </p:cSld>
+  <p:clrMapOvr>
+    <a:masterClrMapping/>
+  </p:clrMapOvr>
+  <mc:AlternateContent xmlns:mc="http://schemas.openxmlformats.org/markup-compatibility/2006" xmlns:p14="http://schemas.microsoft.com/office/powerpoint/2010/main">
+    <mc:Choice Requires="p14">
+      <p:transition spd="med" p14:dur="700">
+        <p:fade/>
+      </p:transition>
+    </mc:Choice>
+    <mc:Fallback xmlns="">
+      <p:transition spd="med">
+        <p:fade/>
+      </p:transition>
+    </mc:Fallback>
+  </mc:AlternateContent>
+</p:sld>
+</file>
+
+<file path=ppt/slides/slide16.xml><?xml version="1.0" encoding="utf-8"?>
+<p:sld xmlns:a="http://schemas.openxmlformats.org/drawingml/2006/main" xmlns:r="http://schemas.openxmlformats.org/officeDocument/2006/relationships" xmlns:p="http://schemas.openxmlformats.org/presentationml/2006/main">
+  <p:cSld>
+    <p:spTree>
+      <p:nvGrpSpPr>
+        <p:cNvPr id="1" name=""/>
+        <p:cNvGrpSpPr/>
+        <p:nvPr/>
+      </p:nvGrpSpPr>
+      <p:grpSpPr>
+        <a:xfrm>
+          <a:off x="0" y="0"/>
+          <a:ext cx="0" cy="0"/>
+          <a:chOff x="0" y="0"/>
+          <a:chExt cx="0" cy="0"/>
+        </a:xfrm>
+      </p:grpSpPr>
+      <p:sp>
+        <p:nvSpPr>
+          <p:cNvPr id="2" name="Título 1"/>
+          <p:cNvSpPr>
+            <a:spLocks noGrp="1"/>
+          </p:cNvSpPr>
+          <p:nvPr>
+            <p:ph type="title"/>
+          </p:nvPr>
+        </p:nvSpPr>
+        <p:spPr>
+          <a:xfrm>
+            <a:off x="1218882" y="1701800"/>
+            <a:ext cx="4062942" cy="791096"/>
+          </a:xfrm>
+        </p:spPr>
+        <p:txBody>
+          <a:bodyPr/>
+          <a:lstStyle/>
+          <a:p>
+            <a:r>
+              <a:rPr lang="es-419" dirty="0" smtClean="0"/>
+              <a:t>TIPODEJUEGO</a:t>
+            </a:r>
+            <a:endParaRPr lang="es-ES" dirty="0"/>
+          </a:p>
+        </p:txBody>
+      </p:sp>
+      <p:sp>
+        <p:nvSpPr>
+          <p:cNvPr id="3" name="Marcador de texto 2"/>
+          <p:cNvSpPr>
+            <a:spLocks noGrp="1"/>
+          </p:cNvSpPr>
+          <p:nvPr>
+            <p:ph type="body" sz="half" idx="2"/>
+          </p:nvPr>
+        </p:nvSpPr>
+        <p:spPr>
+          <a:xfrm>
+            <a:off x="1247196" y="2852936"/>
+            <a:ext cx="4062942" cy="1930400"/>
+          </a:xfrm>
+        </p:spPr>
+        <p:txBody>
+          <a:bodyPr/>
+          <a:lstStyle/>
+          <a:p>
+            <a:r>
+              <a:rPr lang="es-ES" dirty="0"/>
+              <a:t>Esta tabla esta creada para categorizar </a:t>
+            </a:r>
+            <a:r>
+              <a:rPr lang="es-ES" dirty="0" smtClean="0"/>
+              <a:t>los productos del ecommerce, si es físico o virtual</a:t>
+            </a:r>
+            <a:endParaRPr lang="es-ES" dirty="0"/>
+          </a:p>
+          <a:p>
+            <a:endParaRPr lang="es-ES" dirty="0"/>
+          </a:p>
+        </p:txBody>
+      </p:sp>
+      <p:pic>
+        <p:nvPicPr>
+          <p:cNvPr id="5" name="Imagen 4"/>
+          <p:cNvPicPr>
+            <a:picLocks noChangeAspect="1"/>
+          </p:cNvPicPr>
+          <p:nvPr/>
+        </p:nvPicPr>
+        <p:blipFill>
+          <a:blip r:embed="rId2"/>
+          <a:stretch>
+            <a:fillRect/>
+          </a:stretch>
+        </p:blipFill>
+        <p:spPr>
+          <a:xfrm>
+            <a:off x="5281824" y="2400498"/>
+            <a:ext cx="5772150" cy="904875"/>
+          </a:xfrm>
+          <a:prstGeom prst="rect">
+            <a:avLst/>
+          </a:prstGeom>
+        </p:spPr>
+      </p:pic>
+    </p:spTree>
+    <p:extLst>
+      <p:ext uri="{BB962C8B-B14F-4D97-AF65-F5344CB8AC3E}">
+        <p14:creationId xmlns:p14="http://schemas.microsoft.com/office/powerpoint/2010/main" val="2697318767"/>
+      </p:ext>
+    </p:extLst>
+  </p:cSld>
+  <p:clrMapOvr>
+    <a:masterClrMapping/>
+  </p:clrMapOvr>
+  <mc:AlternateContent xmlns:mc="http://schemas.openxmlformats.org/markup-compatibility/2006" xmlns:p14="http://schemas.microsoft.com/office/powerpoint/2010/main">
+    <mc:Choice Requires="p14">
+      <p:transition spd="med" p14:dur="700">
+        <p:fade/>
+      </p:transition>
+    </mc:Choice>
+    <mc:Fallback xmlns="">
+      <p:transition spd="med">
+        <p:fade/>
+      </p:transition>
+    </mc:Fallback>
+  </mc:AlternateContent>
+</p:sld>
+</file>
+
+<file path=ppt/slides/slide17.xml><?xml version="1.0" encoding="utf-8"?>
+<p:sld xmlns:a="http://schemas.openxmlformats.org/drawingml/2006/main" xmlns:r="http://schemas.openxmlformats.org/officeDocument/2006/relationships" xmlns:p="http://schemas.openxmlformats.org/presentationml/2006/main">
+  <p:cSld>
+    <p:spTree>
+      <p:nvGrpSpPr>
+        <p:cNvPr id="1" name=""/>
+        <p:cNvGrpSpPr/>
+        <p:nvPr/>
+      </p:nvGrpSpPr>
+      <p:grpSpPr>
+        <a:xfrm>
+          <a:off x="0" y="0"/>
+          <a:ext cx="0" cy="0"/>
+          <a:chOff x="0" y="0"/>
+          <a:chExt cx="0" cy="0"/>
+        </a:xfrm>
+      </p:grpSpPr>
+      <p:sp>
+        <p:nvSpPr>
+          <p:cNvPr id="2" name="Título 1"/>
+          <p:cNvSpPr>
+            <a:spLocks noGrp="1"/>
+          </p:cNvSpPr>
+          <p:nvPr>
+            <p:ph type="title"/>
+          </p:nvPr>
+        </p:nvSpPr>
+        <p:spPr/>
+        <p:txBody>
+          <a:bodyPr/>
+          <a:lstStyle/>
+          <a:p>
+            <a:r>
+              <a:rPr lang="es-419" dirty="0" smtClean="0"/>
+              <a:t>PROVEEDOR</a:t>
+            </a:r>
+            <a:endParaRPr lang="es-ES" dirty="0"/>
+          </a:p>
+        </p:txBody>
+      </p:sp>
+      <p:sp>
+        <p:nvSpPr>
+          <p:cNvPr id="3" name="Marcador de texto 2"/>
+          <p:cNvSpPr>
+            <a:spLocks noGrp="1"/>
+          </p:cNvSpPr>
+          <p:nvPr>
+            <p:ph type="body" sz="half" idx="2"/>
+          </p:nvPr>
+        </p:nvSpPr>
+        <p:spPr/>
+        <p:txBody>
+          <a:bodyPr/>
+          <a:lstStyle/>
+          <a:p>
+            <a:r>
+              <a:rPr lang="es-419" dirty="0" smtClean="0"/>
+              <a:t>Esta tabla esta creada para guardar toda la información relevante sobre los proveedores del negocio.</a:t>
+            </a:r>
+            <a:endParaRPr lang="es-ES" dirty="0"/>
+          </a:p>
+        </p:txBody>
+      </p:sp>
+      <p:pic>
+        <p:nvPicPr>
+          <p:cNvPr id="5" name="Imagen 4"/>
+          <p:cNvPicPr>
+            <a:picLocks noChangeAspect="1"/>
+          </p:cNvPicPr>
+          <p:nvPr/>
+        </p:nvPicPr>
+        <p:blipFill>
+          <a:blip r:embed="rId2"/>
+          <a:stretch>
+            <a:fillRect/>
+          </a:stretch>
+        </p:blipFill>
+        <p:spPr>
+          <a:xfrm>
+            <a:off x="5590356" y="1124744"/>
+            <a:ext cx="6076950" cy="4695825"/>
+          </a:xfrm>
+          <a:prstGeom prst="rect">
+            <a:avLst/>
+          </a:prstGeom>
+        </p:spPr>
+      </p:pic>
+    </p:spTree>
+    <p:extLst>
+      <p:ext uri="{BB962C8B-B14F-4D97-AF65-F5344CB8AC3E}">
+        <p14:creationId xmlns:p14="http://schemas.microsoft.com/office/powerpoint/2010/main" val="1886099592"/>
+      </p:ext>
+    </p:extLst>
+  </p:cSld>
+  <p:clrMapOvr>
+    <a:masterClrMapping/>
+  </p:clrMapOvr>
+  <mc:AlternateContent xmlns:mc="http://schemas.openxmlformats.org/markup-compatibility/2006" xmlns:p14="http://schemas.microsoft.com/office/powerpoint/2010/main">
+    <mc:Choice Requires="p14">
+      <p:transition spd="med" p14:dur="700">
+        <p:fade/>
+      </p:transition>
+    </mc:Choice>
+    <mc:Fallback xmlns="">
+      <p:transition spd="med">
+        <p:fade/>
+      </p:transition>
+    </mc:Fallback>
+  </mc:AlternateContent>
+</p:sld>
+</file>
+
+<file path=ppt/slides/slide18.xml><?xml version="1.0" encoding="utf-8"?>
+<p:sld xmlns:a="http://schemas.openxmlformats.org/drawingml/2006/main" xmlns:r="http://schemas.openxmlformats.org/officeDocument/2006/relationships" xmlns:p="http://schemas.openxmlformats.org/presentationml/2006/main">
+  <p:cSld>
+    <p:spTree>
+      <p:nvGrpSpPr>
+        <p:cNvPr id="1" name=""/>
+        <p:cNvGrpSpPr/>
+        <p:nvPr/>
+      </p:nvGrpSpPr>
+      <p:grpSpPr>
+        <a:xfrm>
+          <a:off x="0" y="0"/>
+          <a:ext cx="0" cy="0"/>
+          <a:chOff x="0" y="0"/>
+          <a:chExt cx="0" cy="0"/>
+        </a:xfrm>
+      </p:grpSpPr>
+      <p:sp>
+        <p:nvSpPr>
+          <p:cNvPr id="2" name="Título 1"/>
+          <p:cNvSpPr>
+            <a:spLocks noGrp="1"/>
+          </p:cNvSpPr>
+          <p:nvPr>
+            <p:ph type="title"/>
+          </p:nvPr>
+        </p:nvSpPr>
+        <p:spPr>
+          <a:xfrm>
+            <a:off x="1218882" y="1701800"/>
+            <a:ext cx="4062942" cy="791096"/>
+          </a:xfrm>
+        </p:spPr>
+        <p:txBody>
+          <a:bodyPr>
+            <a:normAutofit fontScale="90000"/>
+          </a:bodyPr>
+          <a:lstStyle/>
+          <a:p>
+            <a:r>
+              <a:rPr lang="es-ES" b="1" dirty="0"/>
+              <a:t>ProductoProveedor</a:t>
+            </a:r>
+            <a:br>
+              <a:rPr lang="es-ES" b="1" dirty="0"/>
+            </a:br>
+            <a:endParaRPr lang="es-ES" dirty="0"/>
+          </a:p>
+        </p:txBody>
+      </p:sp>
+      <p:sp>
+        <p:nvSpPr>
+          <p:cNvPr id="3" name="Marcador de texto 2"/>
+          <p:cNvSpPr>
+            <a:spLocks noGrp="1"/>
+          </p:cNvSpPr>
+          <p:nvPr>
+            <p:ph type="body" sz="half" idx="2"/>
+          </p:nvPr>
+        </p:nvSpPr>
+        <p:spPr>
+          <a:xfrm>
+            <a:off x="1247196" y="2852936"/>
+            <a:ext cx="4062942" cy="1930400"/>
+          </a:xfrm>
+        </p:spPr>
+        <p:txBody>
+          <a:bodyPr/>
+          <a:lstStyle/>
+          <a:p>
+            <a:r>
+              <a:rPr lang="es-ES" dirty="0"/>
+              <a:t>Esta tabla esta creada </a:t>
+            </a:r>
+            <a:r>
+              <a:rPr lang="es-ES" dirty="0" smtClean="0"/>
+              <a:t>para establecer la relación entre la tabla producto y proveedor</a:t>
+            </a:r>
+            <a:endParaRPr lang="es-ES" dirty="0"/>
+          </a:p>
+          <a:p>
+            <a:endParaRPr lang="es-ES" dirty="0"/>
+          </a:p>
+        </p:txBody>
+      </p:sp>
+      <p:pic>
+        <p:nvPicPr>
+          <p:cNvPr id="5" name="Imagen 4"/>
+          <p:cNvPicPr>
+            <a:picLocks noChangeAspect="1"/>
+          </p:cNvPicPr>
+          <p:nvPr/>
+        </p:nvPicPr>
+        <p:blipFill>
+          <a:blip r:embed="rId2"/>
+          <a:stretch>
+            <a:fillRect/>
+          </a:stretch>
+        </p:blipFill>
+        <p:spPr>
+          <a:xfrm>
+            <a:off x="5683284" y="1701801"/>
+            <a:ext cx="5869721" cy="2447280"/>
+          </a:xfrm>
+          <a:prstGeom prst="rect">
+            <a:avLst/>
+          </a:prstGeom>
+        </p:spPr>
+      </p:pic>
+    </p:spTree>
+    <p:extLst>
+      <p:ext uri="{BB962C8B-B14F-4D97-AF65-F5344CB8AC3E}">
+        <p14:creationId xmlns:p14="http://schemas.microsoft.com/office/powerpoint/2010/main" val="2675120001"/>
+      </p:ext>
+    </p:extLst>
+  </p:cSld>
+  <p:clrMapOvr>
+    <a:masterClrMapping/>
+  </p:clrMapOvr>
+  <mc:AlternateContent xmlns:mc="http://schemas.openxmlformats.org/markup-compatibility/2006" xmlns:p14="http://schemas.microsoft.com/office/powerpoint/2010/main">
+    <mc:Choice Requires="p14">
+      <p:transition spd="med" p14:dur="700">
+        <p:fade/>
+      </p:transition>
+    </mc:Choice>
+    <mc:Fallback xmlns="">
+      <p:transition spd="med">
+        <p:fade/>
+      </p:transition>
+    </mc:Fallback>
+  </mc:AlternateContent>
+</p:sld>
+</file>
+
+<file path=ppt/slides/slide19.xml><?xml version="1.0" encoding="utf-8"?>
+<p:sld xmlns:a="http://schemas.openxmlformats.org/drawingml/2006/main" xmlns:r="http://schemas.openxmlformats.org/officeDocument/2006/relationships" xmlns:p="http://schemas.openxmlformats.org/presentationml/2006/main">
+  <p:cSld>
+    <p:spTree>
+      <p:nvGrpSpPr>
+        <p:cNvPr id="1" name=""/>
+        <p:cNvGrpSpPr/>
+        <p:nvPr/>
+      </p:nvGrpSpPr>
+      <p:grpSpPr>
+        <a:xfrm>
+          <a:off x="0" y="0"/>
+          <a:ext cx="0" cy="0"/>
+          <a:chOff x="0" y="0"/>
+          <a:chExt cx="0" cy="0"/>
+        </a:xfrm>
+      </p:grpSpPr>
+      <p:sp>
+        <p:nvSpPr>
+          <p:cNvPr id="2" name="Título 1"/>
+          <p:cNvSpPr>
+            <a:spLocks noGrp="1"/>
+          </p:cNvSpPr>
+          <p:nvPr>
+            <p:ph type="title"/>
+          </p:nvPr>
+        </p:nvSpPr>
+        <p:spPr>
+          <a:xfrm>
+            <a:off x="1218882" y="1701800"/>
+            <a:ext cx="4062942" cy="791096"/>
+          </a:xfrm>
+        </p:spPr>
+        <p:txBody>
+          <a:bodyPr/>
+          <a:lstStyle/>
+          <a:p>
+            <a:r>
+              <a:rPr lang="es-419" dirty="0" smtClean="0"/>
               <a:t>detallepedido</a:t>
             </a:r>
             <a:endParaRPr lang="es-ES" dirty="0"/>
@@ -10313,7 +10790,7 @@
     </p:spTree>
     <p:extLst>
       <p:ext uri="{BB962C8B-B14F-4D97-AF65-F5344CB8AC3E}">
-        <p14:creationId xmlns:p14="http://schemas.microsoft.com/office/powerpoint/2010/main" val="82123554"/>
+        <p14:creationId xmlns:p14="http://schemas.microsoft.com/office/powerpoint/2010/main" val="1725642590"/>
       </p:ext>
     </p:extLst>
   </p:cSld>
@@ -10335,7 +10812,91 @@
 </p:sld>
 </file>
 
-<file path=ppt/slides/slide16.xml><?xml version="1.0" encoding="utf-8"?>
+<file path=ppt/slides/slide2.xml><?xml version="1.0" encoding="utf-8"?>
+<p:sld xmlns:a="http://schemas.openxmlformats.org/drawingml/2006/main" xmlns:r="http://schemas.openxmlformats.org/officeDocument/2006/relationships" xmlns:p="http://schemas.openxmlformats.org/presentationml/2006/main">
+  <p:cSld>
+    <p:spTree>
+      <p:nvGrpSpPr>
+        <p:cNvPr id="1" name=""/>
+        <p:cNvGrpSpPr/>
+        <p:nvPr/>
+      </p:nvGrpSpPr>
+      <p:grpSpPr>
+        <a:xfrm>
+          <a:off x="0" y="0"/>
+          <a:ext cx="0" cy="0"/>
+          <a:chOff x="0" y="0"/>
+          <a:chExt cx="0" cy="0"/>
+        </a:xfrm>
+      </p:grpSpPr>
+      <p:sp>
+        <p:nvSpPr>
+          <p:cNvPr id="2" name="Título 1"/>
+          <p:cNvSpPr>
+            <a:spLocks noGrp="1"/>
+          </p:cNvSpPr>
+          <p:nvPr>
+            <p:ph type="title"/>
+          </p:nvPr>
+        </p:nvSpPr>
+        <p:spPr/>
+        <p:txBody>
+          <a:bodyPr/>
+          <a:lstStyle/>
+          <a:p>
+            <a:r>
+              <a:rPr lang="es-419" dirty="0" smtClean="0"/>
+              <a:t>Introducción</a:t>
+            </a:r>
+            <a:endParaRPr lang="es-ES" dirty="0"/>
+          </a:p>
+        </p:txBody>
+      </p:sp>
+      <p:sp>
+        <p:nvSpPr>
+          <p:cNvPr id="3" name="Marcador de contenido 2"/>
+          <p:cNvSpPr>
+            <a:spLocks noGrp="1"/>
+          </p:cNvSpPr>
+          <p:nvPr>
+            <p:ph idx="1"/>
+          </p:nvPr>
+        </p:nvSpPr>
+        <p:spPr/>
+        <p:txBody>
+          <a:bodyPr/>
+          <a:lstStyle/>
+          <a:p>
+            <a:endParaRPr lang="es-ES"/>
+          </a:p>
+        </p:txBody>
+      </p:sp>
+    </p:spTree>
+    <p:extLst>
+      <p:ext uri="{BB962C8B-B14F-4D97-AF65-F5344CB8AC3E}">
+        <p14:creationId xmlns:p14="http://schemas.microsoft.com/office/powerpoint/2010/main" val="636728386"/>
+      </p:ext>
+    </p:extLst>
+  </p:cSld>
+  <p:clrMapOvr>
+    <a:masterClrMapping/>
+  </p:clrMapOvr>
+  <mc:AlternateContent xmlns:mc="http://schemas.openxmlformats.org/markup-compatibility/2006" xmlns:p14="http://schemas.microsoft.com/office/powerpoint/2010/main">
+    <mc:Choice Requires="p14">
+      <p:transition spd="med" p14:dur="700">
+        <p:fade/>
+      </p:transition>
+    </mc:Choice>
+    <mc:Fallback xmlns="">
+      <p:transition spd="med">
+        <p:fade/>
+      </p:transition>
+    </mc:Fallback>
+  </mc:AlternateContent>
+</p:sld>
+</file>
+
+<file path=ppt/slides/slide20.xml><?xml version="1.0" encoding="utf-8"?>
 <p:sld xmlns:a="http://schemas.openxmlformats.org/drawingml/2006/main" xmlns:r="http://schemas.openxmlformats.org/officeDocument/2006/relationships" xmlns:p="http://schemas.openxmlformats.org/presentationml/2006/main">
   <p:cSld>
     <p:spTree>
@@ -10473,7 +11034,289 @@
 </p:sld>
 </file>
 
-<file path=ppt/slides/slide17.xml><?xml version="1.0" encoding="utf-8"?>
+<file path=ppt/slides/slide21.xml><?xml version="1.0" encoding="utf-8"?>
+<p:sld xmlns:a="http://schemas.openxmlformats.org/drawingml/2006/main" xmlns:r="http://schemas.openxmlformats.org/officeDocument/2006/relationships" xmlns:p="http://schemas.openxmlformats.org/presentationml/2006/main">
+  <p:cSld>
+    <p:spTree>
+      <p:nvGrpSpPr>
+        <p:cNvPr id="1" name=""/>
+        <p:cNvGrpSpPr/>
+        <p:nvPr/>
+      </p:nvGrpSpPr>
+      <p:grpSpPr>
+        <a:xfrm>
+          <a:off x="0" y="0"/>
+          <a:ext cx="0" cy="0"/>
+          <a:chOff x="0" y="0"/>
+          <a:chExt cx="0" cy="0"/>
+        </a:xfrm>
+      </p:grpSpPr>
+      <p:sp>
+        <p:nvSpPr>
+          <p:cNvPr id="2" name="Título 1"/>
+          <p:cNvSpPr>
+            <a:spLocks noGrp="1"/>
+          </p:cNvSpPr>
+          <p:nvPr>
+            <p:ph type="title"/>
+          </p:nvPr>
+        </p:nvSpPr>
+        <p:spPr>
+          <a:xfrm>
+            <a:off x="1218882" y="1340768"/>
+            <a:ext cx="4062942" cy="1152128"/>
+          </a:xfrm>
+        </p:spPr>
+        <p:txBody>
+          <a:bodyPr>
+            <a:normAutofit/>
+          </a:bodyPr>
+          <a:lstStyle/>
+          <a:p>
+            <a:r>
+              <a:rPr lang="es-419" dirty="0" smtClean="0"/>
+              <a:t>HISTORIAL_CAMBIOS_ENVIOS</a:t>
+            </a:r>
+            <a:endParaRPr lang="es-ES" dirty="0"/>
+          </a:p>
+        </p:txBody>
+      </p:sp>
+      <p:sp>
+        <p:nvSpPr>
+          <p:cNvPr id="3" name="Marcador de texto 2"/>
+          <p:cNvSpPr>
+            <a:spLocks noGrp="1"/>
+          </p:cNvSpPr>
+          <p:nvPr>
+            <p:ph type="body" sz="half" idx="2"/>
+          </p:nvPr>
+        </p:nvSpPr>
+        <p:spPr>
+          <a:xfrm>
+            <a:off x="1247196" y="2852936"/>
+            <a:ext cx="4062942" cy="1930400"/>
+          </a:xfrm>
+        </p:spPr>
+        <p:txBody>
+          <a:bodyPr/>
+          <a:lstStyle/>
+          <a:p>
+            <a:r>
+              <a:rPr lang="es-ES" dirty="0"/>
+              <a:t>Esta tabla esta creada para guardar los cambios realizados en la tabla </a:t>
+            </a:r>
+            <a:r>
+              <a:rPr lang="es-ES" dirty="0" smtClean="0"/>
+              <a:t>envíos </a:t>
+            </a:r>
+            <a:r>
+              <a:rPr lang="es-ES" dirty="0"/>
+              <a:t>mediante triggers.</a:t>
+            </a:r>
+          </a:p>
+          <a:p>
+            <a:endParaRPr lang="es-ES" dirty="0"/>
+          </a:p>
+        </p:txBody>
+      </p:sp>
+      <p:pic>
+        <p:nvPicPr>
+          <p:cNvPr id="5" name="Imagen 4"/>
+          <p:cNvPicPr>
+            <a:picLocks noChangeAspect="1"/>
+          </p:cNvPicPr>
+          <p:nvPr/>
+        </p:nvPicPr>
+        <p:blipFill>
+          <a:blip r:embed="rId2"/>
+          <a:stretch>
+            <a:fillRect/>
+          </a:stretch>
+        </p:blipFill>
+        <p:spPr>
+          <a:xfrm>
+            <a:off x="6094412" y="692696"/>
+            <a:ext cx="4824536" cy="5321342"/>
+          </a:xfrm>
+          <a:prstGeom prst="rect">
+            <a:avLst/>
+          </a:prstGeom>
+        </p:spPr>
+      </p:pic>
+    </p:spTree>
+    <p:extLst>
+      <p:ext uri="{BB962C8B-B14F-4D97-AF65-F5344CB8AC3E}">
+        <p14:creationId xmlns:p14="http://schemas.microsoft.com/office/powerpoint/2010/main" val="3056316281"/>
+      </p:ext>
+    </p:extLst>
+  </p:cSld>
+  <p:clrMapOvr>
+    <a:masterClrMapping/>
+  </p:clrMapOvr>
+  <mc:AlternateContent xmlns:mc="http://schemas.openxmlformats.org/markup-compatibility/2006" xmlns:p14="http://schemas.microsoft.com/office/powerpoint/2010/main">
+    <mc:Choice Requires="p14">
+      <p:transition spd="med" p14:dur="700">
+        <p:fade/>
+      </p:transition>
+    </mc:Choice>
+    <mc:Fallback xmlns="">
+      <p:transition spd="med">
+        <p:fade/>
+      </p:transition>
+    </mc:Fallback>
+  </mc:AlternateContent>
+  <p:timing>
+    <p:tnLst>
+      <p:par>
+        <p:cTn id="1" dur="indefinite" restart="never" nodeType="tmRoot"/>
+      </p:par>
+    </p:tnLst>
+  </p:timing>
+</p:sld>
+</file>
+
+<file path=ppt/slides/slide22.xml><?xml version="1.0" encoding="utf-8"?>
+<p:sld xmlns:a="http://schemas.openxmlformats.org/drawingml/2006/main" xmlns:r="http://schemas.openxmlformats.org/officeDocument/2006/relationships" xmlns:p="http://schemas.openxmlformats.org/presentationml/2006/main">
+  <p:cSld>
+    <p:spTree>
+      <p:nvGrpSpPr>
+        <p:cNvPr id="1" name=""/>
+        <p:cNvGrpSpPr/>
+        <p:nvPr/>
+      </p:nvGrpSpPr>
+      <p:grpSpPr>
+        <a:xfrm>
+          <a:off x="0" y="0"/>
+          <a:ext cx="0" cy="0"/>
+          <a:chOff x="0" y="0"/>
+          <a:chExt cx="0" cy="0"/>
+        </a:xfrm>
+      </p:grpSpPr>
+      <p:sp>
+        <p:nvSpPr>
+          <p:cNvPr id="2" name="Título 1"/>
+          <p:cNvSpPr>
+            <a:spLocks noGrp="1"/>
+          </p:cNvSpPr>
+          <p:nvPr>
+            <p:ph type="title"/>
+          </p:nvPr>
+        </p:nvSpPr>
+        <p:spPr>
+          <a:xfrm>
+            <a:off x="1218882" y="1340768"/>
+            <a:ext cx="4062942" cy="1152128"/>
+          </a:xfrm>
+        </p:spPr>
+        <p:txBody>
+          <a:bodyPr>
+            <a:normAutofit/>
+          </a:bodyPr>
+          <a:lstStyle/>
+          <a:p>
+            <a:r>
+              <a:rPr lang="es-419" dirty="0" smtClean="0"/>
+              <a:t>HISTORIAL_CAMBIOS_PEDIDOS</a:t>
+            </a:r>
+            <a:endParaRPr lang="es-ES" dirty="0"/>
+          </a:p>
+        </p:txBody>
+      </p:sp>
+      <p:sp>
+        <p:nvSpPr>
+          <p:cNvPr id="3" name="Marcador de texto 2"/>
+          <p:cNvSpPr>
+            <a:spLocks noGrp="1"/>
+          </p:cNvSpPr>
+          <p:nvPr>
+            <p:ph type="body" sz="half" idx="2"/>
+          </p:nvPr>
+        </p:nvSpPr>
+        <p:spPr>
+          <a:xfrm>
+            <a:off x="1247196" y="2852936"/>
+            <a:ext cx="4062942" cy="1930400"/>
+          </a:xfrm>
+        </p:spPr>
+        <p:txBody>
+          <a:bodyPr/>
+          <a:lstStyle/>
+          <a:p>
+            <a:r>
+              <a:rPr lang="es-ES" dirty="0"/>
+              <a:t>Esta tabla esta creada para guardar los cambios realizados en la tabla </a:t>
+            </a:r>
+            <a:r>
+              <a:rPr lang="es-ES" dirty="0" smtClean="0"/>
+              <a:t>pedido mediante </a:t>
+            </a:r>
+            <a:r>
+              <a:rPr lang="es-ES" dirty="0"/>
+              <a:t>triggers.</a:t>
+            </a:r>
+          </a:p>
+          <a:p>
+            <a:endParaRPr lang="es-ES" dirty="0"/>
+          </a:p>
+        </p:txBody>
+      </p:sp>
+      <p:pic>
+        <p:nvPicPr>
+          <p:cNvPr id="4" name="Imagen 3"/>
+          <p:cNvPicPr>
+            <a:picLocks noChangeAspect="1"/>
+          </p:cNvPicPr>
+          <p:nvPr/>
+        </p:nvPicPr>
+        <p:blipFill>
+          <a:blip r:embed="rId2"/>
+          <a:stretch>
+            <a:fillRect/>
+          </a:stretch>
+        </p:blipFill>
+        <p:spPr>
+          <a:xfrm>
+            <a:off x="5878387" y="1347986"/>
+            <a:ext cx="5566537" cy="4025230"/>
+          </a:xfrm>
+          <a:prstGeom prst="rect">
+            <a:avLst/>
+          </a:prstGeom>
+        </p:spPr>
+      </p:pic>
+    </p:spTree>
+    <p:extLst>
+      <p:ext uri="{BB962C8B-B14F-4D97-AF65-F5344CB8AC3E}">
+        <p14:creationId xmlns:p14="http://schemas.microsoft.com/office/powerpoint/2010/main" val="3243914103"/>
+      </p:ext>
+    </p:extLst>
+  </p:cSld>
+  <p:clrMapOvr>
+    <a:masterClrMapping/>
+  </p:clrMapOvr>
+  <mc:AlternateContent xmlns:mc="http://schemas.openxmlformats.org/markup-compatibility/2006" xmlns:p14="http://schemas.microsoft.com/office/powerpoint/2010/main">
+    <mc:Choice Requires="p14">
+      <p:transition spd="med" p14:dur="700">
+        <p:fade/>
+      </p:transition>
+    </mc:Choice>
+    <mc:Fallback xmlns="">
+      <p:transition spd="med">
+        <p:fade/>
+      </p:transition>
+    </mc:Fallback>
+  </mc:AlternateContent>
+  <p:timing>
+    <p:tnLst>
+      <p:par>
+        <p:cTn id="1" dur="indefinite" restart="never" nodeType="tmRoot"/>
+      </p:par>
+    </p:tnLst>
+  </p:timing>
+</p:sld>
+</file>
+
+<file path=ppt/slides/slide23.xml><?xml version="1.0" encoding="utf-8"?>
 <p:sld xmlns:a="http://schemas.openxmlformats.org/drawingml/2006/main" xmlns:r="http://schemas.openxmlformats.org/officeDocument/2006/relationships" xmlns:p="http://schemas.openxmlformats.org/presentationml/2006/main">
   <p:cSld>
     <p:spTree>
@@ -10543,7 +11386,7 @@
 </p:sld>
 </file>
 
-<file path=ppt/slides/slide18.xml><?xml version="1.0" encoding="utf-8"?>
+<file path=ppt/slides/slide24.xml><?xml version="1.0" encoding="utf-8"?>
 <p:sld xmlns:a="http://schemas.openxmlformats.org/drawingml/2006/main" xmlns:r="http://schemas.openxmlformats.org/officeDocument/2006/relationships" xmlns:p="http://schemas.openxmlformats.org/presentationml/2006/main">
   <p:cSld>
     <p:spTree>
@@ -11135,7 +11978,7 @@
 </p:sld>
 </file>
 
-<file path=ppt/slides/slide19.xml><?xml version="1.0" encoding="utf-8"?>
+<file path=ppt/slides/slide25.xml><?xml version="1.0" encoding="utf-8"?>
 <p:sld xmlns:a="http://schemas.openxmlformats.org/drawingml/2006/main" xmlns:r="http://schemas.openxmlformats.org/officeDocument/2006/relationships" xmlns:p="http://schemas.openxmlformats.org/presentationml/2006/main">
   <p:cSld>
     <p:spTree>
@@ -11289,91 +12132,7 @@
 </p:sld>
 </file>
 
-<file path=ppt/slides/slide2.xml><?xml version="1.0" encoding="utf-8"?>
-<p:sld xmlns:a="http://schemas.openxmlformats.org/drawingml/2006/main" xmlns:r="http://schemas.openxmlformats.org/officeDocument/2006/relationships" xmlns:p="http://schemas.openxmlformats.org/presentationml/2006/main">
-  <p:cSld>
-    <p:spTree>
-      <p:nvGrpSpPr>
-        <p:cNvPr id="1" name=""/>
-        <p:cNvGrpSpPr/>
-        <p:nvPr/>
-      </p:nvGrpSpPr>
-      <p:grpSpPr>
-        <a:xfrm>
-          <a:off x="0" y="0"/>
-          <a:ext cx="0" cy="0"/>
-          <a:chOff x="0" y="0"/>
-          <a:chExt cx="0" cy="0"/>
-        </a:xfrm>
-      </p:grpSpPr>
-      <p:sp>
-        <p:nvSpPr>
-          <p:cNvPr id="2" name="Título 1"/>
-          <p:cNvSpPr>
-            <a:spLocks noGrp="1"/>
-          </p:cNvSpPr>
-          <p:nvPr>
-            <p:ph type="title"/>
-          </p:nvPr>
-        </p:nvSpPr>
-        <p:spPr/>
-        <p:txBody>
-          <a:bodyPr/>
-          <a:lstStyle/>
-          <a:p>
-            <a:r>
-              <a:rPr lang="es-419" dirty="0" smtClean="0"/>
-              <a:t>Introducción</a:t>
-            </a:r>
-            <a:endParaRPr lang="es-ES" dirty="0"/>
-          </a:p>
-        </p:txBody>
-      </p:sp>
-      <p:sp>
-        <p:nvSpPr>
-          <p:cNvPr id="3" name="Marcador de contenido 2"/>
-          <p:cNvSpPr>
-            <a:spLocks noGrp="1"/>
-          </p:cNvSpPr>
-          <p:nvPr>
-            <p:ph idx="1"/>
-          </p:nvPr>
-        </p:nvSpPr>
-        <p:spPr/>
-        <p:txBody>
-          <a:bodyPr/>
-          <a:lstStyle/>
-          <a:p>
-            <a:endParaRPr lang="es-ES"/>
-          </a:p>
-        </p:txBody>
-      </p:sp>
-    </p:spTree>
-    <p:extLst>
-      <p:ext uri="{BB962C8B-B14F-4D97-AF65-F5344CB8AC3E}">
-        <p14:creationId xmlns:p14="http://schemas.microsoft.com/office/powerpoint/2010/main" val="636728386"/>
-      </p:ext>
-    </p:extLst>
-  </p:cSld>
-  <p:clrMapOvr>
-    <a:masterClrMapping/>
-  </p:clrMapOvr>
-  <mc:AlternateContent xmlns:mc="http://schemas.openxmlformats.org/markup-compatibility/2006" xmlns:p14="http://schemas.microsoft.com/office/powerpoint/2010/main">
-    <mc:Choice Requires="p14">
-      <p:transition spd="med" p14:dur="700">
-        <p:fade/>
-      </p:transition>
-    </mc:Choice>
-    <mc:Fallback xmlns="">
-      <p:transition spd="med">
-        <p:fade/>
-      </p:transition>
-    </mc:Fallback>
-  </mc:AlternateContent>
-</p:sld>
-</file>
-
-<file path=ppt/slides/slide20.xml><?xml version="1.0" encoding="utf-8"?>
+<file path=ppt/slides/slide26.xml><?xml version="1.0" encoding="utf-8"?>
 <p:sld xmlns:a="http://schemas.openxmlformats.org/drawingml/2006/main" xmlns:r="http://schemas.openxmlformats.org/officeDocument/2006/relationships" xmlns:p="http://schemas.openxmlformats.org/presentationml/2006/main">
   <p:cSld>
     <p:spTree>
@@ -11451,20 +12210,8 @@
               <a:buChar char="•"/>
             </a:pPr>
             <a:r>
-              <a:rPr lang="es-ES" dirty="0" err="1"/>
-              <a:t>MySQL</a:t>
-            </a:r>
-            <a:r>
               <a:rPr lang="es-ES" dirty="0"/>
-              <a:t> </a:t>
-            </a:r>
-            <a:r>
-              <a:rPr lang="es-ES" dirty="0" err="1"/>
-              <a:t>Workbench</a:t>
-            </a:r>
-            <a:r>
-              <a:rPr lang="es-ES" dirty="0"/>
-              <a:t> </a:t>
+              <a:t>MySQL Workbench </a:t>
             </a:r>
             <a:r>
               <a:rPr lang="es-ES" dirty="0" smtClean="0"/>
@@ -11477,20 +12224,8 @@
               <a:buChar char="•"/>
             </a:pPr>
             <a:r>
-              <a:rPr lang="es-419" dirty="0" err="1" smtClean="0"/>
-              <a:t>Git</a:t>
-            </a:r>
-            <a:r>
               <a:rPr lang="es-419" dirty="0" smtClean="0"/>
-              <a:t> y </a:t>
-            </a:r>
-            <a:r>
-              <a:rPr lang="es-419" dirty="0" err="1" smtClean="0"/>
-              <a:t>github</a:t>
-            </a:r>
-            <a:r>
-              <a:rPr lang="es-419" dirty="0" smtClean="0"/>
-              <a:t>: Se utilizó esta herramienta para el manejo de versiones y para resguardo del repositorio.</a:t>
+              <a:t>Git y github: Se utilizó esta herramienta para el manejo de versiones y para resguardo del repositorio.</a:t>
             </a:r>
           </a:p>
           <a:p>
@@ -12040,8 +12775,8 @@
         </p:nvSpPr>
         <p:spPr>
           <a:xfrm>
-            <a:off x="261764" y="2852936"/>
-            <a:ext cx="10360501" cy="1223963"/>
+            <a:off x="2494012" y="1196752"/>
+            <a:ext cx="8938472" cy="2764335"/>
           </a:xfrm>
         </p:spPr>
         <p:txBody>
@@ -12053,25 +12788,6 @@
               <a:t>Diagrama entidad - relación</a:t>
             </a:r>
             <a:endParaRPr lang="es-ES" dirty="0"/>
-          </a:p>
-        </p:txBody>
-      </p:sp>
-      <p:sp>
-        <p:nvSpPr>
-          <p:cNvPr id="2" name="Marcador de contenido 1"/>
-          <p:cNvSpPr>
-            <a:spLocks noGrp="1"/>
-          </p:cNvSpPr>
-          <p:nvPr>
-            <p:ph idx="1"/>
-          </p:nvPr>
-        </p:nvSpPr>
-        <p:spPr/>
-        <p:txBody>
-          <a:bodyPr/>
-          <a:lstStyle/>
-          <a:p>
-            <a:endParaRPr lang="es-ES"/>
           </a:p>
         </p:txBody>
       </p:sp>
@@ -12124,6 +12840,103 @@
             <a:spLocks noGrp="1"/>
           </p:cNvSpPr>
           <p:nvPr>
+            <p:ph type="title"/>
+          </p:nvPr>
+        </p:nvSpPr>
+        <p:spPr/>
+        <p:txBody>
+          <a:bodyPr/>
+          <a:lstStyle/>
+          <a:p>
+            <a:endParaRPr lang="es-ES"/>
+          </a:p>
+        </p:txBody>
+      </p:sp>
+      <p:pic>
+        <p:nvPicPr>
+          <p:cNvPr id="4" name="Marcador de contenido 3"/>
+          <p:cNvPicPr>
+            <a:picLocks noGrp="1" noChangeAspect="1"/>
+          </p:cNvPicPr>
+          <p:nvPr>
+            <p:ph idx="1"/>
+          </p:nvPr>
+        </p:nvPicPr>
+        <p:blipFill>
+          <a:blip r:embed="rId2" cstate="print">
+            <a:extLst>
+              <a:ext uri="{28A0092B-C50C-407E-A947-70E740481C1C}">
+                <a14:useLocalDpi xmlns:a14="http://schemas.microsoft.com/office/drawing/2010/main" val="0"/>
+              </a:ext>
+            </a:extLst>
+          </a:blip>
+          <a:stretch>
+            <a:fillRect/>
+          </a:stretch>
+        </p:blipFill>
+        <p:spPr>
+          <a:xfrm>
+            <a:off x="621804" y="103951"/>
+            <a:ext cx="10957580" cy="6493401"/>
+          </a:xfrm>
+        </p:spPr>
+      </p:pic>
+    </p:spTree>
+    <p:extLst>
+      <p:ext uri="{BB962C8B-B14F-4D97-AF65-F5344CB8AC3E}">
+        <p14:creationId xmlns:p14="http://schemas.microsoft.com/office/powerpoint/2010/main" val="3281273895"/>
+      </p:ext>
+    </p:extLst>
+  </p:cSld>
+  <p:clrMapOvr>
+    <a:masterClrMapping/>
+  </p:clrMapOvr>
+  <mc:AlternateContent xmlns:mc="http://schemas.openxmlformats.org/markup-compatibility/2006" xmlns:p14="http://schemas.microsoft.com/office/powerpoint/2010/main">
+    <mc:Choice Requires="p14">
+      <p:transition spd="med" p14:dur="700">
+        <p:fade/>
+      </p:transition>
+    </mc:Choice>
+    <mc:Fallback xmlns="">
+      <p:transition spd="med">
+        <p:fade/>
+      </p:transition>
+    </mc:Fallback>
+  </mc:AlternateContent>
+  <p:timing>
+    <p:tnLst>
+      <p:par>
+        <p:cTn id="1" dur="indefinite" restart="never" nodeType="tmRoot"/>
+      </p:par>
+    </p:tnLst>
+  </p:timing>
+</p:sld>
+</file>
+
+<file path=ppt/slides/slide8.xml><?xml version="1.0" encoding="utf-8"?>
+<p:sld xmlns:a="http://schemas.openxmlformats.org/drawingml/2006/main" xmlns:r="http://schemas.openxmlformats.org/officeDocument/2006/relationships" xmlns:p="http://schemas.openxmlformats.org/presentationml/2006/main">
+  <p:cSld>
+    <p:spTree>
+      <p:nvGrpSpPr>
+        <p:cNvPr id="1" name=""/>
+        <p:cNvGrpSpPr/>
+        <p:nvPr/>
+      </p:nvGrpSpPr>
+      <p:grpSpPr>
+        <a:xfrm>
+          <a:off x="0" y="0"/>
+          <a:ext cx="0" cy="0"/>
+          <a:chOff x="0" y="0"/>
+          <a:chExt cx="0" cy="0"/>
+        </a:xfrm>
+      </p:grpSpPr>
+      <p:sp>
+        <p:nvSpPr>
+          <p:cNvPr id="2" name="Título 1"/>
+          <p:cNvSpPr>
+            <a:spLocks noGrp="1"/>
+          </p:cNvSpPr>
+          <p:nvPr>
             <p:ph type="ctrTitle"/>
           </p:nvPr>
         </p:nvSpPr>
@@ -12167,10 +12980,17 @@
       </p:transition>
     </mc:Fallback>
   </mc:AlternateContent>
+  <p:timing>
+    <p:tnLst>
+      <p:par>
+        <p:cTn id="1" dur="indefinite" restart="never" nodeType="tmRoot"/>
+      </p:par>
+    </p:tnLst>
+  </p:timing>
 </p:sld>
 </file>
 
-<file path=ppt/slides/slide8.xml><?xml version="1.0" encoding="utf-8"?>
+<file path=ppt/slides/slide9.xml><?xml version="1.0" encoding="utf-8"?>
 <p:sld xmlns:a="http://schemas.openxmlformats.org/drawingml/2006/main" xmlns:r="http://schemas.openxmlformats.org/officeDocument/2006/relationships" xmlns:p="http://schemas.openxmlformats.org/presentationml/2006/main">
   <p:cSld>
     <p:spTree>
@@ -12209,7 +13029,7 @@
           <a:p>
             <a:r>
               <a:rPr lang="es-419" dirty="0" smtClean="0"/>
-              <a:t>Cliente</a:t>
+              <a:t>PAIS</a:t>
             </a:r>
             <a:endParaRPr lang="es-ES" dirty="0"/>
           </a:p>
@@ -12237,7 +13057,7 @@
           <a:p>
             <a:r>
               <a:rPr lang="es-ES" dirty="0"/>
-              <a:t>Esta tabla esta creada para guardar toda la información relevante del cliente.</a:t>
+              <a:t>Esta tabla esta creada para indicar el país de las partes interesadas (cliente, proveedor, etc.)</a:t>
             </a:r>
           </a:p>
           <a:p>
@@ -12247,7 +13067,7 @@
       </p:sp>
       <p:pic>
         <p:nvPicPr>
-          <p:cNvPr id="7" name="Imagen 6"/>
+          <p:cNvPr id="5" name="Imagen 4"/>
           <p:cNvPicPr>
             <a:picLocks noChangeAspect="1"/>
           </p:cNvPicPr>
@@ -12261,8 +13081,8 @@
         </p:blipFill>
         <p:spPr>
           <a:xfrm>
-            <a:off x="5446340" y="1268760"/>
-            <a:ext cx="5886450" cy="4095750"/>
+            <a:off x="5590356" y="2301056"/>
+            <a:ext cx="5962650" cy="1247775"/>
           </a:xfrm>
           <a:prstGeom prst="rect">
             <a:avLst/>
@@ -12273,132 +13093,6 @@
     <p:extLst>
       <p:ext uri="{BB962C8B-B14F-4D97-AF65-F5344CB8AC3E}">
         <p14:creationId xmlns:p14="http://schemas.microsoft.com/office/powerpoint/2010/main" val="2857499387"/>
-      </p:ext>
-    </p:extLst>
-  </p:cSld>
-  <p:clrMapOvr>
-    <a:masterClrMapping/>
-  </p:clrMapOvr>
-  <mc:AlternateContent xmlns:mc="http://schemas.openxmlformats.org/markup-compatibility/2006" xmlns:p14="http://schemas.microsoft.com/office/powerpoint/2010/main">
-    <mc:Choice Requires="p14">
-      <p:transition spd="med" p14:dur="700">
-        <p:fade/>
-      </p:transition>
-    </mc:Choice>
-    <mc:Fallback xmlns="">
-      <p:transition spd="med">
-        <p:fade/>
-      </p:transition>
-    </mc:Fallback>
-  </mc:AlternateContent>
-</p:sld>
-</file>
-
-<file path=ppt/slides/slide9.xml><?xml version="1.0" encoding="utf-8"?>
-<p:sld xmlns:a="http://schemas.openxmlformats.org/drawingml/2006/main" xmlns:r="http://schemas.openxmlformats.org/officeDocument/2006/relationships" xmlns:p="http://schemas.openxmlformats.org/presentationml/2006/main">
-  <p:cSld>
-    <p:spTree>
-      <p:nvGrpSpPr>
-        <p:cNvPr id="1" name=""/>
-        <p:cNvGrpSpPr/>
-        <p:nvPr/>
-      </p:nvGrpSpPr>
-      <p:grpSpPr>
-        <a:xfrm>
-          <a:off x="0" y="0"/>
-          <a:ext cx="0" cy="0"/>
-          <a:chOff x="0" y="0"/>
-          <a:chExt cx="0" cy="0"/>
-        </a:xfrm>
-      </p:grpSpPr>
-      <p:sp>
-        <p:nvSpPr>
-          <p:cNvPr id="2" name="Título 1"/>
-          <p:cNvSpPr>
-            <a:spLocks noGrp="1"/>
-          </p:cNvSpPr>
-          <p:nvPr>
-            <p:ph type="title"/>
-          </p:nvPr>
-        </p:nvSpPr>
-        <p:spPr>
-          <a:xfrm>
-            <a:off x="1218882" y="1701800"/>
-            <a:ext cx="4062942" cy="791096"/>
-          </a:xfrm>
-        </p:spPr>
-        <p:txBody>
-          <a:bodyPr/>
-          <a:lstStyle/>
-          <a:p>
-            <a:r>
-              <a:rPr lang="es-419" dirty="0" smtClean="0"/>
-              <a:t>pedido</a:t>
-            </a:r>
-            <a:endParaRPr lang="es-ES" dirty="0"/>
-          </a:p>
-        </p:txBody>
-      </p:sp>
-      <p:sp>
-        <p:nvSpPr>
-          <p:cNvPr id="3" name="Marcador de texto 2"/>
-          <p:cNvSpPr>
-            <a:spLocks noGrp="1"/>
-          </p:cNvSpPr>
-          <p:nvPr>
-            <p:ph type="body" sz="half" idx="2"/>
-          </p:nvPr>
-        </p:nvSpPr>
-        <p:spPr>
-          <a:xfrm>
-            <a:off x="1247196" y="2852936"/>
-            <a:ext cx="4062942" cy="1930400"/>
-          </a:xfrm>
-        </p:spPr>
-        <p:txBody>
-          <a:bodyPr/>
-          <a:lstStyle/>
-          <a:p>
-            <a:r>
-              <a:rPr lang="es-ES" dirty="0"/>
-              <a:t>Esta tabla esta creada para guardar toda la información de los pedidos realizados por los clientes.</a:t>
-            </a:r>
-          </a:p>
-          <a:p>
-            <a:endParaRPr lang="es-ES" dirty="0"/>
-          </a:p>
-        </p:txBody>
-      </p:sp>
-      <p:pic>
-        <p:nvPicPr>
-          <p:cNvPr id="5" name="Marcador de contenido 4"/>
-          <p:cNvPicPr>
-            <a:picLocks noGrp="1" noChangeAspect="1"/>
-          </p:cNvPicPr>
-          <p:nvPr>
-            <p:ph idx="1"/>
-          </p:nvPr>
-        </p:nvPicPr>
-        <p:blipFill>
-          <a:blip r:embed="rId2"/>
-          <a:stretch>
-            <a:fillRect/>
-          </a:stretch>
-        </p:blipFill>
-        <p:spPr>
-          <a:xfrm>
-            <a:off x="5626894" y="2363787"/>
-            <a:ext cx="5810250" cy="2028825"/>
-          </a:xfrm>
-          <a:prstGeom prst="rect">
-            <a:avLst/>
-          </a:prstGeom>
-        </p:spPr>
-      </p:pic>
-    </p:spTree>
-    <p:extLst>
-      <p:ext uri="{BB962C8B-B14F-4D97-AF65-F5344CB8AC3E}">
-        <p14:creationId xmlns:p14="http://schemas.microsoft.com/office/powerpoint/2010/main" val="2904289431"/>
       </p:ext>
     </p:extLst>
   </p:cSld>
@@ -13371,15 +14065,6 @@
 </file>
 
 <file path=customXml/item1.xml><?xml version="1.0" encoding="utf-8"?>
-<?mso-contentType ?>
-<FormTemplates xmlns="http://schemas.microsoft.com/sharepoint/v3/contenttype/forms">
-  <Display>DocumentLibraryForm</Display>
-  <Edit>AssetEditForm</Edit>
-  <New>DocumentLibraryForm</New>
-</FormTemplates>
-</file>
-
-<file path=customXml/item2.xml><?xml version="1.0" encoding="utf-8"?>
 <ct:contentTypeSchema xmlns:ct="http://schemas.microsoft.com/office/2006/metadata/contentType" xmlns:ma="http://schemas.microsoft.com/office/2006/metadata/properties/metaAttributes" ct:_="" ma:_="" ma:contentTypeName="TemplateFile" ma:contentTypeID="0x0101006EDDDB5EE6D98C44930B742096920B300400F5B6D36B3EF94B4E9A635CDF2A18F5B8" ma:contentTypeVersion="72" ma:contentTypeDescription="Create a new document." ma:contentTypeScope="" ma:versionID="a23e56308344d904b51738559c3d67c9">
   <xsd:schema xmlns:xsd="http://www.w3.org/2001/XMLSchema" xmlns:xs="http://www.w3.org/2001/XMLSchema" xmlns:p="http://schemas.microsoft.com/office/2006/metadata/properties" xmlns:ns2="4873beb7-5857-4685-be1f-d57550cc96cc" targetNamespace="http://schemas.microsoft.com/office/2006/metadata/properties" ma:root="true" ma:fieldsID="cd0908cc4600e77bf5da051303e00c8d" ns2:_="">
     <xsd:import namespace="4873beb7-5857-4685-be1f-d57550cc96cc"/>
@@ -14419,6 +15104,15 @@
 </ct:contentTypeSchema>
 </file>
 
+<file path=customXml/item2.xml><?xml version="1.0" encoding="utf-8"?>
+<?mso-contentType ?>
+<FormTemplates xmlns="http://schemas.microsoft.com/sharepoint/v3/contenttype/forms">
+  <Display>DocumentLibraryForm</Display>
+  <Edit>AssetEditForm</Edit>
+  <New>DocumentLibraryForm</New>
+</FormTemplates>
+</file>
+
 <file path=customXml/item3.xml><?xml version="1.0" encoding="utf-8"?>
 <p:properties xmlns:p="http://schemas.microsoft.com/office/2006/metadata/properties" xmlns:xsi="http://www.w3.org/2001/XMLSchema-instance" xmlns:pc="http://schemas.microsoft.com/office/infopath/2007/PartnerControls">
   <documentManagement>
@@ -14556,14 +15250,6 @@
 </file>
 
 <file path=customXml/itemProps1.xml><?xml version="1.0" encoding="utf-8"?>
-<ds:datastoreItem xmlns:ds="http://schemas.openxmlformats.org/officeDocument/2006/customXml" ds:itemID="{3836F65B-1B07-41EE-A0E8-BC6EF3855225}">
-  <ds:schemaRefs>
-    <ds:schemaRef ds:uri="http://schemas.microsoft.com/sharepoint/v3/contenttype/forms"/>
-  </ds:schemaRefs>
-</ds:datastoreItem>
-</file>
-
-<file path=customXml/itemProps2.xml><?xml version="1.0" encoding="utf-8"?>
 <ds:datastoreItem xmlns:ds="http://schemas.openxmlformats.org/officeDocument/2006/customXml" ds:itemID="{A09BF4D4-EF60-4196-BFC3-9462D607978C}">
   <ds:schemaRefs>
     <ds:schemaRef ds:uri="http://schemas.microsoft.com/office/2006/metadata/contentType"/>
@@ -14577,6 +15263,14 @@
     <ds:schemaRef ds:uri="http://purl.org/dc/elements/1.1/"/>
     <ds:schemaRef ds:uri="http://purl.org/dc/terms/"/>
     <ds:schemaRef ds:uri="http://schemas.microsoft.com/internal/obd"/>
+  </ds:schemaRefs>
+</ds:datastoreItem>
+</file>
+
+<file path=customXml/itemProps2.xml><?xml version="1.0" encoding="utf-8"?>
+<ds:datastoreItem xmlns:ds="http://schemas.openxmlformats.org/officeDocument/2006/customXml" ds:itemID="{3836F65B-1B07-41EE-A0E8-BC6EF3855225}">
+  <ds:schemaRefs>
+    <ds:schemaRef ds:uri="http://schemas.microsoft.com/sharepoint/v3/contenttype/forms"/>
   </ds:schemaRefs>
 </ds:datastoreItem>
 </file>

</xml_diff>

<commit_message>
Se agregan los scripts de creación de objetos y script de inserción de datos a la presentación
</commit_message>
<xml_diff>
--- a/EcommerceVideojuegos+HubertFerrer.pptx
+++ b/EcommerceVideojuegos+HubertFerrer.pptx
@@ -5,38 +5,39 @@
     <p:sldMasterId id="2147483660" r:id="rId4"/>
   </p:sldMasterIdLst>
   <p:notesMasterIdLst>
-    <p:notesMasterId r:id="rId31"/>
+    <p:notesMasterId r:id="rId32"/>
   </p:notesMasterIdLst>
   <p:handoutMasterIdLst>
-    <p:handoutMasterId r:id="rId32"/>
+    <p:handoutMasterId r:id="rId33"/>
   </p:handoutMasterIdLst>
   <p:sldIdLst>
     <p:sldId id="257" r:id="rId5"/>
     <p:sldId id="284" r:id="rId6"/>
     <p:sldId id="285" r:id="rId7"/>
-    <p:sldId id="286" r:id="rId8"/>
-    <p:sldId id="270" r:id="rId9"/>
-    <p:sldId id="271" r:id="rId10"/>
-    <p:sldId id="289" r:id="rId11"/>
-    <p:sldId id="272" r:id="rId12"/>
-    <p:sldId id="273" r:id="rId13"/>
-    <p:sldId id="292" r:id="rId14"/>
-    <p:sldId id="291" r:id="rId15"/>
-    <p:sldId id="274" r:id="rId16"/>
-    <p:sldId id="275" r:id="rId17"/>
-    <p:sldId id="276" r:id="rId18"/>
-    <p:sldId id="277" r:id="rId19"/>
-    <p:sldId id="293" r:id="rId20"/>
-    <p:sldId id="290" r:id="rId21"/>
-    <p:sldId id="278" r:id="rId22"/>
-    <p:sldId id="279" r:id="rId23"/>
-    <p:sldId id="281" r:id="rId24"/>
-    <p:sldId id="295" r:id="rId25"/>
-    <p:sldId id="296" r:id="rId26"/>
-    <p:sldId id="287" r:id="rId27"/>
-    <p:sldId id="283" r:id="rId28"/>
+    <p:sldId id="270" r:id="rId8"/>
+    <p:sldId id="271" r:id="rId9"/>
+    <p:sldId id="289" r:id="rId10"/>
+    <p:sldId id="272" r:id="rId11"/>
+    <p:sldId id="273" r:id="rId12"/>
+    <p:sldId id="292" r:id="rId13"/>
+    <p:sldId id="291" r:id="rId14"/>
+    <p:sldId id="274" r:id="rId15"/>
+    <p:sldId id="275" r:id="rId16"/>
+    <p:sldId id="276" r:id="rId17"/>
+    <p:sldId id="277" r:id="rId18"/>
+    <p:sldId id="293" r:id="rId19"/>
+    <p:sldId id="290" r:id="rId20"/>
+    <p:sldId id="278" r:id="rId21"/>
+    <p:sldId id="279" r:id="rId22"/>
+    <p:sldId id="281" r:id="rId23"/>
+    <p:sldId id="295" r:id="rId24"/>
+    <p:sldId id="296" r:id="rId25"/>
+    <p:sldId id="287" r:id="rId26"/>
+    <p:sldId id="283" r:id="rId27"/>
+    <p:sldId id="297" r:id="rId28"/>
     <p:sldId id="282" r:id="rId29"/>
-    <p:sldId id="288" r:id="rId30"/>
+    <p:sldId id="298" r:id="rId30"/>
+    <p:sldId id="288" r:id="rId31"/>
   </p:sldIdLst>
   <p:sldSz cx="12188825" cy="6858000"/>
   <p:notesSz cx="6858000" cy="9144000"/>
@@ -170,7 +171,7 @@
 
 <file path=ppt/commentAuthors.xml><?xml version="1.0" encoding="utf-8"?>
 <p:cmAuthorLst xmlns:a="http://schemas.openxmlformats.org/drawingml/2006/main" xmlns:r="http://schemas.openxmlformats.org/officeDocument/2006/relationships" xmlns:p="http://schemas.openxmlformats.org/presentationml/2006/main">
-  <p:cmAuthor id="1" name="Hubert Ferrer" initials="HF" lastIdx="2" clrIdx="0">
+  <p:cmAuthor id="1" name="Hubert Ferrer" initials="HF" lastIdx="12" clrIdx="0">
     <p:extLst>
       <p:ext uri="{19B8F6BF-5375-455C-9EA6-DF929625EA0E}">
         <p15:presenceInfo xmlns:p15="http://schemas.microsoft.com/office/powerpoint/2012/main" userId="Hubert Ferrer" providerId="None"/>
@@ -181,6 +182,116 @@
 </file>
 
 <file path=ppt/comments/comment1.xml><?xml version="1.0" encoding="utf-8"?>
+<p:cmLst xmlns:a="http://schemas.openxmlformats.org/drawingml/2006/main" xmlns:r="http://schemas.openxmlformats.org/officeDocument/2006/relationships" xmlns:p="http://schemas.openxmlformats.org/presentationml/2006/main">
+  <p:cm authorId="1" dt="2022-12-10T18:08:17.172" idx="3">
+    <p:pos x="5290" y="2760"/>
+    <p:text>Link a script unificado de toda la base de datos</p:text>
+    <p:extLst>
+      <p:ext uri="{C676402C-5697-4E1C-873F-D02D1690AC5C}">
+        <p15:threadingInfo xmlns:p15="http://schemas.microsoft.com/office/powerpoint/2012/main" timeZoneBias="180"/>
+      </p:ext>
+    </p:extLst>
+  </p:cm>
+</p:cmLst>
+</file>
+
+<file path=ppt/comments/comment2.xml><?xml version="1.0" encoding="utf-8"?>
+<p:cmLst xmlns:a="http://schemas.openxmlformats.org/drawingml/2006/main" xmlns:r="http://schemas.openxmlformats.org/officeDocument/2006/relationships" xmlns:p="http://schemas.openxmlformats.org/presentationml/2006/main">
+  <p:cm authorId="1" dt="2022-12-10T18:13:05.355" idx="4">
+    <p:pos x="2578" y="1797"/>
+    <p:text>Link a github - creación de tablas</p:text>
+    <p:extLst>
+      <p:ext uri="{C676402C-5697-4E1C-873F-D02D1690AC5C}">
+        <p15:threadingInfo xmlns:p15="http://schemas.microsoft.com/office/powerpoint/2012/main" timeZoneBias="180"/>
+      </p:ext>
+    </p:extLst>
+  </p:cm>
+  <p:cm authorId="1" dt="2022-12-10T18:13:16.926" idx="5">
+    <p:pos x="4882" y="1835"/>
+    <p:text>Link a github - creación de tablas vistas / informes</p:text>
+    <p:extLst>
+      <p:ext uri="{C676402C-5697-4E1C-873F-D02D1690AC5C}">
+        <p15:threadingInfo xmlns:p15="http://schemas.microsoft.com/office/powerpoint/2012/main" timeZoneBias="180"/>
+      </p:ext>
+    </p:extLst>
+  </p:cm>
+  <p:cm authorId="1" dt="2022-12-10T18:13:42.783" idx="6">
+    <p:pos x="7205" y="1835"/>
+    <p:text>Link a github - creación de funciones</p:text>
+    <p:extLst>
+      <p:ext uri="{C676402C-5697-4E1C-873F-D02D1690AC5C}">
+        <p15:threadingInfo xmlns:p15="http://schemas.microsoft.com/office/powerpoint/2012/main" timeZoneBias="180"/>
+      </p:ext>
+    </p:extLst>
+  </p:cm>
+  <p:cm authorId="1" dt="2022-12-10T18:13:55.173" idx="7">
+    <p:pos x="2982" y="3616"/>
+    <p:text>Link a github - creación de SPU</p:text>
+    <p:extLst>
+      <p:ext uri="{C676402C-5697-4E1C-873F-D02D1690AC5C}">
+        <p15:threadingInfo xmlns:p15="http://schemas.microsoft.com/office/powerpoint/2012/main" timeZoneBias="180"/>
+      </p:ext>
+    </p:extLst>
+  </p:cm>
+  <p:cm authorId="1" dt="2022-12-10T18:14:02.464" idx="8">
+    <p:pos x="5210" y="3583"/>
+    <p:text>Link a github - creación de triggers</p:text>
+    <p:extLst>
+      <p:ext uri="{C676402C-5697-4E1C-873F-D02D1690AC5C}">
+        <p15:threadingInfo xmlns:p15="http://schemas.microsoft.com/office/powerpoint/2012/main" timeZoneBias="180"/>
+      </p:ext>
+    </p:extLst>
+  </p:cm>
+  <p:cm authorId="1" dt="2022-12-10T18:14:09.361" idx="9">
+    <p:pos x="7124" y="3516"/>
+    <p:text>Link a github - creación de usuarios y brindar permisos</p:text>
+    <p:extLst>
+      <p:ext uri="{C676402C-5697-4E1C-873F-D02D1690AC5C}">
+        <p15:threadingInfo xmlns:p15="http://schemas.microsoft.com/office/powerpoint/2012/main" timeZoneBias="180"/>
+      </p:ext>
+    </p:extLst>
+  </p:cm>
+</p:cmLst>
+</file>
+
+<file path=ppt/comments/comment3.xml><?xml version="1.0" encoding="utf-8"?>
+<p:cmLst xmlns:a="http://schemas.openxmlformats.org/drawingml/2006/main" xmlns:r="http://schemas.openxmlformats.org/officeDocument/2006/relationships" xmlns:p="http://schemas.openxmlformats.org/presentationml/2006/main">
+  <p:cm authorId="1" dt="2022-12-10T18:15:02.219" idx="10">
+    <p:pos x="4837" y="1389"/>
+    <p:text>Link a github - manual de inserción de datos</p:text>
+    <p:extLst>
+      <p:ext uri="{C676402C-5697-4E1C-873F-D02D1690AC5C}">
+        <p15:threadingInfo xmlns:p15="http://schemas.microsoft.com/office/powerpoint/2012/main" timeZoneBias="180"/>
+      </p:ext>
+    </p:extLst>
+  </p:cm>
+</p:cmLst>
+</file>
+
+<file path=ppt/comments/comment4.xml><?xml version="1.0" encoding="utf-8"?>
+<p:cmLst xmlns:a="http://schemas.openxmlformats.org/drawingml/2006/main" xmlns:r="http://schemas.openxmlformats.org/officeDocument/2006/relationships" xmlns:p="http://schemas.openxmlformats.org/presentationml/2006/main">
+  <p:cm authorId="1" dt="2022-12-10T18:17:08.782" idx="11">
+    <p:pos x="3453" y="2251"/>
+    <p:text>Link a github - script de inserción de datos</p:text>
+    <p:extLst>
+      <p:ext uri="{C676402C-5697-4E1C-873F-D02D1690AC5C}">
+        <p15:threadingInfo xmlns:p15="http://schemas.microsoft.com/office/powerpoint/2012/main" timeZoneBias="180"/>
+      </p:ext>
+    </p:extLst>
+  </p:cm>
+  <p:cm authorId="1" dt="2022-12-10T18:17:21.306" idx="12">
+    <p:pos x="5960" y="2251"/>
+    <p:text>Link a github - archivos csv importados</p:text>
+    <p:extLst>
+      <p:ext uri="{C676402C-5697-4E1C-873F-D02D1690AC5C}">
+        <p15:threadingInfo xmlns:p15="http://schemas.microsoft.com/office/powerpoint/2012/main" timeZoneBias="180"/>
+      </p:ext>
+    </p:extLst>
+  </p:cm>
+</p:cmLst>
+</file>
+
+<file path=ppt/comments/comment5.xml><?xml version="1.0" encoding="utf-8"?>
 <p:cmLst xmlns:a="http://schemas.openxmlformats.org/drawingml/2006/main" xmlns:r="http://schemas.openxmlformats.org/officeDocument/2006/relationships" xmlns:p="http://schemas.openxmlformats.org/presentationml/2006/main">
   <p:cm authorId="1" dt="2022-12-08T19:20:43.819" idx="1">
     <p:pos x="5027" y="2205"/>
@@ -4887,7 +4998,7 @@
             <a:pPr rtl="0"/>
             <a:fld id="{3EBA5BD7-F043-4D1B-AA17-CD412FC534DE}" type="slidenum">
               <a:rPr lang="es-ES" smtClean="0"/>
-              <a:t>5</a:t>
+              <a:t>4</a:t>
             </a:fld>
             <a:endParaRPr lang="es-ES" dirty="0"/>
           </a:p>
@@ -9600,7 +9711,7 @@
           <a:p>
             <a:r>
               <a:rPr lang="es-419" dirty="0" smtClean="0"/>
-              <a:t>CIUDAD</a:t>
+              <a:t>Cliente</a:t>
             </a:r>
             <a:endParaRPr lang="es-ES" dirty="0"/>
           </a:p>
@@ -9628,7 +9739,7 @@
           <a:p>
             <a:r>
               <a:rPr lang="es-ES" dirty="0"/>
-              <a:t>Esta tabla esta creada para indicar la ciudad de las partes interesadas (cliente, proveedor, etc.)</a:t>
+              <a:t>Esta tabla esta creada para guardar toda la información relevante del cliente.</a:t>
             </a:r>
           </a:p>
           <a:p>
@@ -9652,8 +9763,8 @@
         </p:blipFill>
         <p:spPr>
           <a:xfrm>
-            <a:off x="5590356" y="2097348"/>
-            <a:ext cx="5934075" cy="1838325"/>
+            <a:off x="5518348" y="1340768"/>
+            <a:ext cx="5962650" cy="4010025"/>
           </a:xfrm>
           <a:prstGeom prst="rect">
             <a:avLst/>
@@ -9663,7 +9774,7 @@
     </p:spTree>
     <p:extLst>
       <p:ext uri="{BB962C8B-B14F-4D97-AF65-F5344CB8AC3E}">
-        <p14:creationId xmlns:p14="http://schemas.microsoft.com/office/powerpoint/2010/main" val="3969985584"/>
+        <p14:creationId xmlns:p14="http://schemas.microsoft.com/office/powerpoint/2010/main" val="1467829569"/>
       </p:ext>
     </p:extLst>
   </p:cSld>
@@ -9704,7 +9815,7 @@
       </p:grpSpPr>
       <p:sp>
         <p:nvSpPr>
-          <p:cNvPr id="4" name="Título 3"/>
+          <p:cNvPr id="2" name="Título 1"/>
           <p:cNvSpPr>
             <a:spLocks noGrp="1"/>
           </p:cNvSpPr>
@@ -9724,7 +9835,7 @@
           <a:p>
             <a:r>
               <a:rPr lang="es-419" dirty="0" smtClean="0"/>
-              <a:t>Cliente</a:t>
+              <a:t>pedido</a:t>
             </a:r>
             <a:endParaRPr lang="es-ES" dirty="0"/>
           </a:p>
@@ -9732,7 +9843,7 @@
       </p:sp>
       <p:sp>
         <p:nvSpPr>
-          <p:cNvPr id="6" name="Marcador de texto 5"/>
+          <p:cNvPr id="3" name="Marcador de texto 2"/>
           <p:cNvSpPr>
             <a:spLocks noGrp="1"/>
           </p:cNvSpPr>
@@ -9742,7 +9853,7 @@
         </p:nvSpPr>
         <p:spPr>
           <a:xfrm>
-            <a:off x="1125860" y="2924944"/>
+            <a:off x="1247196" y="2852936"/>
             <a:ext cx="4062942" cy="1930400"/>
           </a:xfrm>
         </p:spPr>
@@ -9752,7 +9863,7 @@
           <a:p>
             <a:r>
               <a:rPr lang="es-ES" dirty="0"/>
-              <a:t>Esta tabla esta creada para guardar toda la información relevante del cliente.</a:t>
+              <a:t>Esta tabla esta creada para guardar toda la información de los pedidos realizados por los clientes.</a:t>
             </a:r>
           </a:p>
           <a:p>
@@ -9762,11 +9873,13 @@
       </p:sp>
       <p:pic>
         <p:nvPicPr>
-          <p:cNvPr id="2" name="Imagen 1"/>
+          <p:cNvPr id="5" name="Marcador de contenido 4"/>
           <p:cNvPicPr>
-            <a:picLocks noChangeAspect="1"/>
+            <a:picLocks noGrp="1" noChangeAspect="1"/>
           </p:cNvPicPr>
-          <p:nvPr/>
+          <p:nvPr>
+            <p:ph idx="1"/>
+          </p:nvPr>
         </p:nvPicPr>
         <p:blipFill>
           <a:blip r:embed="rId2"/>
@@ -9776,8 +9889,8 @@
         </p:blipFill>
         <p:spPr>
           <a:xfrm>
-            <a:off x="5518348" y="1340768"/>
-            <a:ext cx="5962650" cy="4010025"/>
+            <a:off x="5626894" y="2363787"/>
+            <a:ext cx="5810250" cy="2028825"/>
           </a:xfrm>
           <a:prstGeom prst="rect">
             <a:avLst/>
@@ -9787,7 +9900,7 @@
     </p:spTree>
     <p:extLst>
       <p:ext uri="{BB962C8B-B14F-4D97-AF65-F5344CB8AC3E}">
-        <p14:creationId xmlns:p14="http://schemas.microsoft.com/office/powerpoint/2010/main" val="1467829569"/>
+        <p14:creationId xmlns:p14="http://schemas.microsoft.com/office/powerpoint/2010/main" val="2904289431"/>
       </p:ext>
     </p:extLst>
   </p:cSld>
@@ -9848,7 +9961,7 @@
           <a:p>
             <a:r>
               <a:rPr lang="es-419" dirty="0" smtClean="0"/>
-              <a:t>pedido</a:t>
+              <a:t>ENVIO</a:t>
             </a:r>
             <a:endParaRPr lang="es-ES" dirty="0"/>
           </a:p>
@@ -9876,7 +9989,7 @@
           <a:p>
             <a:r>
               <a:rPr lang="es-ES" dirty="0"/>
-              <a:t>Esta tabla esta creada para guardar toda la información de los pedidos realizados por los clientes.</a:t>
+              <a:t>Esta tabla esta creada para guardar toda la información de los envíos que se deben hacer en el ecommerce.</a:t>
             </a:r>
           </a:p>
           <a:p>
@@ -9886,7 +9999,7 @@
       </p:sp>
       <p:pic>
         <p:nvPicPr>
-          <p:cNvPr id="5" name="Marcador de contenido 4"/>
+          <p:cNvPr id="6" name="Marcador de contenido 5"/>
           <p:cNvPicPr>
             <a:picLocks noGrp="1" noChangeAspect="1"/>
           </p:cNvPicPr>
@@ -9902,8 +10015,8 @@
         </p:blipFill>
         <p:spPr>
           <a:xfrm>
-            <a:off x="5626894" y="2363787"/>
-            <a:ext cx="5810250" cy="2028825"/>
+            <a:off x="5367641" y="2276873"/>
+            <a:ext cx="6079028" cy="2115740"/>
           </a:xfrm>
           <a:prstGeom prst="rect">
             <a:avLst/>
@@ -9913,7 +10026,7 @@
     </p:spTree>
     <p:extLst>
       <p:ext uri="{BB962C8B-B14F-4D97-AF65-F5344CB8AC3E}">
-        <p14:creationId xmlns:p14="http://schemas.microsoft.com/office/powerpoint/2010/main" val="2904289431"/>
+        <p14:creationId xmlns:p14="http://schemas.microsoft.com/office/powerpoint/2010/main" val="2151429548"/>
       </p:ext>
     </p:extLst>
   </p:cSld>
@@ -9974,7 +10087,7 @@
           <a:p>
             <a:r>
               <a:rPr lang="es-419" dirty="0" smtClean="0"/>
-              <a:t>ENVIO</a:t>
+              <a:t>producto</a:t>
             </a:r>
             <a:endParaRPr lang="es-ES" dirty="0"/>
           </a:p>
@@ -10002,7 +10115,7 @@
           <a:p>
             <a:r>
               <a:rPr lang="es-ES" dirty="0"/>
-              <a:t>Esta tabla esta creada para guardar toda la información de los envíos que se deben hacer en el ecommerce.</a:t>
+              <a:t>Esta tabla esta creada para guardar toda la información del listado de productos a la venta.</a:t>
             </a:r>
           </a:p>
           <a:p>
@@ -10012,13 +10125,11 @@
       </p:sp>
       <p:pic>
         <p:nvPicPr>
-          <p:cNvPr id="6" name="Marcador de contenido 5"/>
+          <p:cNvPr id="6" name="Imagen 5"/>
           <p:cNvPicPr>
-            <a:picLocks noGrp="1" noChangeAspect="1"/>
+            <a:picLocks noChangeAspect="1"/>
           </p:cNvPicPr>
-          <p:nvPr>
-            <p:ph idx="1"/>
-          </p:nvPr>
+          <p:nvPr/>
         </p:nvPicPr>
         <p:blipFill>
           <a:blip r:embed="rId2"/>
@@ -10028,8 +10139,8 @@
         </p:blipFill>
         <p:spPr>
           <a:xfrm>
-            <a:off x="5367641" y="2276873"/>
-            <a:ext cx="6079028" cy="2115740"/>
+            <a:off x="5806380" y="1844824"/>
+            <a:ext cx="5867400" cy="2762250"/>
           </a:xfrm>
           <a:prstGeom prst="rect">
             <a:avLst/>
@@ -10039,7 +10150,7 @@
     </p:spTree>
     <p:extLst>
       <p:ext uri="{BB962C8B-B14F-4D97-AF65-F5344CB8AC3E}">
-        <p14:creationId xmlns:p14="http://schemas.microsoft.com/office/powerpoint/2010/main" val="2151429548"/>
+        <p14:creationId xmlns:p14="http://schemas.microsoft.com/office/powerpoint/2010/main" val="952908357"/>
       </p:ext>
     </p:extLst>
   </p:cSld>
@@ -10100,7 +10211,7 @@
           <a:p>
             <a:r>
               <a:rPr lang="es-419" dirty="0" smtClean="0"/>
-              <a:t>producto</a:t>
+              <a:t>categoria</a:t>
             </a:r>
             <a:endParaRPr lang="es-ES" dirty="0"/>
           </a:p>
@@ -10128,7 +10239,7 @@
           <a:p>
             <a:r>
               <a:rPr lang="es-ES" dirty="0"/>
-              <a:t>Esta tabla esta creada para guardar toda la información del listado de productos a la venta.</a:t>
+              <a:t>Esta tabla esta creada para categorizar los productos del ecommerce.</a:t>
             </a:r>
           </a:p>
           <a:p>
@@ -10138,11 +10249,13 @@
       </p:sp>
       <p:pic>
         <p:nvPicPr>
-          <p:cNvPr id="6" name="Imagen 5"/>
+          <p:cNvPr id="6" name="Marcador de contenido 5"/>
           <p:cNvPicPr>
-            <a:picLocks noChangeAspect="1"/>
+            <a:picLocks noGrp="1" noChangeAspect="1"/>
           </p:cNvPicPr>
-          <p:nvPr/>
+          <p:nvPr>
+            <p:ph idx="1"/>
+          </p:nvPr>
         </p:nvPicPr>
         <p:blipFill>
           <a:blip r:embed="rId2"/>
@@ -10152,8 +10265,8 @@
         </p:blipFill>
         <p:spPr>
           <a:xfrm>
-            <a:off x="5806380" y="1844824"/>
-            <a:ext cx="5867400" cy="2762250"/>
+            <a:off x="4942284" y="2636912"/>
+            <a:ext cx="6748969" cy="1308025"/>
           </a:xfrm>
           <a:prstGeom prst="rect">
             <a:avLst/>
@@ -10163,7 +10276,7 @@
     </p:spTree>
     <p:extLst>
       <p:ext uri="{BB962C8B-B14F-4D97-AF65-F5344CB8AC3E}">
-        <p14:creationId xmlns:p14="http://schemas.microsoft.com/office/powerpoint/2010/main" val="952908357"/>
+        <p14:creationId xmlns:p14="http://schemas.microsoft.com/office/powerpoint/2010/main" val="2445807200"/>
       </p:ext>
     </p:extLst>
   </p:cSld>
@@ -10224,132 +10337,6 @@
           <a:p>
             <a:r>
               <a:rPr lang="es-419" dirty="0" smtClean="0"/>
-              <a:t>categoria</a:t>
-            </a:r>
-            <a:endParaRPr lang="es-ES" dirty="0"/>
-          </a:p>
-        </p:txBody>
-      </p:sp>
-      <p:sp>
-        <p:nvSpPr>
-          <p:cNvPr id="3" name="Marcador de texto 2"/>
-          <p:cNvSpPr>
-            <a:spLocks noGrp="1"/>
-          </p:cNvSpPr>
-          <p:nvPr>
-            <p:ph type="body" sz="half" idx="2"/>
-          </p:nvPr>
-        </p:nvSpPr>
-        <p:spPr>
-          <a:xfrm>
-            <a:off x="1247196" y="2852936"/>
-            <a:ext cx="4062942" cy="1930400"/>
-          </a:xfrm>
-        </p:spPr>
-        <p:txBody>
-          <a:bodyPr/>
-          <a:lstStyle/>
-          <a:p>
-            <a:r>
-              <a:rPr lang="es-ES" dirty="0"/>
-              <a:t>Esta tabla esta creada para categorizar los productos del ecommerce.</a:t>
-            </a:r>
-          </a:p>
-          <a:p>
-            <a:endParaRPr lang="es-ES" dirty="0"/>
-          </a:p>
-        </p:txBody>
-      </p:sp>
-      <p:pic>
-        <p:nvPicPr>
-          <p:cNvPr id="6" name="Marcador de contenido 5"/>
-          <p:cNvPicPr>
-            <a:picLocks noGrp="1" noChangeAspect="1"/>
-          </p:cNvPicPr>
-          <p:nvPr>
-            <p:ph idx="1"/>
-          </p:nvPr>
-        </p:nvPicPr>
-        <p:blipFill>
-          <a:blip r:embed="rId2"/>
-          <a:stretch>
-            <a:fillRect/>
-          </a:stretch>
-        </p:blipFill>
-        <p:spPr>
-          <a:xfrm>
-            <a:off x="4942284" y="2636912"/>
-            <a:ext cx="6748969" cy="1308025"/>
-          </a:xfrm>
-          <a:prstGeom prst="rect">
-            <a:avLst/>
-          </a:prstGeom>
-        </p:spPr>
-      </p:pic>
-    </p:spTree>
-    <p:extLst>
-      <p:ext uri="{BB962C8B-B14F-4D97-AF65-F5344CB8AC3E}">
-        <p14:creationId xmlns:p14="http://schemas.microsoft.com/office/powerpoint/2010/main" val="2445807200"/>
-      </p:ext>
-    </p:extLst>
-  </p:cSld>
-  <p:clrMapOvr>
-    <a:masterClrMapping/>
-  </p:clrMapOvr>
-  <mc:AlternateContent xmlns:mc="http://schemas.openxmlformats.org/markup-compatibility/2006" xmlns:p14="http://schemas.microsoft.com/office/powerpoint/2010/main">
-    <mc:Choice Requires="p14">
-      <p:transition spd="med" p14:dur="700">
-        <p:fade/>
-      </p:transition>
-    </mc:Choice>
-    <mc:Fallback xmlns="">
-      <p:transition spd="med">
-        <p:fade/>
-      </p:transition>
-    </mc:Fallback>
-  </mc:AlternateContent>
-</p:sld>
-</file>
-
-<file path=ppt/slides/slide16.xml><?xml version="1.0" encoding="utf-8"?>
-<p:sld xmlns:a="http://schemas.openxmlformats.org/drawingml/2006/main" xmlns:r="http://schemas.openxmlformats.org/officeDocument/2006/relationships" xmlns:p="http://schemas.openxmlformats.org/presentationml/2006/main">
-  <p:cSld>
-    <p:spTree>
-      <p:nvGrpSpPr>
-        <p:cNvPr id="1" name=""/>
-        <p:cNvGrpSpPr/>
-        <p:nvPr/>
-      </p:nvGrpSpPr>
-      <p:grpSpPr>
-        <a:xfrm>
-          <a:off x="0" y="0"/>
-          <a:ext cx="0" cy="0"/>
-          <a:chOff x="0" y="0"/>
-          <a:chExt cx="0" cy="0"/>
-        </a:xfrm>
-      </p:grpSpPr>
-      <p:sp>
-        <p:nvSpPr>
-          <p:cNvPr id="2" name="Título 1"/>
-          <p:cNvSpPr>
-            <a:spLocks noGrp="1"/>
-          </p:cNvSpPr>
-          <p:nvPr>
-            <p:ph type="title"/>
-          </p:nvPr>
-        </p:nvSpPr>
-        <p:spPr>
-          <a:xfrm>
-            <a:off x="1218882" y="1701800"/>
-            <a:ext cx="4062942" cy="791096"/>
-          </a:xfrm>
-        </p:spPr>
-        <p:txBody>
-          <a:bodyPr/>
-          <a:lstStyle/>
-          <a:p>
-            <a:r>
-              <a:rPr lang="es-419" dirty="0" smtClean="0"/>
               <a:t>TIPODEJUEGO</a:t>
             </a:r>
             <a:endParaRPr lang="es-ES" dirty="0"/>
@@ -10440,7 +10427,7 @@
 </p:sld>
 </file>
 
-<file path=ppt/slides/slide17.xml><?xml version="1.0" encoding="utf-8"?>
+<file path=ppt/slides/slide16.xml><?xml version="1.0" encoding="utf-8"?>
 <p:sld xmlns:a="http://schemas.openxmlformats.org/drawingml/2006/main" xmlns:r="http://schemas.openxmlformats.org/officeDocument/2006/relationships" xmlns:p="http://schemas.openxmlformats.org/presentationml/2006/main">
   <p:cSld>
     <p:spTree>
@@ -10531,6 +10518,140 @@
     <p:extLst>
       <p:ext uri="{BB962C8B-B14F-4D97-AF65-F5344CB8AC3E}">
         <p14:creationId xmlns:p14="http://schemas.microsoft.com/office/powerpoint/2010/main" val="1886099592"/>
+      </p:ext>
+    </p:extLst>
+  </p:cSld>
+  <p:clrMapOvr>
+    <a:masterClrMapping/>
+  </p:clrMapOvr>
+  <mc:AlternateContent xmlns:mc="http://schemas.openxmlformats.org/markup-compatibility/2006" xmlns:p14="http://schemas.microsoft.com/office/powerpoint/2010/main">
+    <mc:Choice Requires="p14">
+      <p:transition spd="med" p14:dur="700">
+        <p:fade/>
+      </p:transition>
+    </mc:Choice>
+    <mc:Fallback xmlns="">
+      <p:transition spd="med">
+        <p:fade/>
+      </p:transition>
+    </mc:Fallback>
+  </mc:AlternateContent>
+</p:sld>
+</file>
+
+<file path=ppt/slides/slide17.xml><?xml version="1.0" encoding="utf-8"?>
+<p:sld xmlns:a="http://schemas.openxmlformats.org/drawingml/2006/main" xmlns:r="http://schemas.openxmlformats.org/officeDocument/2006/relationships" xmlns:p="http://schemas.openxmlformats.org/presentationml/2006/main">
+  <p:cSld>
+    <p:spTree>
+      <p:nvGrpSpPr>
+        <p:cNvPr id="1" name=""/>
+        <p:cNvGrpSpPr/>
+        <p:nvPr/>
+      </p:nvGrpSpPr>
+      <p:grpSpPr>
+        <a:xfrm>
+          <a:off x="0" y="0"/>
+          <a:ext cx="0" cy="0"/>
+          <a:chOff x="0" y="0"/>
+          <a:chExt cx="0" cy="0"/>
+        </a:xfrm>
+      </p:grpSpPr>
+      <p:sp>
+        <p:nvSpPr>
+          <p:cNvPr id="2" name="Título 1"/>
+          <p:cNvSpPr>
+            <a:spLocks noGrp="1"/>
+          </p:cNvSpPr>
+          <p:nvPr>
+            <p:ph type="title"/>
+          </p:nvPr>
+        </p:nvSpPr>
+        <p:spPr>
+          <a:xfrm>
+            <a:off x="1218882" y="1701800"/>
+            <a:ext cx="4062942" cy="791096"/>
+          </a:xfrm>
+        </p:spPr>
+        <p:txBody>
+          <a:bodyPr>
+            <a:normAutofit fontScale="90000"/>
+          </a:bodyPr>
+          <a:lstStyle/>
+          <a:p>
+            <a:r>
+              <a:rPr lang="es-ES" b="1" dirty="0"/>
+              <a:t>ProductoProveedor</a:t>
+            </a:r>
+            <a:br>
+              <a:rPr lang="es-ES" b="1" dirty="0"/>
+            </a:br>
+            <a:endParaRPr lang="es-ES" dirty="0"/>
+          </a:p>
+        </p:txBody>
+      </p:sp>
+      <p:sp>
+        <p:nvSpPr>
+          <p:cNvPr id="3" name="Marcador de texto 2"/>
+          <p:cNvSpPr>
+            <a:spLocks noGrp="1"/>
+          </p:cNvSpPr>
+          <p:nvPr>
+            <p:ph type="body" sz="half" idx="2"/>
+          </p:nvPr>
+        </p:nvSpPr>
+        <p:spPr>
+          <a:xfrm>
+            <a:off x="1247196" y="2852936"/>
+            <a:ext cx="4062942" cy="1930400"/>
+          </a:xfrm>
+        </p:spPr>
+        <p:txBody>
+          <a:bodyPr/>
+          <a:lstStyle/>
+          <a:p>
+            <a:r>
+              <a:rPr lang="es-ES" dirty="0"/>
+              <a:t>Esta tabla esta creada </a:t>
+            </a:r>
+            <a:r>
+              <a:rPr lang="es-ES" dirty="0" smtClean="0"/>
+              <a:t>para establecer la relación entre la tabla producto y proveedor</a:t>
+            </a:r>
+            <a:endParaRPr lang="es-ES" dirty="0"/>
+          </a:p>
+          <a:p>
+            <a:endParaRPr lang="es-ES" dirty="0"/>
+          </a:p>
+        </p:txBody>
+      </p:sp>
+      <p:pic>
+        <p:nvPicPr>
+          <p:cNvPr id="5" name="Imagen 4"/>
+          <p:cNvPicPr>
+            <a:picLocks noChangeAspect="1"/>
+          </p:cNvPicPr>
+          <p:nvPr/>
+        </p:nvPicPr>
+        <p:blipFill>
+          <a:blip r:embed="rId2"/>
+          <a:stretch>
+            <a:fillRect/>
+          </a:stretch>
+        </p:blipFill>
+        <p:spPr>
+          <a:xfrm>
+            <a:off x="5683284" y="1701801"/>
+            <a:ext cx="5869721" cy="2447280"/>
+          </a:xfrm>
+          <a:prstGeom prst="rect">
+            <a:avLst/>
+          </a:prstGeom>
+        </p:spPr>
+      </p:pic>
+    </p:spTree>
+    <p:extLst>
+      <p:ext uri="{BB962C8B-B14F-4D97-AF65-F5344CB8AC3E}">
+        <p14:creationId xmlns:p14="http://schemas.microsoft.com/office/powerpoint/2010/main" val="2675120001"/>
       </p:ext>
     </p:extLst>
   </p:cSld>
@@ -10586,18 +10707,13 @@
           </a:xfrm>
         </p:spPr>
         <p:txBody>
-          <a:bodyPr>
-            <a:normAutofit fontScale="90000"/>
-          </a:bodyPr>
+          <a:bodyPr/>
           <a:lstStyle/>
           <a:p>
             <a:r>
-              <a:rPr lang="es-ES" b="1" dirty="0"/>
-              <a:t>ProductoProveedor</a:t>
+              <a:rPr lang="es-419" dirty="0" smtClean="0"/>
+              <a:t>detallepedido</a:t>
             </a:r>
-            <a:br>
-              <a:rPr lang="es-ES" b="1" dirty="0"/>
-            </a:br>
             <a:endParaRPr lang="es-ES" dirty="0"/>
           </a:p>
         </p:txBody>
@@ -10624,13 +10740,8 @@
           <a:p>
             <a:r>
               <a:rPr lang="es-ES" dirty="0"/>
-              <a:t>Esta tabla esta creada </a:t>
+              <a:t>Esta tabla esta creada para describir el detalle de un pedido.</a:t>
             </a:r>
-            <a:r>
-              <a:rPr lang="es-ES" dirty="0" smtClean="0"/>
-              <a:t>para establecer la relación entre la tabla producto y proveedor</a:t>
-            </a:r>
-            <a:endParaRPr lang="es-ES" dirty="0"/>
           </a:p>
           <a:p>
             <a:endParaRPr lang="es-ES" dirty="0"/>
@@ -10639,11 +10750,13 @@
       </p:sp>
       <p:pic>
         <p:nvPicPr>
-          <p:cNvPr id="5" name="Imagen 4"/>
+          <p:cNvPr id="5" name="Marcador de contenido 4"/>
           <p:cNvPicPr>
-            <a:picLocks noChangeAspect="1"/>
+            <a:picLocks noGrp="1" noChangeAspect="1"/>
           </p:cNvPicPr>
-          <p:nvPr/>
+          <p:nvPr>
+            <p:ph idx="1"/>
+          </p:nvPr>
         </p:nvPicPr>
         <p:blipFill>
           <a:blip r:embed="rId2"/>
@@ -10653,8 +10766,8 @@
         </p:blipFill>
         <p:spPr>
           <a:xfrm>
-            <a:off x="5683284" y="1701801"/>
-            <a:ext cx="5869721" cy="2447280"/>
+            <a:off x="5617369" y="2206625"/>
+            <a:ext cx="5829300" cy="2343150"/>
           </a:xfrm>
           <a:prstGeom prst="rect">
             <a:avLst/>
@@ -10664,7 +10777,7 @@
     </p:spTree>
     <p:extLst>
       <p:ext uri="{BB962C8B-B14F-4D97-AF65-F5344CB8AC3E}">
-        <p14:creationId xmlns:p14="http://schemas.microsoft.com/office/powerpoint/2010/main" val="2675120001"/>
+        <p14:creationId xmlns:p14="http://schemas.microsoft.com/office/powerpoint/2010/main" val="1725642590"/>
       </p:ext>
     </p:extLst>
   </p:cSld>
@@ -10725,7 +10838,7 @@
           <a:p>
             <a:r>
               <a:rPr lang="es-419" dirty="0" smtClean="0"/>
-              <a:t>detallepedido</a:t>
+              <a:t>ESTADOENVIO</a:t>
             </a:r>
             <a:endParaRPr lang="es-ES" dirty="0"/>
           </a:p>
@@ -10753,8 +10866,13 @@
           <a:p>
             <a:r>
               <a:rPr lang="es-ES" dirty="0"/>
-              <a:t>Esta tabla esta creada para describir el detalle de un pedido.</a:t>
+              <a:t>Esta tabla esta creada para guardar el estado de los envíos que se </a:t>
             </a:r>
+            <a:r>
+              <a:rPr lang="es-ES" dirty="0" smtClean="0"/>
+              <a:t>realicen.</a:t>
+            </a:r>
+            <a:endParaRPr lang="es-ES" dirty="0"/>
           </a:p>
           <a:p>
             <a:endParaRPr lang="es-ES" dirty="0"/>
@@ -10763,7 +10881,7 @@
       </p:sp>
       <p:pic>
         <p:nvPicPr>
-          <p:cNvPr id="5" name="Marcador de contenido 4"/>
+          <p:cNvPr id="6" name="Marcador de contenido 5"/>
           <p:cNvPicPr>
             <a:picLocks noGrp="1" noChangeAspect="1"/>
           </p:cNvPicPr>
@@ -10779,8 +10897,8 @@
         </p:blipFill>
         <p:spPr>
           <a:xfrm>
-            <a:off x="5617369" y="2206625"/>
-            <a:ext cx="5829300" cy="2343150"/>
+            <a:off x="5622131" y="2459037"/>
+            <a:ext cx="5819775" cy="1838325"/>
           </a:xfrm>
           <a:prstGeom prst="rect">
             <a:avLst/>
@@ -10790,7 +10908,7 @@
     </p:spTree>
     <p:extLst>
       <p:ext uri="{BB962C8B-B14F-4D97-AF65-F5344CB8AC3E}">
-        <p14:creationId xmlns:p14="http://schemas.microsoft.com/office/powerpoint/2010/main" val="1725642590"/>
+        <p14:creationId xmlns:p14="http://schemas.microsoft.com/office/powerpoint/2010/main" val="3551851017"/>
       </p:ext>
     </p:extLst>
   </p:cSld>
@@ -10809,6 +10927,13 @@
       </p:transition>
     </mc:Fallback>
   </mc:AlternateContent>
+  <p:timing>
+    <p:tnLst>
+      <p:par>
+        <p:cTn id="1" dur="indefinite" restart="never" nodeType="tmRoot"/>
+      </p:par>
+    </p:tnLst>
+  </p:timing>
 </p:sld>
 </file>
 
@@ -10925,17 +11050,19 @@
         </p:nvSpPr>
         <p:spPr>
           <a:xfrm>
-            <a:off x="1218882" y="1701800"/>
-            <a:ext cx="4062942" cy="791096"/>
+            <a:off x="1218882" y="1340768"/>
+            <a:ext cx="4062942" cy="1152128"/>
           </a:xfrm>
         </p:spPr>
         <p:txBody>
-          <a:bodyPr/>
+          <a:bodyPr>
+            <a:normAutofit/>
+          </a:bodyPr>
           <a:lstStyle/>
           <a:p>
             <a:r>
               <a:rPr lang="es-419" dirty="0" smtClean="0"/>
-              <a:t>ESTADOENVIO</a:t>
+              <a:t>HISTORIAL_CAMBIOS_ENVIOS</a:t>
             </a:r>
             <a:endParaRPr lang="es-ES" dirty="0"/>
           </a:p>
@@ -10963,13 +11090,16 @@
           <a:p>
             <a:r>
               <a:rPr lang="es-ES" dirty="0"/>
-              <a:t>Esta tabla esta creada para guardar el estado de los envíos que se </a:t>
+              <a:t>Esta tabla esta creada para guardar los cambios realizados en la tabla </a:t>
             </a:r>
             <a:r>
               <a:rPr lang="es-ES" dirty="0" smtClean="0"/>
-              <a:t>realicen.</a:t>
+              <a:t>envíos </a:t>
             </a:r>
-            <a:endParaRPr lang="es-ES" dirty="0"/>
+            <a:r>
+              <a:rPr lang="es-ES" dirty="0"/>
+              <a:t>mediante triggers.</a:t>
+            </a:r>
           </a:p>
           <a:p>
             <a:endParaRPr lang="es-ES" dirty="0"/>
@@ -10978,13 +11108,11 @@
       </p:sp>
       <p:pic>
         <p:nvPicPr>
-          <p:cNvPr id="6" name="Marcador de contenido 5"/>
+          <p:cNvPr id="5" name="Imagen 4"/>
           <p:cNvPicPr>
-            <a:picLocks noGrp="1" noChangeAspect="1"/>
+            <a:picLocks noChangeAspect="1"/>
           </p:cNvPicPr>
-          <p:nvPr>
-            <p:ph idx="1"/>
-          </p:nvPr>
+          <p:nvPr/>
         </p:nvPicPr>
         <p:blipFill>
           <a:blip r:embed="rId2"/>
@@ -10994,8 +11122,8 @@
         </p:blipFill>
         <p:spPr>
           <a:xfrm>
-            <a:off x="5622131" y="2459037"/>
-            <a:ext cx="5819775" cy="1838325"/>
+            <a:off x="6094412" y="692696"/>
+            <a:ext cx="4824536" cy="5321342"/>
           </a:xfrm>
           <a:prstGeom prst="rect">
             <a:avLst/>
@@ -11005,7 +11133,7 @@
     </p:spTree>
     <p:extLst>
       <p:ext uri="{BB962C8B-B14F-4D97-AF65-F5344CB8AC3E}">
-        <p14:creationId xmlns:p14="http://schemas.microsoft.com/office/powerpoint/2010/main" val="3551851017"/>
+        <p14:creationId xmlns:p14="http://schemas.microsoft.com/office/powerpoint/2010/main" val="3056316281"/>
       </p:ext>
     </p:extLst>
   </p:cSld>
@@ -11075,147 +11203,6 @@
           <a:p>
             <a:r>
               <a:rPr lang="es-419" dirty="0" smtClean="0"/>
-              <a:t>HISTORIAL_CAMBIOS_ENVIOS</a:t>
-            </a:r>
-            <a:endParaRPr lang="es-ES" dirty="0"/>
-          </a:p>
-        </p:txBody>
-      </p:sp>
-      <p:sp>
-        <p:nvSpPr>
-          <p:cNvPr id="3" name="Marcador de texto 2"/>
-          <p:cNvSpPr>
-            <a:spLocks noGrp="1"/>
-          </p:cNvSpPr>
-          <p:nvPr>
-            <p:ph type="body" sz="half" idx="2"/>
-          </p:nvPr>
-        </p:nvSpPr>
-        <p:spPr>
-          <a:xfrm>
-            <a:off x="1247196" y="2852936"/>
-            <a:ext cx="4062942" cy="1930400"/>
-          </a:xfrm>
-        </p:spPr>
-        <p:txBody>
-          <a:bodyPr/>
-          <a:lstStyle/>
-          <a:p>
-            <a:r>
-              <a:rPr lang="es-ES" dirty="0"/>
-              <a:t>Esta tabla esta creada para guardar los cambios realizados en la tabla </a:t>
-            </a:r>
-            <a:r>
-              <a:rPr lang="es-ES" dirty="0" smtClean="0"/>
-              <a:t>envíos </a:t>
-            </a:r>
-            <a:r>
-              <a:rPr lang="es-ES" dirty="0"/>
-              <a:t>mediante triggers.</a:t>
-            </a:r>
-          </a:p>
-          <a:p>
-            <a:endParaRPr lang="es-ES" dirty="0"/>
-          </a:p>
-        </p:txBody>
-      </p:sp>
-      <p:pic>
-        <p:nvPicPr>
-          <p:cNvPr id="5" name="Imagen 4"/>
-          <p:cNvPicPr>
-            <a:picLocks noChangeAspect="1"/>
-          </p:cNvPicPr>
-          <p:nvPr/>
-        </p:nvPicPr>
-        <p:blipFill>
-          <a:blip r:embed="rId2"/>
-          <a:stretch>
-            <a:fillRect/>
-          </a:stretch>
-        </p:blipFill>
-        <p:spPr>
-          <a:xfrm>
-            <a:off x="6094412" y="692696"/>
-            <a:ext cx="4824536" cy="5321342"/>
-          </a:xfrm>
-          <a:prstGeom prst="rect">
-            <a:avLst/>
-          </a:prstGeom>
-        </p:spPr>
-      </p:pic>
-    </p:spTree>
-    <p:extLst>
-      <p:ext uri="{BB962C8B-B14F-4D97-AF65-F5344CB8AC3E}">
-        <p14:creationId xmlns:p14="http://schemas.microsoft.com/office/powerpoint/2010/main" val="3056316281"/>
-      </p:ext>
-    </p:extLst>
-  </p:cSld>
-  <p:clrMapOvr>
-    <a:masterClrMapping/>
-  </p:clrMapOvr>
-  <mc:AlternateContent xmlns:mc="http://schemas.openxmlformats.org/markup-compatibility/2006" xmlns:p14="http://schemas.microsoft.com/office/powerpoint/2010/main">
-    <mc:Choice Requires="p14">
-      <p:transition spd="med" p14:dur="700">
-        <p:fade/>
-      </p:transition>
-    </mc:Choice>
-    <mc:Fallback xmlns="">
-      <p:transition spd="med">
-        <p:fade/>
-      </p:transition>
-    </mc:Fallback>
-  </mc:AlternateContent>
-  <p:timing>
-    <p:tnLst>
-      <p:par>
-        <p:cTn id="1" dur="indefinite" restart="never" nodeType="tmRoot"/>
-      </p:par>
-    </p:tnLst>
-  </p:timing>
-</p:sld>
-</file>
-
-<file path=ppt/slides/slide22.xml><?xml version="1.0" encoding="utf-8"?>
-<p:sld xmlns:a="http://schemas.openxmlformats.org/drawingml/2006/main" xmlns:r="http://schemas.openxmlformats.org/officeDocument/2006/relationships" xmlns:p="http://schemas.openxmlformats.org/presentationml/2006/main">
-  <p:cSld>
-    <p:spTree>
-      <p:nvGrpSpPr>
-        <p:cNvPr id="1" name=""/>
-        <p:cNvGrpSpPr/>
-        <p:nvPr/>
-      </p:nvGrpSpPr>
-      <p:grpSpPr>
-        <a:xfrm>
-          <a:off x="0" y="0"/>
-          <a:ext cx="0" cy="0"/>
-          <a:chOff x="0" y="0"/>
-          <a:chExt cx="0" cy="0"/>
-        </a:xfrm>
-      </p:grpSpPr>
-      <p:sp>
-        <p:nvSpPr>
-          <p:cNvPr id="2" name="Título 1"/>
-          <p:cNvSpPr>
-            <a:spLocks noGrp="1"/>
-          </p:cNvSpPr>
-          <p:nvPr>
-            <p:ph type="title"/>
-          </p:nvPr>
-        </p:nvSpPr>
-        <p:spPr>
-          <a:xfrm>
-            <a:off x="1218882" y="1340768"/>
-            <a:ext cx="4062942" cy="1152128"/>
-          </a:xfrm>
-        </p:spPr>
-        <p:txBody>
-          <a:bodyPr>
-            <a:normAutofit/>
-          </a:bodyPr>
-          <a:lstStyle/>
-          <a:p>
-            <a:r>
-              <a:rPr lang="es-419" dirty="0" smtClean="0"/>
               <a:t>HISTORIAL_CAMBIOS_PEDIDOS</a:t>
             </a:r>
             <a:endParaRPr lang="es-ES" dirty="0"/>
@@ -11316,7 +11303,7 @@
 </p:sld>
 </file>
 
-<file path=ppt/slides/slide23.xml><?xml version="1.0" encoding="utf-8"?>
+<file path=ppt/slides/slide22.xml><?xml version="1.0" encoding="utf-8"?>
 <p:sld xmlns:a="http://schemas.openxmlformats.org/drawingml/2006/main" xmlns:r="http://schemas.openxmlformats.org/officeDocument/2006/relationships" xmlns:p="http://schemas.openxmlformats.org/presentationml/2006/main">
   <p:cSld>
     <p:spTree>
@@ -11345,7 +11332,7 @@
         </p:nvSpPr>
         <p:spPr>
           <a:xfrm>
-            <a:off x="1989956" y="2924944"/>
+            <a:off x="2998068" y="1844824"/>
             <a:ext cx="7069519" cy="1220933"/>
           </a:xfrm>
         </p:spPr>
@@ -11355,12 +11342,106 @@
           <a:p>
             <a:r>
               <a:rPr lang="es-419" dirty="0" smtClean="0"/>
-              <a:t>SCRIPTS DE INSERCIÓN DE DATOS</a:t>
+              <a:t>SCRIPTS DE </a:t>
+            </a:r>
+            <a:r>
+              <a:rPr lang="es-419" dirty="0" smtClean="0"/>
+              <a:t>creación de objetos</a:t>
             </a:r>
             <a:endParaRPr lang="es-ES" dirty="0"/>
           </a:p>
         </p:txBody>
       </p:sp>
+      <p:grpSp>
+        <p:nvGrpSpPr>
+          <p:cNvPr id="2" name="Grupo 1"/>
+          <p:cNvGrpSpPr/>
+          <p:nvPr/>
+        </p:nvGrpSpPr>
+        <p:grpSpPr>
+          <a:xfrm>
+            <a:off x="5086300" y="3085341"/>
+            <a:ext cx="3312368" cy="1634698"/>
+            <a:chOff x="4876643" y="2924944"/>
+            <a:chExt cx="3312368" cy="1634698"/>
+          </a:xfrm>
+        </p:grpSpPr>
+        <p:pic>
+          <p:nvPicPr>
+            <p:cNvPr id="3" name="Picture 2" descr="GitHub - Apps on Google Play">
+              <a:hlinkClick r:id="rId2"/>
+            </p:cNvPr>
+            <p:cNvPicPr>
+              <a:picLocks noChangeAspect="1" noChangeArrowheads="1"/>
+            </p:cNvPicPr>
+            <p:nvPr/>
+          </p:nvPicPr>
+          <p:blipFill>
+            <a:blip r:embed="rId3" cstate="print">
+              <a:extLst>
+                <a:ext uri="{28A0092B-C50C-407E-A947-70E740481C1C}">
+                  <a14:useLocalDpi xmlns:a14="http://schemas.microsoft.com/office/drawing/2010/main" val="0"/>
+                </a:ext>
+              </a:extLst>
+            </a:blip>
+            <a:srcRect/>
+            <a:stretch>
+              <a:fillRect/>
+            </a:stretch>
+          </p:blipFill>
+          <p:spPr bwMode="auto">
+            <a:xfrm>
+              <a:off x="5446340" y="2924944"/>
+              <a:ext cx="1098203" cy="1098203"/>
+            </a:xfrm>
+            <a:prstGeom prst="rect">
+              <a:avLst/>
+            </a:prstGeom>
+            <a:noFill/>
+            <a:extLst>
+              <a:ext uri="{909E8E84-426E-40DD-AFC4-6F175D3DCCD1}">
+                <a14:hiddenFill xmlns:a14="http://schemas.microsoft.com/office/drawing/2010/main">
+                  <a:solidFill>
+                    <a:srgbClr val="FFFFFF"/>
+                  </a:solidFill>
+                </a14:hiddenFill>
+              </a:ext>
+            </a:extLst>
+          </p:spPr>
+        </p:pic>
+        <p:sp>
+          <p:nvSpPr>
+            <p:cNvPr id="4" name="CuadroTexto 3">
+              <a:hlinkClick r:id="rId2"/>
+            </p:cNvPr>
+            <p:cNvSpPr txBox="1"/>
+            <p:nvPr/>
+          </p:nvSpPr>
+          <p:spPr>
+            <a:xfrm>
+              <a:off x="4876643" y="4221088"/>
+              <a:ext cx="3312368" cy="338554"/>
+            </a:xfrm>
+            <a:prstGeom prst="rect">
+              <a:avLst/>
+            </a:prstGeom>
+            <a:noFill/>
+          </p:spPr>
+          <p:txBody>
+            <a:bodyPr wrap="square" rtlCol="0">
+              <a:spAutoFit/>
+            </a:bodyPr>
+            <a:lstStyle/>
+            <a:p>
+              <a:r>
+                <a:rPr lang="es-419" sz="1600" dirty="0" smtClean="0"/>
+                <a:t>Script Base de Dato unificado</a:t>
+              </a:r>
+              <a:endParaRPr lang="es-ES" sz="1600" dirty="0"/>
+            </a:p>
+          </p:txBody>
+        </p:sp>
+      </p:grpSp>
     </p:spTree>
     <p:extLst>
       <p:ext uri="{BB962C8B-B14F-4D97-AF65-F5344CB8AC3E}">
@@ -11386,7 +11467,7 @@
 </p:sld>
 </file>
 
-<file path=ppt/slides/slide24.xml><?xml version="1.0" encoding="utf-8"?>
+<file path=ppt/slides/slide23.xml><?xml version="1.0" encoding="utf-8"?>
 <p:sld xmlns:a="http://schemas.openxmlformats.org/drawingml/2006/main" xmlns:r="http://schemas.openxmlformats.org/officeDocument/2006/relationships" xmlns:p="http://schemas.openxmlformats.org/presentationml/2006/main">
   <p:cSld>
     <p:spTree>
@@ -11427,525 +11508,554 @@
           </a:p>
         </p:txBody>
       </p:sp>
-      <p:pic>
-        <p:nvPicPr>
-          <p:cNvPr id="2050" name="Picture 2" descr="GitHub - Apps on Google Play">
-            <a:hlinkClick r:id="rId2"/>
-          </p:cNvPr>
-          <p:cNvPicPr>
-            <a:picLocks noChangeAspect="1" noChangeArrowheads="1"/>
-          </p:cNvPicPr>
+      <p:grpSp>
+        <p:nvGrpSpPr>
+          <p:cNvPr id="3" name="Grupo 2"/>
+          <p:cNvGrpSpPr/>
           <p:nvPr/>
-        </p:nvPicPr>
-        <p:blipFill>
-          <a:blip r:embed="rId3" cstate="print">
+        </p:nvGrpSpPr>
+        <p:grpSpPr>
+          <a:xfrm>
+            <a:off x="2147986" y="1731004"/>
+            <a:ext cx="1944216" cy="1459633"/>
+            <a:chOff x="1557908" y="2035632"/>
+            <a:chExt cx="1944216" cy="1459633"/>
+          </a:xfrm>
+        </p:grpSpPr>
+        <p:pic>
+          <p:nvPicPr>
+            <p:cNvPr id="2050" name="Picture 2" descr="GitHub - Apps on Google Play">
+              <a:hlinkClick r:id="rId2"/>
+            </p:cNvPr>
+            <p:cNvPicPr>
+              <a:picLocks noChangeAspect="1" noChangeArrowheads="1"/>
+            </p:cNvPicPr>
+            <p:nvPr/>
+          </p:nvPicPr>
+          <p:blipFill>
+            <a:blip r:embed="rId3" cstate="print">
+              <a:extLst>
+                <a:ext uri="{28A0092B-C50C-407E-A947-70E740481C1C}">
+                  <a14:useLocalDpi xmlns:a14="http://schemas.microsoft.com/office/drawing/2010/main" val="0"/>
+                </a:ext>
+              </a:extLst>
+            </a:blip>
+            <a:srcRect/>
+            <a:stretch>
+              <a:fillRect/>
+            </a:stretch>
+          </p:blipFill>
+          <p:spPr bwMode="auto">
+            <a:xfrm>
+              <a:off x="1845940" y="2035632"/>
+              <a:ext cx="1098203" cy="1098203"/>
+            </a:xfrm>
+            <a:prstGeom prst="rect">
+              <a:avLst/>
+            </a:prstGeom>
+            <a:noFill/>
             <a:extLst>
-              <a:ext uri="{28A0092B-C50C-407E-A947-70E740481C1C}">
-                <a14:useLocalDpi xmlns:a14="http://schemas.microsoft.com/office/drawing/2010/main" val="0"/>
+              <a:ext uri="{909E8E84-426E-40DD-AFC4-6F175D3DCCD1}">
+                <a14:hiddenFill xmlns:a14="http://schemas.microsoft.com/office/drawing/2010/main">
+                  <a:solidFill>
+                    <a:srgbClr val="FFFFFF"/>
+                  </a:solidFill>
+                </a14:hiddenFill>
               </a:ext>
             </a:extLst>
-          </a:blip>
-          <a:srcRect/>
-          <a:stretch>
-            <a:fillRect/>
-          </a:stretch>
-        </p:blipFill>
-        <p:spPr bwMode="auto">
+          </p:spPr>
+        </p:pic>
+        <p:sp>
+          <p:nvSpPr>
+            <p:cNvPr id="4" name="CuadroTexto 3">
+              <a:hlinkClick r:id="rId2"/>
+            </p:cNvPr>
+            <p:cNvSpPr txBox="1"/>
+            <p:nvPr/>
+          </p:nvSpPr>
+          <p:spPr>
+            <a:xfrm>
+              <a:off x="1557908" y="3156711"/>
+              <a:ext cx="1944216" cy="338554"/>
+            </a:xfrm>
+            <a:prstGeom prst="rect">
+              <a:avLst/>
+            </a:prstGeom>
+            <a:noFill/>
+          </p:spPr>
+          <p:txBody>
+            <a:bodyPr wrap="square" rtlCol="0">
+              <a:spAutoFit/>
+            </a:bodyPr>
+            <a:lstStyle/>
+            <a:p>
+              <a:r>
+                <a:rPr lang="es-419" sz="1600" dirty="0" smtClean="0"/>
+                <a:t>Creación de tablas</a:t>
+              </a:r>
+              <a:endParaRPr lang="es-ES" sz="1600" dirty="0"/>
+            </a:p>
+          </p:txBody>
+        </p:sp>
+      </p:grpSp>
+      <p:grpSp>
+        <p:nvGrpSpPr>
+          <p:cNvPr id="7" name="Grupo 6"/>
+          <p:cNvGrpSpPr/>
+          <p:nvPr/>
+        </p:nvGrpSpPr>
+        <p:grpSpPr>
           <a:xfrm>
-            <a:off x="1845940" y="1844823"/>
-            <a:ext cx="1098203" cy="1098203"/>
+            <a:off x="5662364" y="1731004"/>
+            <a:ext cx="2088232" cy="1766439"/>
+            <a:chOff x="7264461" y="1844823"/>
+            <a:chExt cx="2088232" cy="1766439"/>
           </a:xfrm>
-          <a:prstGeom prst="rect">
-            <a:avLst/>
-          </a:prstGeom>
-          <a:noFill/>
-          <a:extLst>
-            <a:ext uri="{909E8E84-426E-40DD-AFC4-6F175D3DCCD1}">
-              <a14:hiddenFill xmlns:a14="http://schemas.microsoft.com/office/drawing/2010/main">
-                <a:solidFill>
-                  <a:srgbClr val="FFFFFF"/>
-                </a:solidFill>
-              </a14:hiddenFill>
-            </a:ext>
-          </a:extLst>
-        </p:spPr>
-      </p:pic>
-      <p:pic>
-        <p:nvPicPr>
-          <p:cNvPr id="5" name="Picture 2" descr="GitHub - Apps on Google Play">
-            <a:hlinkClick r:id="rId4"/>
-          </p:cNvPr>
-          <p:cNvPicPr>
-            <a:picLocks noChangeAspect="1" noChangeArrowheads="1"/>
-          </p:cNvPicPr>
-          <p:nvPr/>
-        </p:nvPicPr>
-        <p:blipFill>
-          <a:blip r:embed="rId3" cstate="print">
+        </p:grpSpPr>
+        <p:pic>
+          <p:nvPicPr>
+            <p:cNvPr id="5" name="Picture 2" descr="GitHub - Apps on Google Play">
+              <a:hlinkClick r:id="rId4"/>
+            </p:cNvPr>
+            <p:cNvPicPr>
+              <a:picLocks noChangeAspect="1" noChangeArrowheads="1"/>
+            </p:cNvPicPr>
+            <p:nvPr/>
+          </p:nvPicPr>
+          <p:blipFill>
+            <a:blip r:embed="rId3" cstate="print">
+              <a:extLst>
+                <a:ext uri="{28A0092B-C50C-407E-A947-70E740481C1C}">
+                  <a14:useLocalDpi xmlns:a14="http://schemas.microsoft.com/office/drawing/2010/main" val="0"/>
+                </a:ext>
+              </a:extLst>
+            </a:blip>
+            <a:srcRect/>
+            <a:stretch>
+              <a:fillRect/>
+            </a:stretch>
+          </p:blipFill>
+          <p:spPr bwMode="auto">
+            <a:xfrm>
+              <a:off x="7534572" y="1844823"/>
+              <a:ext cx="1098203" cy="1098203"/>
+            </a:xfrm>
+            <a:prstGeom prst="rect">
+              <a:avLst/>
+            </a:prstGeom>
+            <a:noFill/>
             <a:extLst>
-              <a:ext uri="{28A0092B-C50C-407E-A947-70E740481C1C}">
-                <a14:useLocalDpi xmlns:a14="http://schemas.microsoft.com/office/drawing/2010/main" val="0"/>
+              <a:ext uri="{909E8E84-426E-40DD-AFC4-6F175D3DCCD1}">
+                <a14:hiddenFill xmlns:a14="http://schemas.microsoft.com/office/drawing/2010/main">
+                  <a:solidFill>
+                    <a:srgbClr val="FFFFFF"/>
+                  </a:solidFill>
+                </a14:hiddenFill>
               </a:ext>
             </a:extLst>
-          </a:blip>
-          <a:srcRect/>
-          <a:stretch>
-            <a:fillRect/>
-          </a:stretch>
-        </p:blipFill>
-        <p:spPr bwMode="auto">
+          </p:spPr>
+        </p:pic>
+        <p:sp>
+          <p:nvSpPr>
+            <p:cNvPr id="13" name="CuadroTexto 12">
+              <a:hlinkClick r:id="rId4"/>
+            </p:cNvPr>
+            <p:cNvSpPr txBox="1"/>
+            <p:nvPr/>
+          </p:nvSpPr>
+          <p:spPr>
+            <a:xfrm>
+              <a:off x="7264461" y="3026487"/>
+              <a:ext cx="2088232" cy="584775"/>
+            </a:xfrm>
+            <a:prstGeom prst="rect">
+              <a:avLst/>
+            </a:prstGeom>
+            <a:noFill/>
+          </p:spPr>
+          <p:txBody>
+            <a:bodyPr wrap="square" rtlCol="0">
+              <a:spAutoFit/>
+            </a:bodyPr>
+            <a:lstStyle/>
+            <a:p>
+              <a:r>
+                <a:rPr lang="es-419" sz="1600" dirty="0" smtClean="0"/>
+                <a:t>Creación </a:t>
+              </a:r>
+              <a:r>
+                <a:rPr lang="es-419" sz="1600" dirty="0" smtClean="0"/>
+                <a:t>de informes/ </a:t>
+              </a:r>
+              <a:r>
+                <a:rPr lang="es-419" sz="1600" dirty="0" smtClean="0"/>
+                <a:t>vistas</a:t>
+              </a:r>
+              <a:endParaRPr lang="es-ES" sz="1600" dirty="0"/>
+            </a:p>
+          </p:txBody>
+        </p:sp>
+      </p:grpSp>
+      <p:grpSp>
+        <p:nvGrpSpPr>
+          <p:cNvPr id="10" name="Grupo 9"/>
+          <p:cNvGrpSpPr/>
+          <p:nvPr/>
+        </p:nvGrpSpPr>
+        <p:grpSpPr>
           <a:xfrm>
-            <a:off x="7534572" y="1844823"/>
-            <a:ext cx="1098203" cy="1098203"/>
+            <a:off x="9366837" y="1784854"/>
+            <a:ext cx="2070311" cy="1466368"/>
+            <a:chOff x="5549899" y="3842965"/>
+            <a:chExt cx="2070311" cy="1466368"/>
           </a:xfrm>
-          <a:prstGeom prst="rect">
-            <a:avLst/>
-          </a:prstGeom>
-          <a:noFill/>
-          <a:extLst>
-            <a:ext uri="{909E8E84-426E-40DD-AFC4-6F175D3DCCD1}">
-              <a14:hiddenFill xmlns:a14="http://schemas.microsoft.com/office/drawing/2010/main">
-                <a:solidFill>
-                  <a:srgbClr val="FFFFFF"/>
-                </a:solidFill>
-              </a14:hiddenFill>
-            </a:ext>
-          </a:extLst>
-        </p:spPr>
-      </p:pic>
-      <p:pic>
-        <p:nvPicPr>
-          <p:cNvPr id="6" name="Picture 2" descr="GitHub - Apps on Google Play">
-            <a:hlinkClick r:id="rId5"/>
-          </p:cNvPr>
-          <p:cNvPicPr>
-            <a:picLocks noChangeAspect="1" noChangeArrowheads="1"/>
-          </p:cNvPicPr>
-          <p:nvPr/>
-        </p:nvPicPr>
-        <p:blipFill>
-          <a:blip r:embed="rId3" cstate="print">
+        </p:grpSpPr>
+        <p:pic>
+          <p:nvPicPr>
+            <p:cNvPr id="9" name="Picture 2" descr="GitHub - Apps on Google Play">
+              <a:hlinkClick r:id="rId5"/>
+            </p:cNvPr>
+            <p:cNvPicPr>
+              <a:picLocks noChangeAspect="1" noChangeArrowheads="1"/>
+            </p:cNvPicPr>
+            <p:nvPr/>
+          </p:nvPicPr>
+          <p:blipFill>
+            <a:blip r:embed="rId3" cstate="print">
+              <a:extLst>
+                <a:ext uri="{28A0092B-C50C-407E-A947-70E740481C1C}">
+                  <a14:useLocalDpi xmlns:a14="http://schemas.microsoft.com/office/drawing/2010/main" val="0"/>
+                </a:ext>
+              </a:extLst>
+            </a:blip>
+            <a:srcRect/>
+            <a:stretch>
+              <a:fillRect/>
+            </a:stretch>
+          </p:blipFill>
+          <p:spPr bwMode="auto">
+            <a:xfrm>
+              <a:off x="5549899" y="3842965"/>
+              <a:ext cx="1098203" cy="1098203"/>
+            </a:xfrm>
+            <a:prstGeom prst="rect">
+              <a:avLst/>
+            </a:prstGeom>
+            <a:noFill/>
             <a:extLst>
-              <a:ext uri="{28A0092B-C50C-407E-A947-70E740481C1C}">
-                <a14:useLocalDpi xmlns:a14="http://schemas.microsoft.com/office/drawing/2010/main" val="0"/>
+              <a:ext uri="{909E8E84-426E-40DD-AFC4-6F175D3DCCD1}">
+                <a14:hiddenFill xmlns:a14="http://schemas.microsoft.com/office/drawing/2010/main">
+                  <a:solidFill>
+                    <a:srgbClr val="FFFFFF"/>
+                  </a:solidFill>
+                </a14:hiddenFill>
               </a:ext>
             </a:extLst>
-          </a:blip>
-          <a:srcRect/>
-          <a:stretch>
-            <a:fillRect/>
-          </a:stretch>
-        </p:blipFill>
-        <p:spPr bwMode="auto">
+          </p:spPr>
+        </p:pic>
+        <p:sp>
+          <p:nvSpPr>
+            <p:cNvPr id="15" name="CuadroTexto 14">
+              <a:hlinkClick r:id="rId5"/>
+            </p:cNvPr>
+            <p:cNvSpPr txBox="1"/>
+            <p:nvPr/>
+          </p:nvSpPr>
+          <p:spPr>
+            <a:xfrm>
+              <a:off x="5675994" y="4970779"/>
+              <a:ext cx="1944216" cy="338554"/>
+            </a:xfrm>
+            <a:prstGeom prst="rect">
+              <a:avLst/>
+            </a:prstGeom>
+            <a:noFill/>
+          </p:spPr>
+          <p:txBody>
+            <a:bodyPr wrap="square" rtlCol="0">
+              <a:spAutoFit/>
+            </a:bodyPr>
+            <a:lstStyle/>
+            <a:p>
+              <a:r>
+                <a:rPr lang="es-419" sz="1600" dirty="0" smtClean="0"/>
+                <a:t>Funciones</a:t>
+              </a:r>
+              <a:endParaRPr lang="es-ES" sz="1600" dirty="0"/>
+            </a:p>
+          </p:txBody>
+        </p:sp>
+      </p:grpSp>
+      <p:grpSp>
+        <p:nvGrpSpPr>
+          <p:cNvPr id="11" name="Grupo 10"/>
+          <p:cNvGrpSpPr/>
+          <p:nvPr/>
+        </p:nvGrpSpPr>
+        <p:grpSpPr>
           <a:xfrm>
-            <a:off x="2801607" y="4941168"/>
-            <a:ext cx="1098203" cy="1098203"/>
+            <a:off x="1845940" y="4470456"/>
+            <a:ext cx="2887306" cy="1608856"/>
+            <a:chOff x="2220570" y="4941168"/>
+            <a:chExt cx="2887306" cy="1608856"/>
           </a:xfrm>
-          <a:prstGeom prst="rect">
-            <a:avLst/>
-          </a:prstGeom>
-          <a:noFill/>
-          <a:extLst>
-            <a:ext uri="{909E8E84-426E-40DD-AFC4-6F175D3DCCD1}">
-              <a14:hiddenFill xmlns:a14="http://schemas.microsoft.com/office/drawing/2010/main">
-                <a:solidFill>
-                  <a:srgbClr val="FFFFFF"/>
-                </a:solidFill>
-              </a14:hiddenFill>
-            </a:ext>
-          </a:extLst>
-        </p:spPr>
-      </p:pic>
-      <p:pic>
-        <p:nvPicPr>
-          <p:cNvPr id="8" name="Picture 2" descr="GitHub - Apps on Google Play">
-            <a:hlinkClick r:id="rId4"/>
-          </p:cNvPr>
-          <p:cNvPicPr>
-            <a:picLocks noChangeAspect="1" noChangeArrowheads="1"/>
-          </p:cNvPicPr>
-          <p:nvPr/>
-        </p:nvPicPr>
-        <p:blipFill>
-          <a:blip r:embed="rId3" cstate="print">
+        </p:grpSpPr>
+        <p:pic>
+          <p:nvPicPr>
+            <p:cNvPr id="6" name="Picture 2" descr="GitHub - Apps on Google Play">
+              <a:hlinkClick r:id="rId6"/>
+            </p:cNvPr>
+            <p:cNvPicPr>
+              <a:picLocks noChangeAspect="1" noChangeArrowheads="1"/>
+            </p:cNvPicPr>
+            <p:nvPr/>
+          </p:nvPicPr>
+          <p:blipFill>
+            <a:blip r:embed="rId3" cstate="print">
+              <a:extLst>
+                <a:ext uri="{28A0092B-C50C-407E-A947-70E740481C1C}">
+                  <a14:useLocalDpi xmlns:a14="http://schemas.microsoft.com/office/drawing/2010/main" val="0"/>
+                </a:ext>
+              </a:extLst>
+            </a:blip>
+            <a:srcRect/>
+            <a:stretch>
+              <a:fillRect/>
+            </a:stretch>
+          </p:blipFill>
+          <p:spPr bwMode="auto">
+            <a:xfrm>
+              <a:off x="2801607" y="4941168"/>
+              <a:ext cx="1098203" cy="1098203"/>
+            </a:xfrm>
+            <a:prstGeom prst="rect">
+              <a:avLst/>
+            </a:prstGeom>
+            <a:noFill/>
             <a:extLst>
-              <a:ext uri="{28A0092B-C50C-407E-A947-70E740481C1C}">
-                <a14:useLocalDpi xmlns:a14="http://schemas.microsoft.com/office/drawing/2010/main" val="0"/>
+              <a:ext uri="{909E8E84-426E-40DD-AFC4-6F175D3DCCD1}">
+                <a14:hiddenFill xmlns:a14="http://schemas.microsoft.com/office/drawing/2010/main">
+                  <a:solidFill>
+                    <a:srgbClr val="FFFFFF"/>
+                  </a:solidFill>
+                </a14:hiddenFill>
               </a:ext>
             </a:extLst>
-          </a:blip>
-          <a:srcRect/>
-          <a:stretch>
-            <a:fillRect/>
-          </a:stretch>
-        </p:blipFill>
-        <p:spPr bwMode="auto">
+          </p:spPr>
+        </p:pic>
+        <p:sp>
+          <p:nvSpPr>
+            <p:cNvPr id="16" name="CuadroTexto 15">
+              <a:hlinkClick r:id="rId6"/>
+            </p:cNvPr>
+            <p:cNvSpPr txBox="1"/>
+            <p:nvPr/>
+          </p:nvSpPr>
+          <p:spPr>
+            <a:xfrm>
+              <a:off x="2220570" y="6211470"/>
+              <a:ext cx="2887306" cy="338554"/>
+            </a:xfrm>
+            <a:prstGeom prst="rect">
+              <a:avLst/>
+            </a:prstGeom>
+            <a:noFill/>
+          </p:spPr>
+          <p:txBody>
+            <a:bodyPr wrap="square" rtlCol="0">
+              <a:spAutoFit/>
+            </a:bodyPr>
+            <a:lstStyle/>
+            <a:p>
+              <a:r>
+                <a:rPr lang="es-419" sz="1600" dirty="0" smtClean="0"/>
+                <a:t>Procedimientos almacenados</a:t>
+              </a:r>
+              <a:endParaRPr lang="es-ES" sz="1600" dirty="0"/>
+            </a:p>
+          </p:txBody>
+        </p:sp>
+      </p:grpSp>
+      <p:grpSp>
+        <p:nvGrpSpPr>
+          <p:cNvPr id="19" name="Grupo 18"/>
+          <p:cNvGrpSpPr/>
+          <p:nvPr/>
+        </p:nvGrpSpPr>
+        <p:grpSpPr>
           <a:xfrm>
-            <a:off x="4690256" y="1912822"/>
-            <a:ext cx="1098203" cy="1098203"/>
+            <a:off x="5789957" y="4470456"/>
+            <a:ext cx="2481441" cy="1556052"/>
+            <a:chOff x="8236569" y="4941168"/>
+            <a:chExt cx="2481441" cy="1556052"/>
           </a:xfrm>
-          <a:prstGeom prst="rect">
-            <a:avLst/>
-          </a:prstGeom>
-          <a:noFill/>
-          <a:extLst>
-            <a:ext uri="{909E8E84-426E-40DD-AFC4-6F175D3DCCD1}">
-              <a14:hiddenFill xmlns:a14="http://schemas.microsoft.com/office/drawing/2010/main">
-                <a:solidFill>
-                  <a:srgbClr val="FFFFFF"/>
-                </a:solidFill>
-              </a14:hiddenFill>
-            </a:ext>
-          </a:extLst>
-        </p:spPr>
-      </p:pic>
-      <p:pic>
-        <p:nvPicPr>
-          <p:cNvPr id="9" name="Picture 2" descr="GitHub - Apps on Google Play">
-            <a:hlinkClick r:id="rId6"/>
-          </p:cNvPr>
-          <p:cNvPicPr>
-            <a:picLocks noChangeAspect="1" noChangeArrowheads="1"/>
-          </p:cNvPicPr>
-          <p:nvPr/>
-        </p:nvPicPr>
-        <p:blipFill>
-          <a:blip r:embed="rId3" cstate="print">
+        </p:grpSpPr>
+        <p:pic>
+          <p:nvPicPr>
+            <p:cNvPr id="17" name="Picture 2" descr="GitHub - Apps on Google Play">
+              <a:hlinkClick r:id="rId7"/>
+            </p:cNvPr>
+            <p:cNvPicPr>
+              <a:picLocks noChangeAspect="1" noChangeArrowheads="1"/>
+            </p:cNvPicPr>
+            <p:nvPr/>
+          </p:nvPicPr>
+          <p:blipFill>
+            <a:blip r:embed="rId3" cstate="print">
+              <a:extLst>
+                <a:ext uri="{28A0092B-C50C-407E-A947-70E740481C1C}">
+                  <a14:useLocalDpi xmlns:a14="http://schemas.microsoft.com/office/drawing/2010/main" val="0"/>
+                </a:ext>
+              </a:extLst>
+            </a:blip>
+            <a:srcRect/>
+            <a:stretch>
+              <a:fillRect/>
+            </a:stretch>
+          </p:blipFill>
+          <p:spPr bwMode="auto">
+            <a:xfrm>
+              <a:off x="8236569" y="4941168"/>
+              <a:ext cx="1098203" cy="1098203"/>
+            </a:xfrm>
+            <a:prstGeom prst="rect">
+              <a:avLst/>
+            </a:prstGeom>
+            <a:noFill/>
             <a:extLst>
-              <a:ext uri="{28A0092B-C50C-407E-A947-70E740481C1C}">
-                <a14:useLocalDpi xmlns:a14="http://schemas.microsoft.com/office/drawing/2010/main" val="0"/>
+              <a:ext uri="{909E8E84-426E-40DD-AFC4-6F175D3DCCD1}">
+                <a14:hiddenFill xmlns:a14="http://schemas.microsoft.com/office/drawing/2010/main">
+                  <a:solidFill>
+                    <a:srgbClr val="FFFFFF"/>
+                  </a:solidFill>
+                </a14:hiddenFill>
               </a:ext>
             </a:extLst>
-          </a:blip>
-          <a:srcRect/>
-          <a:stretch>
-            <a:fillRect/>
-          </a:stretch>
-        </p:blipFill>
-        <p:spPr bwMode="auto">
+          </p:spPr>
+        </p:pic>
+        <p:sp>
+          <p:nvSpPr>
+            <p:cNvPr id="18" name="CuadroTexto 17">
+              <a:hlinkClick r:id="rId7"/>
+            </p:cNvPr>
+            <p:cNvSpPr txBox="1"/>
+            <p:nvPr/>
+          </p:nvSpPr>
+          <p:spPr>
+            <a:xfrm>
+              <a:off x="8455589" y="6158666"/>
+              <a:ext cx="2262421" cy="338554"/>
+            </a:xfrm>
+            <a:prstGeom prst="rect">
+              <a:avLst/>
+            </a:prstGeom>
+            <a:noFill/>
+          </p:spPr>
+          <p:txBody>
+            <a:bodyPr wrap="square" rtlCol="0">
+              <a:spAutoFit/>
+            </a:bodyPr>
+            <a:lstStyle/>
+            <a:p>
+              <a:r>
+                <a:rPr lang="es-419" sz="1600" dirty="0" smtClean="0"/>
+                <a:t>Triggers</a:t>
+              </a:r>
+              <a:endParaRPr lang="es-ES" sz="1600" dirty="0"/>
+            </a:p>
+          </p:txBody>
+        </p:sp>
+      </p:grpSp>
+      <p:grpSp>
+        <p:nvGrpSpPr>
+          <p:cNvPr id="22" name="Grupo 21"/>
+          <p:cNvGrpSpPr/>
+          <p:nvPr/>
+        </p:nvGrpSpPr>
+        <p:grpSpPr>
           <a:xfrm>
-            <a:off x="5626360" y="4941168"/>
-            <a:ext cx="1098203" cy="1098203"/>
+            <a:off x="9046740" y="4353983"/>
+            <a:ext cx="2262421" cy="1565740"/>
+            <a:chOff x="7916472" y="4941168"/>
+            <a:chExt cx="2262421" cy="1565740"/>
           </a:xfrm>
-          <a:prstGeom prst="rect">
-            <a:avLst/>
-          </a:prstGeom>
-          <a:noFill/>
-          <a:extLst>
-            <a:ext uri="{909E8E84-426E-40DD-AFC4-6F175D3DCCD1}">
-              <a14:hiddenFill xmlns:a14="http://schemas.microsoft.com/office/drawing/2010/main">
-                <a:solidFill>
-                  <a:srgbClr val="FFFFFF"/>
-                </a:solidFill>
-              </a14:hiddenFill>
-            </a:ext>
-          </a:extLst>
-        </p:spPr>
-      </p:pic>
-      <p:pic>
-        <p:nvPicPr>
-          <p:cNvPr id="2052" name="Picture 4" descr="Icono de Excel (símbolo png) negro">
-            <a:hlinkClick r:id="rId7"/>
-          </p:cNvPr>
-          <p:cNvPicPr>
-            <a:picLocks noChangeAspect="1" noChangeArrowheads="1"/>
-          </p:cNvPicPr>
-          <p:nvPr/>
-        </p:nvPicPr>
-        <p:blipFill>
-          <a:blip r:embed="rId8" cstate="print">
+        </p:grpSpPr>
+        <p:pic>
+          <p:nvPicPr>
+            <p:cNvPr id="23" name="Picture 2" descr="GitHub - Apps on Google Play">
+              <a:hlinkClick r:id="rId8"/>
+            </p:cNvPr>
+            <p:cNvPicPr>
+              <a:picLocks noChangeAspect="1" noChangeArrowheads="1"/>
+            </p:cNvPicPr>
+            <p:nvPr/>
+          </p:nvPicPr>
+          <p:blipFill>
+            <a:blip r:embed="rId3" cstate="print">
+              <a:extLst>
+                <a:ext uri="{28A0092B-C50C-407E-A947-70E740481C1C}">
+                  <a14:useLocalDpi xmlns:a14="http://schemas.microsoft.com/office/drawing/2010/main" val="0"/>
+                </a:ext>
+              </a:extLst>
+            </a:blip>
+            <a:srcRect/>
+            <a:stretch>
+              <a:fillRect/>
+            </a:stretch>
+          </p:blipFill>
+          <p:spPr bwMode="auto">
+            <a:xfrm>
+              <a:off x="8236569" y="4941168"/>
+              <a:ext cx="1098203" cy="1098203"/>
+            </a:xfrm>
+            <a:prstGeom prst="rect">
+              <a:avLst/>
+            </a:prstGeom>
+            <a:noFill/>
             <a:extLst>
-              <a:ext uri="{28A0092B-C50C-407E-A947-70E740481C1C}">
-                <a14:useLocalDpi xmlns:a14="http://schemas.microsoft.com/office/drawing/2010/main" val="0"/>
+              <a:ext uri="{909E8E84-426E-40DD-AFC4-6F175D3DCCD1}">
+                <a14:hiddenFill xmlns:a14="http://schemas.microsoft.com/office/drawing/2010/main">
+                  <a:solidFill>
+                    <a:srgbClr val="FFFFFF"/>
+                  </a:solidFill>
+                </a14:hiddenFill>
               </a:ext>
             </a:extLst>
-          </a:blip>
-          <a:srcRect/>
-          <a:stretch>
-            <a:fillRect/>
-          </a:stretch>
-        </p:blipFill>
-        <p:spPr bwMode="auto">
-          <a:xfrm>
-            <a:off x="10037857" y="1718540"/>
-            <a:ext cx="1296144" cy="1296144"/>
-          </a:xfrm>
-          <a:prstGeom prst="rect">
-            <a:avLst/>
-          </a:prstGeom>
-          <a:noFill/>
-          <a:extLst>
-            <a:ext uri="{909E8E84-426E-40DD-AFC4-6F175D3DCCD1}">
-              <a14:hiddenFill xmlns:a14="http://schemas.microsoft.com/office/drawing/2010/main">
-                <a:solidFill>
-                  <a:srgbClr val="FFFFFF"/>
-                </a:solidFill>
-              </a14:hiddenFill>
-            </a:ext>
-          </a:extLst>
-        </p:spPr>
-      </p:pic>
-      <p:sp>
-        <p:nvSpPr>
-          <p:cNvPr id="4" name="CuadroTexto 3"/>
-          <p:cNvSpPr txBox="1"/>
-          <p:nvPr/>
-        </p:nvSpPr>
-        <p:spPr>
-          <a:xfrm>
-            <a:off x="1557908" y="3156711"/>
-            <a:ext cx="1944216" cy="338554"/>
-          </a:xfrm>
-          <a:prstGeom prst="rect">
-            <a:avLst/>
-          </a:prstGeom>
-          <a:noFill/>
-        </p:spPr>
-        <p:txBody>
-          <a:bodyPr wrap="square" rtlCol="0">
-            <a:spAutoFit/>
-          </a:bodyPr>
-          <a:lstStyle/>
-          <a:p>
-            <a:r>
-              <a:rPr lang="es-419" sz="1600" dirty="0" smtClean="0"/>
-              <a:t>Creación de tablas</a:t>
-            </a:r>
-            <a:endParaRPr lang="es-ES" sz="1600" dirty="0"/>
-          </a:p>
-        </p:txBody>
-      </p:sp>
-      <p:sp>
-        <p:nvSpPr>
-          <p:cNvPr id="12" name="CuadroTexto 11"/>
-          <p:cNvSpPr txBox="1"/>
-          <p:nvPr/>
-        </p:nvSpPr>
-        <p:spPr>
-          <a:xfrm>
-            <a:off x="4690256" y="3158098"/>
-            <a:ext cx="1944216" cy="338554"/>
-          </a:xfrm>
-          <a:prstGeom prst="rect">
-            <a:avLst/>
-          </a:prstGeom>
-          <a:noFill/>
-        </p:spPr>
-        <p:txBody>
-          <a:bodyPr wrap="square" rtlCol="0">
-            <a:spAutoFit/>
-          </a:bodyPr>
-          <a:lstStyle/>
-          <a:p>
-            <a:r>
-              <a:rPr lang="es-419" sz="1600" dirty="0" smtClean="0"/>
-              <a:t>Script </a:t>
-            </a:r>
-            <a:r>
-              <a:rPr lang="es-419" sz="1600" dirty="0" err="1" smtClean="0"/>
-              <a:t>insert</a:t>
-            </a:r>
-            <a:endParaRPr lang="es-ES" sz="1600" dirty="0"/>
-          </a:p>
-        </p:txBody>
-      </p:sp>
-      <p:sp>
-        <p:nvSpPr>
-          <p:cNvPr id="13" name="CuadroTexto 12"/>
-          <p:cNvSpPr txBox="1"/>
-          <p:nvPr/>
-        </p:nvSpPr>
-        <p:spPr>
-          <a:xfrm>
-            <a:off x="7390556" y="3161847"/>
-            <a:ext cx="1944216" cy="338554"/>
-          </a:xfrm>
-          <a:prstGeom prst="rect">
-            <a:avLst/>
-          </a:prstGeom>
-          <a:noFill/>
-        </p:spPr>
-        <p:txBody>
-          <a:bodyPr wrap="square" rtlCol="0">
-            <a:spAutoFit/>
-          </a:bodyPr>
-          <a:lstStyle/>
-          <a:p>
-            <a:r>
-              <a:rPr lang="es-419" sz="1600" dirty="0" smtClean="0"/>
-              <a:t>Creación de vistas</a:t>
-            </a:r>
-            <a:endParaRPr lang="es-ES" sz="1600" dirty="0"/>
-          </a:p>
-        </p:txBody>
-      </p:sp>
-      <p:sp>
-        <p:nvSpPr>
-          <p:cNvPr id="14" name="CuadroTexto 13"/>
-          <p:cNvSpPr txBox="1"/>
-          <p:nvPr/>
-        </p:nvSpPr>
-        <p:spPr>
-          <a:xfrm>
-            <a:off x="10163952" y="3122664"/>
-            <a:ext cx="1944216" cy="338554"/>
-          </a:xfrm>
-          <a:prstGeom prst="rect">
-            <a:avLst/>
-          </a:prstGeom>
-          <a:noFill/>
-        </p:spPr>
-        <p:txBody>
-          <a:bodyPr wrap="square" rtlCol="0">
-            <a:spAutoFit/>
-          </a:bodyPr>
-          <a:lstStyle/>
-          <a:p>
-            <a:r>
-              <a:rPr lang="es-419" sz="1600" dirty="0" err="1" smtClean="0"/>
-              <a:t>Import</a:t>
-            </a:r>
-            <a:r>
-              <a:rPr lang="es-419" sz="1600" dirty="0" smtClean="0"/>
-              <a:t> data</a:t>
-            </a:r>
-            <a:endParaRPr lang="es-ES" sz="1600" dirty="0"/>
-          </a:p>
-        </p:txBody>
-      </p:sp>
-      <p:sp>
-        <p:nvSpPr>
-          <p:cNvPr id="15" name="CuadroTexto 14"/>
-          <p:cNvSpPr txBox="1"/>
-          <p:nvPr/>
-        </p:nvSpPr>
-        <p:spPr>
-          <a:xfrm>
-            <a:off x="5752455" y="6334581"/>
-            <a:ext cx="1944216" cy="338554"/>
-          </a:xfrm>
-          <a:prstGeom prst="rect">
-            <a:avLst/>
-          </a:prstGeom>
-          <a:noFill/>
-        </p:spPr>
-        <p:txBody>
-          <a:bodyPr wrap="square" rtlCol="0">
-            <a:spAutoFit/>
-          </a:bodyPr>
-          <a:lstStyle/>
-          <a:p>
-            <a:r>
-              <a:rPr lang="es-419" sz="1600" dirty="0" smtClean="0"/>
-              <a:t>Funciones</a:t>
-            </a:r>
-            <a:endParaRPr lang="es-ES" sz="1600" dirty="0"/>
-          </a:p>
-        </p:txBody>
-      </p:sp>
-      <p:sp>
-        <p:nvSpPr>
-          <p:cNvPr id="16" name="CuadroTexto 15"/>
-          <p:cNvSpPr txBox="1"/>
-          <p:nvPr/>
-        </p:nvSpPr>
-        <p:spPr>
-          <a:xfrm>
-            <a:off x="2757137" y="6211470"/>
-            <a:ext cx="2262421" cy="584775"/>
-          </a:xfrm>
-          <a:prstGeom prst="rect">
-            <a:avLst/>
-          </a:prstGeom>
-          <a:noFill/>
-        </p:spPr>
-        <p:txBody>
-          <a:bodyPr wrap="square" rtlCol="0">
-            <a:spAutoFit/>
-          </a:bodyPr>
-          <a:lstStyle/>
-          <a:p>
-            <a:r>
-              <a:rPr lang="es-419" sz="1600" dirty="0" smtClean="0"/>
-              <a:t>Procedimientos almacenados</a:t>
-            </a:r>
-            <a:endParaRPr lang="es-ES" sz="1600" dirty="0"/>
-          </a:p>
-        </p:txBody>
-      </p:sp>
-      <p:pic>
-        <p:nvPicPr>
-          <p:cNvPr id="17" name="Picture 2" descr="GitHub - Apps on Google Play">
-            <a:hlinkClick r:id="rId9"/>
-          </p:cNvPr>
-          <p:cNvPicPr>
-            <a:picLocks noChangeAspect="1" noChangeArrowheads="1"/>
-          </p:cNvPicPr>
-          <p:nvPr/>
-        </p:nvPicPr>
-        <p:blipFill>
-          <a:blip r:embed="rId3" cstate="print">
-            <a:extLst>
-              <a:ext uri="{28A0092B-C50C-407E-A947-70E740481C1C}">
-                <a14:useLocalDpi xmlns:a14="http://schemas.microsoft.com/office/drawing/2010/main" val="0"/>
-              </a:ext>
-            </a:extLst>
-          </a:blip>
-          <a:srcRect/>
-          <a:stretch>
-            <a:fillRect/>
-          </a:stretch>
-        </p:blipFill>
-        <p:spPr bwMode="auto">
-          <a:xfrm>
-            <a:off x="8236569" y="4941168"/>
-            <a:ext cx="1098203" cy="1098203"/>
-          </a:xfrm>
-          <a:prstGeom prst="rect">
-            <a:avLst/>
-          </a:prstGeom>
-          <a:noFill/>
-          <a:extLst>
-            <a:ext uri="{909E8E84-426E-40DD-AFC4-6F175D3DCCD1}">
-              <a14:hiddenFill xmlns:a14="http://schemas.microsoft.com/office/drawing/2010/main">
-                <a:solidFill>
-                  <a:srgbClr val="FFFFFF"/>
-                </a:solidFill>
-              </a14:hiddenFill>
-            </a:ext>
-          </a:extLst>
-        </p:spPr>
-      </p:pic>
-      <p:sp>
-        <p:nvSpPr>
-          <p:cNvPr id="18" name="CuadroTexto 17"/>
-          <p:cNvSpPr txBox="1"/>
-          <p:nvPr/>
-        </p:nvSpPr>
-        <p:spPr>
-          <a:xfrm>
-            <a:off x="8192099" y="6211470"/>
-            <a:ext cx="2262421" cy="338554"/>
-          </a:xfrm>
-          <a:prstGeom prst="rect">
-            <a:avLst/>
-          </a:prstGeom>
-          <a:noFill/>
-        </p:spPr>
-        <p:txBody>
-          <a:bodyPr wrap="square" rtlCol="0">
-            <a:spAutoFit/>
-          </a:bodyPr>
-          <a:lstStyle/>
-          <a:p>
-            <a:r>
-              <a:rPr lang="es-419" sz="1600" dirty="0" err="1" smtClean="0"/>
-              <a:t>Triggers</a:t>
-            </a:r>
-            <a:endParaRPr lang="es-ES" sz="1600" dirty="0"/>
-          </a:p>
-        </p:txBody>
-      </p:sp>
+          </p:spPr>
+        </p:pic>
+        <p:sp>
+          <p:nvSpPr>
+            <p:cNvPr id="24" name="CuadroTexto 23">
+              <a:hlinkClick r:id="rId8"/>
+            </p:cNvPr>
+            <p:cNvSpPr txBox="1"/>
+            <p:nvPr/>
+          </p:nvSpPr>
+          <p:spPr>
+            <a:xfrm>
+              <a:off x="7916472" y="6168354"/>
+              <a:ext cx="2262421" cy="338554"/>
+            </a:xfrm>
+            <a:prstGeom prst="rect">
+              <a:avLst/>
+            </a:prstGeom>
+            <a:noFill/>
+          </p:spPr>
+          <p:txBody>
+            <a:bodyPr wrap="square" rtlCol="0">
+              <a:spAutoFit/>
+            </a:bodyPr>
+            <a:lstStyle/>
+            <a:p>
+              <a:r>
+                <a:rPr lang="es-419" sz="1600" dirty="0" smtClean="0"/>
+                <a:t>Usuarios y permisos</a:t>
+              </a:r>
+              <a:endParaRPr lang="es-ES" sz="1600" dirty="0"/>
+            </a:p>
+          </p:txBody>
+        </p:sp>
+      </p:grpSp>
     </p:spTree>
     <p:extLst>
       <p:ext uri="{BB962C8B-B14F-4D97-AF65-F5344CB8AC3E}">
@@ -11975,6 +12085,76 @@
       </p:par>
     </p:tnLst>
   </p:timing>
+</p:sld>
+</file>
+
+<file path=ppt/slides/slide24.xml><?xml version="1.0" encoding="utf-8"?>
+<p:sld xmlns:a="http://schemas.openxmlformats.org/drawingml/2006/main" xmlns:r="http://schemas.openxmlformats.org/officeDocument/2006/relationships" xmlns:p="http://schemas.openxmlformats.org/presentationml/2006/main">
+  <p:cSld>
+    <p:spTree>
+      <p:nvGrpSpPr>
+        <p:cNvPr id="1" name=""/>
+        <p:cNvGrpSpPr/>
+        <p:nvPr/>
+      </p:nvGrpSpPr>
+      <p:grpSpPr>
+        <a:xfrm>
+          <a:off x="0" y="0"/>
+          <a:ext cx="0" cy="0"/>
+          <a:chOff x="0" y="0"/>
+          <a:chExt cx="0" cy="0"/>
+        </a:xfrm>
+      </p:grpSpPr>
+      <p:sp>
+        <p:nvSpPr>
+          <p:cNvPr id="5" name="Marcador de texto 4"/>
+          <p:cNvSpPr>
+            <a:spLocks noGrp="1"/>
+          </p:cNvSpPr>
+          <p:nvPr>
+            <p:ph type="body" idx="1"/>
+          </p:nvPr>
+        </p:nvSpPr>
+        <p:spPr>
+          <a:xfrm>
+            <a:off x="3286100" y="2852936"/>
+            <a:ext cx="7069519" cy="1220933"/>
+          </a:xfrm>
+        </p:spPr>
+        <p:txBody>
+          <a:bodyPr/>
+          <a:lstStyle/>
+          <a:p>
+            <a:r>
+              <a:rPr lang="es-419" dirty="0" smtClean="0"/>
+              <a:t>SCRIPTS DE INSERCIÓN DE DATOS</a:t>
+            </a:r>
+            <a:endParaRPr lang="es-ES" dirty="0"/>
+          </a:p>
+        </p:txBody>
+      </p:sp>
+    </p:spTree>
+    <p:extLst>
+      <p:ext uri="{BB962C8B-B14F-4D97-AF65-F5344CB8AC3E}">
+        <p14:creationId xmlns:p14="http://schemas.microsoft.com/office/powerpoint/2010/main" val="713166292"/>
+      </p:ext>
+    </p:extLst>
+  </p:cSld>
+  <p:clrMapOvr>
+    <a:masterClrMapping/>
+  </p:clrMapOvr>
+  <mc:AlternateContent xmlns:mc="http://schemas.openxmlformats.org/markup-compatibility/2006" xmlns:p14="http://schemas.microsoft.com/office/powerpoint/2010/main">
+    <mc:Choice Requires="p14">
+      <p:transition spd="med" p14:dur="700">
+        <p:fade/>
+      </p:transition>
+    </mc:Choice>
+    <mc:Fallback xmlns="">
+      <p:transition spd="med">
+        <p:fade/>
+      </p:transition>
+    </mc:Fallback>
+  </mc:AlternateContent>
 </p:sld>
 </file>
 
@@ -12092,10 +12272,6 @@
           </a:lstStyle>
           <a:p>
             <a:pPr algn="ctr"/>
-            <a:r>
-              <a:rPr lang="es-419" sz="1600" u="sng" dirty="0" smtClean="0"/>
-              <a:t>Clic para ir al manual</a:t>
-            </a:r>
             <a:endParaRPr lang="es-ES" sz="1600" u="sng" dirty="0"/>
           </a:p>
         </p:txBody>
@@ -12133,6 +12309,267 @@
 </file>
 
 <file path=ppt/slides/slide26.xml><?xml version="1.0" encoding="utf-8"?>
+<p:sld xmlns:a="http://schemas.openxmlformats.org/drawingml/2006/main" xmlns:r="http://schemas.openxmlformats.org/officeDocument/2006/relationships" xmlns:p="http://schemas.openxmlformats.org/presentationml/2006/main">
+  <p:cSld>
+    <p:spTree>
+      <p:nvGrpSpPr>
+        <p:cNvPr id="1" name=""/>
+        <p:cNvGrpSpPr/>
+        <p:nvPr/>
+      </p:nvGrpSpPr>
+      <p:grpSpPr>
+        <a:xfrm>
+          <a:off x="0" y="0"/>
+          <a:ext cx="0" cy="0"/>
+          <a:chOff x="0" y="0"/>
+          <a:chExt cx="0" cy="0"/>
+        </a:xfrm>
+      </p:grpSpPr>
+      <p:sp>
+        <p:nvSpPr>
+          <p:cNvPr id="2" name="Título 1"/>
+          <p:cNvSpPr>
+            <a:spLocks noGrp="1"/>
+          </p:cNvSpPr>
+          <p:nvPr>
+            <p:ph type="title"/>
+          </p:nvPr>
+        </p:nvSpPr>
+        <p:spPr/>
+        <p:txBody>
+          <a:bodyPr/>
+          <a:lstStyle/>
+          <a:p>
+            <a:pPr algn="ctr"/>
+            <a:r>
+              <a:rPr lang="es-419" dirty="0" smtClean="0"/>
+              <a:t>Scripts</a:t>
+            </a:r>
+            <a:endParaRPr lang="es-ES" dirty="0"/>
+          </a:p>
+        </p:txBody>
+      </p:sp>
+      <p:grpSp>
+        <p:nvGrpSpPr>
+          <p:cNvPr id="3" name="Grupo 2"/>
+          <p:cNvGrpSpPr/>
+          <p:nvPr/>
+        </p:nvGrpSpPr>
+        <p:grpSpPr>
+          <a:xfrm>
+            <a:off x="2998068" y="2327740"/>
+            <a:ext cx="2483825" cy="1583830"/>
+            <a:chOff x="2998068" y="2327740"/>
+            <a:chExt cx="2483825" cy="1583830"/>
+          </a:xfrm>
+        </p:grpSpPr>
+        <p:pic>
+          <p:nvPicPr>
+            <p:cNvPr id="8" name="Picture 2" descr="GitHub - Apps on Google Play">
+              <a:hlinkClick r:id="rId2"/>
+            </p:cNvPr>
+            <p:cNvPicPr>
+              <a:picLocks noChangeAspect="1" noChangeArrowheads="1"/>
+            </p:cNvPicPr>
+            <p:nvPr/>
+          </p:nvPicPr>
+          <p:blipFill>
+            <a:blip r:embed="rId3" cstate="print">
+              <a:extLst>
+                <a:ext uri="{28A0092B-C50C-407E-A947-70E740481C1C}">
+                  <a14:useLocalDpi xmlns:a14="http://schemas.microsoft.com/office/drawing/2010/main" val="0"/>
+                </a:ext>
+              </a:extLst>
+            </a:blip>
+            <a:srcRect/>
+            <a:stretch>
+              <a:fillRect/>
+            </a:stretch>
+          </p:blipFill>
+          <p:spPr bwMode="auto">
+            <a:xfrm>
+              <a:off x="3430116" y="2327740"/>
+              <a:ext cx="1098203" cy="1098203"/>
+            </a:xfrm>
+            <a:prstGeom prst="rect">
+              <a:avLst/>
+            </a:prstGeom>
+            <a:noFill/>
+            <a:extLst>
+              <a:ext uri="{909E8E84-426E-40DD-AFC4-6F175D3DCCD1}">
+                <a14:hiddenFill xmlns:a14="http://schemas.microsoft.com/office/drawing/2010/main">
+                  <a:solidFill>
+                    <a:srgbClr val="FFFFFF"/>
+                  </a:solidFill>
+                </a14:hiddenFill>
+              </a:ext>
+            </a:extLst>
+          </p:spPr>
+        </p:pic>
+        <p:sp>
+          <p:nvSpPr>
+            <p:cNvPr id="12" name="CuadroTexto 11">
+              <a:hlinkClick r:id="rId2"/>
+            </p:cNvPr>
+            <p:cNvSpPr txBox="1"/>
+            <p:nvPr/>
+          </p:nvSpPr>
+          <p:spPr>
+            <a:xfrm>
+              <a:off x="2998068" y="3573016"/>
+              <a:ext cx="2483825" cy="338554"/>
+            </a:xfrm>
+            <a:prstGeom prst="rect">
+              <a:avLst/>
+            </a:prstGeom>
+            <a:noFill/>
+          </p:spPr>
+          <p:txBody>
+            <a:bodyPr wrap="square" rtlCol="0">
+              <a:spAutoFit/>
+            </a:bodyPr>
+            <a:lstStyle/>
+            <a:p>
+              <a:r>
+                <a:rPr lang="es-419" sz="1600" dirty="0" smtClean="0"/>
+                <a:t>Script </a:t>
+              </a:r>
+              <a:r>
+                <a:rPr lang="es-419" sz="1600" dirty="0" smtClean="0"/>
+                <a:t>inserción de datos</a:t>
+              </a:r>
+              <a:endParaRPr lang="es-ES" sz="1600" dirty="0"/>
+            </a:p>
+          </p:txBody>
+        </p:sp>
+      </p:grpSp>
+      <p:grpSp>
+        <p:nvGrpSpPr>
+          <p:cNvPr id="7" name="Grupo 6"/>
+          <p:cNvGrpSpPr/>
+          <p:nvPr/>
+        </p:nvGrpSpPr>
+        <p:grpSpPr>
+          <a:xfrm>
+            <a:off x="7390556" y="2168892"/>
+            <a:ext cx="2070311" cy="1742678"/>
+            <a:chOff x="10037857" y="1718540"/>
+            <a:chExt cx="2070311" cy="1742678"/>
+          </a:xfrm>
+        </p:grpSpPr>
+        <p:pic>
+          <p:nvPicPr>
+            <p:cNvPr id="2052" name="Picture 4" descr="Icono de Excel (símbolo png) negro">
+              <a:hlinkClick r:id="rId4"/>
+            </p:cNvPr>
+            <p:cNvPicPr>
+              <a:picLocks noChangeAspect="1" noChangeArrowheads="1"/>
+            </p:cNvPicPr>
+            <p:nvPr/>
+          </p:nvPicPr>
+          <p:blipFill>
+            <a:blip r:embed="rId5" cstate="print">
+              <a:extLst>
+                <a:ext uri="{28A0092B-C50C-407E-A947-70E740481C1C}">
+                  <a14:useLocalDpi xmlns:a14="http://schemas.microsoft.com/office/drawing/2010/main" val="0"/>
+                </a:ext>
+              </a:extLst>
+            </a:blip>
+            <a:srcRect/>
+            <a:stretch>
+              <a:fillRect/>
+            </a:stretch>
+          </p:blipFill>
+          <p:spPr bwMode="auto">
+            <a:xfrm>
+              <a:off x="10037857" y="1718540"/>
+              <a:ext cx="1296144" cy="1296144"/>
+            </a:xfrm>
+            <a:prstGeom prst="rect">
+              <a:avLst/>
+            </a:prstGeom>
+            <a:noFill/>
+            <a:extLst>
+              <a:ext uri="{909E8E84-426E-40DD-AFC4-6F175D3DCCD1}">
+                <a14:hiddenFill xmlns:a14="http://schemas.microsoft.com/office/drawing/2010/main">
+                  <a:solidFill>
+                    <a:srgbClr val="FFFFFF"/>
+                  </a:solidFill>
+                </a14:hiddenFill>
+              </a:ext>
+            </a:extLst>
+          </p:spPr>
+        </p:pic>
+        <p:sp>
+          <p:nvSpPr>
+            <p:cNvPr id="14" name="CuadroTexto 13">
+              <a:hlinkClick r:id="rId4"/>
+            </p:cNvPr>
+            <p:cNvSpPr txBox="1"/>
+            <p:nvPr/>
+          </p:nvSpPr>
+          <p:spPr>
+            <a:xfrm>
+              <a:off x="10163952" y="3122664"/>
+              <a:ext cx="1944216" cy="338554"/>
+            </a:xfrm>
+            <a:prstGeom prst="rect">
+              <a:avLst/>
+            </a:prstGeom>
+            <a:noFill/>
+          </p:spPr>
+          <p:txBody>
+            <a:bodyPr wrap="square" rtlCol="0">
+              <a:spAutoFit/>
+            </a:bodyPr>
+            <a:lstStyle/>
+            <a:p>
+              <a:r>
+                <a:rPr lang="es-419" sz="1600" dirty="0" err="1" smtClean="0"/>
+                <a:t>Import</a:t>
+              </a:r>
+              <a:r>
+                <a:rPr lang="es-419" sz="1600" dirty="0" smtClean="0"/>
+                <a:t> data</a:t>
+              </a:r>
+              <a:endParaRPr lang="es-ES" sz="1600" dirty="0"/>
+            </a:p>
+          </p:txBody>
+        </p:sp>
+      </p:grpSp>
+    </p:spTree>
+    <p:extLst>
+      <p:ext uri="{BB962C8B-B14F-4D97-AF65-F5344CB8AC3E}">
+        <p14:creationId xmlns:p14="http://schemas.microsoft.com/office/powerpoint/2010/main" val="1422183365"/>
+      </p:ext>
+    </p:extLst>
+  </p:cSld>
+  <p:clrMapOvr>
+    <a:masterClrMapping/>
+  </p:clrMapOvr>
+  <mc:AlternateContent xmlns:mc="http://schemas.openxmlformats.org/markup-compatibility/2006" xmlns:p14="http://schemas.microsoft.com/office/powerpoint/2010/main">
+    <mc:Choice Requires="p14">
+      <p:transition spd="med" p14:dur="700">
+        <p:fade/>
+      </p:transition>
+    </mc:Choice>
+    <mc:Fallback xmlns="">
+      <p:transition spd="med">
+        <p:fade/>
+      </p:transition>
+    </mc:Fallback>
+  </mc:AlternateContent>
+  <p:timing>
+    <p:tnLst>
+      <p:par>
+        <p:cTn id="1" dur="indefinite" restart="never" nodeType="tmRoot"/>
+      </p:par>
+    </p:tnLst>
+  </p:timing>
+</p:sld>
+</file>
+
+<file path=ppt/slides/slide27.xml><?xml version="1.0" encoding="utf-8"?>
 <p:sld xmlns:a="http://schemas.openxmlformats.org/drawingml/2006/main" xmlns:r="http://schemas.openxmlformats.org/officeDocument/2006/relationships" xmlns:p="http://schemas.openxmlformats.org/presentationml/2006/main">
   <p:cSld>
     <p:spTree>
@@ -12547,90 +12984,6 @@
         </p:nvSpPr>
         <p:spPr/>
         <p:txBody>
-          <a:bodyPr/>
-          <a:lstStyle/>
-          <a:p>
-            <a:r>
-              <a:rPr lang="es-419" dirty="0" smtClean="0"/>
-              <a:t>Modelo de negocio</a:t>
-            </a:r>
-            <a:endParaRPr lang="es-ES" dirty="0"/>
-          </a:p>
-        </p:txBody>
-      </p:sp>
-      <p:sp>
-        <p:nvSpPr>
-          <p:cNvPr id="3" name="Marcador de contenido 2"/>
-          <p:cNvSpPr>
-            <a:spLocks noGrp="1"/>
-          </p:cNvSpPr>
-          <p:nvPr>
-            <p:ph idx="1"/>
-          </p:nvPr>
-        </p:nvSpPr>
-        <p:spPr/>
-        <p:txBody>
-          <a:bodyPr/>
-          <a:lstStyle/>
-          <a:p>
-            <a:endParaRPr lang="es-ES"/>
-          </a:p>
-        </p:txBody>
-      </p:sp>
-    </p:spTree>
-    <p:extLst>
-      <p:ext uri="{BB962C8B-B14F-4D97-AF65-F5344CB8AC3E}">
-        <p14:creationId xmlns:p14="http://schemas.microsoft.com/office/powerpoint/2010/main" val="2132770168"/>
-      </p:ext>
-    </p:extLst>
-  </p:cSld>
-  <p:clrMapOvr>
-    <a:masterClrMapping/>
-  </p:clrMapOvr>
-  <mc:AlternateContent xmlns:mc="http://schemas.openxmlformats.org/markup-compatibility/2006" xmlns:p14="http://schemas.microsoft.com/office/powerpoint/2010/main">
-    <mc:Choice Requires="p14">
-      <p:transition spd="med" p14:dur="700">
-        <p:fade/>
-      </p:transition>
-    </mc:Choice>
-    <mc:Fallback xmlns="">
-      <p:transition spd="med">
-        <p:fade/>
-      </p:transition>
-    </mc:Fallback>
-  </mc:AlternateContent>
-</p:sld>
-</file>
-
-<file path=ppt/slides/slide5.xml><?xml version="1.0" encoding="utf-8"?>
-<p:sld xmlns:a="http://schemas.openxmlformats.org/drawingml/2006/main" xmlns:r="http://schemas.openxmlformats.org/officeDocument/2006/relationships" xmlns:p="http://schemas.openxmlformats.org/presentationml/2006/main">
-  <p:cSld>
-    <p:spTree>
-      <p:nvGrpSpPr>
-        <p:cNvPr id="1" name=""/>
-        <p:cNvGrpSpPr/>
-        <p:nvPr/>
-      </p:nvGrpSpPr>
-      <p:grpSpPr>
-        <a:xfrm>
-          <a:off x="0" y="0"/>
-          <a:ext cx="0" cy="0"/>
-          <a:chOff x="0" y="0"/>
-          <a:chExt cx="0" cy="0"/>
-        </a:xfrm>
-      </p:grpSpPr>
-      <p:sp>
-        <p:nvSpPr>
-          <p:cNvPr id="2" name="Título 1"/>
-          <p:cNvSpPr>
-            <a:spLocks noGrp="1"/>
-          </p:cNvSpPr>
-          <p:nvPr>
-            <p:ph type="title"/>
-          </p:nvPr>
-        </p:nvSpPr>
-        <p:spPr/>
-        <p:txBody>
           <a:bodyPr rtlCol="0"/>
           <a:lstStyle/>
           <a:p>
@@ -12660,39 +13013,28 @@
         <p:spPr/>
         <p:txBody>
           <a:bodyPr rtlCol="0">
-            <a:normAutofit fontScale="92500" lnSpcReduction="10000"/>
+            <a:normAutofit/>
           </a:bodyPr>
           <a:lstStyle/>
           <a:p>
             <a:pPr rtl="0"/>
             <a:r>
               <a:rPr lang="es-419" dirty="0" smtClean="0"/>
-              <a:t>Base de datos que tiene como debe permitir registrar toda la información del cliente, información del pedido que realice y del listado de productos, así mismo permite el manejo de proveedores, los envíos de los pedidos y el estado de los envíos.</a:t>
-            </a:r>
-          </a:p>
-          <a:p>
-            <a:pPr rtl="0"/>
-            <a:r>
-              <a:rPr lang="es-419" dirty="0" smtClean="0"/>
-              <a:t>Cuenta con la siguientes tablas: cliente, producto, pedido, detallepedido, categoría, envío, </a:t>
-            </a:r>
-            <a:r>
-              <a:rPr lang="es-419" dirty="0" err="1" smtClean="0"/>
-              <a:t>detalleenvio</a:t>
+              <a:t>Base de datos que tiene como </a:t>
             </a:r>
             <a:r>
               <a:rPr lang="es-419" dirty="0" smtClean="0"/>
-              <a:t>, proveedor y la tabla relación </a:t>
+              <a:t>objetivo permitir </a:t>
             </a:r>
             <a:r>
-              <a:rPr lang="es-419" dirty="0" err="1" smtClean="0"/>
-              <a:t>productoproveedor</a:t>
+              <a:rPr lang="es-419" dirty="0" smtClean="0"/>
+              <a:t>registrar toda la información del cliente, información del pedido que realice y del listado de productos, así mismo permite el manejo de proveedores, los envíos de los pedidos y el estado de los envíos</a:t>
             </a:r>
             <a:r>
-              <a:rPr lang="es-419" dirty="0"/>
+              <a:rPr lang="es-419" dirty="0" smtClean="0"/>
               <a:t>.</a:t>
             </a:r>
-            <a:endParaRPr lang="es-ES" dirty="0" smtClean="0"/>
+            <a:endParaRPr lang="es-419" dirty="0" smtClean="0"/>
           </a:p>
         </p:txBody>
       </p:sp>
@@ -12746,7 +13088,7 @@
 </p:sld>
 </file>
 
-<file path=ppt/slides/slide6.xml><?xml version="1.0" encoding="utf-8"?>
+<file path=ppt/slides/slide5.xml><?xml version="1.0" encoding="utf-8"?>
 <p:sld xmlns:a="http://schemas.openxmlformats.org/drawingml/2006/main" xmlns:r="http://schemas.openxmlformats.org/officeDocument/2006/relationships" xmlns:p="http://schemas.openxmlformats.org/presentationml/2006/main">
   <p:cSld>
     <p:spTree>
@@ -12816,7 +13158,7 @@
 </p:sld>
 </file>
 
-<file path=ppt/slides/slide7.xml><?xml version="1.0" encoding="utf-8"?>
+<file path=ppt/slides/slide6.xml><?xml version="1.0" encoding="utf-8"?>
 <p:sld xmlns:a="http://schemas.openxmlformats.org/drawingml/2006/main" xmlns:r="http://schemas.openxmlformats.org/officeDocument/2006/relationships" xmlns:p="http://schemas.openxmlformats.org/presentationml/2006/main">
   <p:cSld>
     <p:spTree>
@@ -12913,7 +13255,7 @@
 </p:sld>
 </file>
 
-<file path=ppt/slides/slide8.xml><?xml version="1.0" encoding="utf-8"?>
+<file path=ppt/slides/slide7.xml><?xml version="1.0" encoding="utf-8"?>
 <p:sld xmlns:a="http://schemas.openxmlformats.org/drawingml/2006/main" xmlns:r="http://schemas.openxmlformats.org/officeDocument/2006/relationships" xmlns:p="http://schemas.openxmlformats.org/presentationml/2006/main">
   <p:cSld>
     <p:spTree>
@@ -12987,6 +13329,130 @@
       </p:par>
     </p:tnLst>
   </p:timing>
+</p:sld>
+</file>
+
+<file path=ppt/slides/slide8.xml><?xml version="1.0" encoding="utf-8"?>
+<p:sld xmlns:a="http://schemas.openxmlformats.org/drawingml/2006/main" xmlns:r="http://schemas.openxmlformats.org/officeDocument/2006/relationships" xmlns:p="http://schemas.openxmlformats.org/presentationml/2006/main">
+  <p:cSld>
+    <p:spTree>
+      <p:nvGrpSpPr>
+        <p:cNvPr id="1" name=""/>
+        <p:cNvGrpSpPr/>
+        <p:nvPr/>
+      </p:nvGrpSpPr>
+      <p:grpSpPr>
+        <a:xfrm>
+          <a:off x="0" y="0"/>
+          <a:ext cx="0" cy="0"/>
+          <a:chOff x="0" y="0"/>
+          <a:chExt cx="0" cy="0"/>
+        </a:xfrm>
+      </p:grpSpPr>
+      <p:sp>
+        <p:nvSpPr>
+          <p:cNvPr id="4" name="Título 3"/>
+          <p:cNvSpPr>
+            <a:spLocks noGrp="1"/>
+          </p:cNvSpPr>
+          <p:nvPr>
+            <p:ph type="title"/>
+          </p:nvPr>
+        </p:nvSpPr>
+        <p:spPr>
+          <a:xfrm>
+            <a:off x="1218882" y="1701800"/>
+            <a:ext cx="4062942" cy="791096"/>
+          </a:xfrm>
+        </p:spPr>
+        <p:txBody>
+          <a:bodyPr/>
+          <a:lstStyle/>
+          <a:p>
+            <a:r>
+              <a:rPr lang="es-419" dirty="0" smtClean="0"/>
+              <a:t>PAIS</a:t>
+            </a:r>
+            <a:endParaRPr lang="es-ES" dirty="0"/>
+          </a:p>
+        </p:txBody>
+      </p:sp>
+      <p:sp>
+        <p:nvSpPr>
+          <p:cNvPr id="6" name="Marcador de texto 5"/>
+          <p:cNvSpPr>
+            <a:spLocks noGrp="1"/>
+          </p:cNvSpPr>
+          <p:nvPr>
+            <p:ph type="body" sz="half" idx="2"/>
+          </p:nvPr>
+        </p:nvSpPr>
+        <p:spPr>
+          <a:xfrm>
+            <a:off x="1125860" y="2924944"/>
+            <a:ext cx="4062942" cy="1930400"/>
+          </a:xfrm>
+        </p:spPr>
+        <p:txBody>
+          <a:bodyPr/>
+          <a:lstStyle/>
+          <a:p>
+            <a:r>
+              <a:rPr lang="es-ES" dirty="0"/>
+              <a:t>Esta tabla esta creada para indicar el país de las partes interesadas (cliente, proveedor, etc.)</a:t>
+            </a:r>
+          </a:p>
+          <a:p>
+            <a:endParaRPr lang="es-ES" dirty="0"/>
+          </a:p>
+        </p:txBody>
+      </p:sp>
+      <p:pic>
+        <p:nvPicPr>
+          <p:cNvPr id="5" name="Imagen 4"/>
+          <p:cNvPicPr>
+            <a:picLocks noChangeAspect="1"/>
+          </p:cNvPicPr>
+          <p:nvPr/>
+        </p:nvPicPr>
+        <p:blipFill>
+          <a:blip r:embed="rId2"/>
+          <a:stretch>
+            <a:fillRect/>
+          </a:stretch>
+        </p:blipFill>
+        <p:spPr>
+          <a:xfrm>
+            <a:off x="5590356" y="2301056"/>
+            <a:ext cx="5962650" cy="1247775"/>
+          </a:xfrm>
+          <a:prstGeom prst="rect">
+            <a:avLst/>
+          </a:prstGeom>
+        </p:spPr>
+      </p:pic>
+    </p:spTree>
+    <p:extLst>
+      <p:ext uri="{BB962C8B-B14F-4D97-AF65-F5344CB8AC3E}">
+        <p14:creationId xmlns:p14="http://schemas.microsoft.com/office/powerpoint/2010/main" val="2857499387"/>
+      </p:ext>
+    </p:extLst>
+  </p:cSld>
+  <p:clrMapOvr>
+    <a:masterClrMapping/>
+  </p:clrMapOvr>
+  <mc:AlternateContent xmlns:mc="http://schemas.openxmlformats.org/markup-compatibility/2006" xmlns:p14="http://schemas.microsoft.com/office/powerpoint/2010/main">
+    <mc:Choice Requires="p14">
+      <p:transition spd="med" p14:dur="700">
+        <p:fade/>
+      </p:transition>
+    </mc:Choice>
+    <mc:Fallback xmlns="">
+      <p:transition spd="med">
+        <p:fade/>
+      </p:transition>
+    </mc:Fallback>
+  </mc:AlternateContent>
 </p:sld>
 </file>
 
@@ -13029,7 +13495,7 @@
           <a:p>
             <a:r>
               <a:rPr lang="es-419" dirty="0" smtClean="0"/>
-              <a:t>PAIS</a:t>
+              <a:t>CIUDAD</a:t>
             </a:r>
             <a:endParaRPr lang="es-ES" dirty="0"/>
           </a:p>
@@ -13057,7 +13523,7 @@
           <a:p>
             <a:r>
               <a:rPr lang="es-ES" dirty="0"/>
-              <a:t>Esta tabla esta creada para indicar el país de las partes interesadas (cliente, proveedor, etc.)</a:t>
+              <a:t>Esta tabla esta creada para indicar la ciudad de las partes interesadas (cliente, proveedor, etc.)</a:t>
             </a:r>
           </a:p>
           <a:p>
@@ -13067,7 +13533,7 @@
       </p:sp>
       <p:pic>
         <p:nvPicPr>
-          <p:cNvPr id="5" name="Imagen 4"/>
+          <p:cNvPr id="2" name="Imagen 1"/>
           <p:cNvPicPr>
             <a:picLocks noChangeAspect="1"/>
           </p:cNvPicPr>
@@ -13081,8 +13547,8 @@
         </p:blipFill>
         <p:spPr>
           <a:xfrm>
-            <a:off x="5590356" y="2301056"/>
-            <a:ext cx="5962650" cy="1247775"/>
+            <a:off x="5590356" y="2097348"/>
+            <a:ext cx="5934075" cy="1838325"/>
           </a:xfrm>
           <a:prstGeom prst="rect">
             <a:avLst/>
@@ -13092,7 +13558,7 @@
     </p:spTree>
     <p:extLst>
       <p:ext uri="{BB962C8B-B14F-4D97-AF65-F5344CB8AC3E}">
-        <p14:creationId xmlns:p14="http://schemas.microsoft.com/office/powerpoint/2010/main" val="2857499387"/>
+        <p14:creationId xmlns:p14="http://schemas.microsoft.com/office/powerpoint/2010/main" val="3969985584"/>
       </p:ext>
     </p:extLst>
   </p:cSld>
@@ -14065,6 +14531,15 @@
 </file>
 
 <file path=customXml/item1.xml><?xml version="1.0" encoding="utf-8"?>
+<?mso-contentType ?>
+<FormTemplates xmlns="http://schemas.microsoft.com/sharepoint/v3/contenttype/forms">
+  <Display>DocumentLibraryForm</Display>
+  <Edit>AssetEditForm</Edit>
+  <New>DocumentLibraryForm</New>
+</FormTemplates>
+</file>
+
+<file path=customXml/item2.xml><?xml version="1.0" encoding="utf-8"?>
 <ct:contentTypeSchema xmlns:ct="http://schemas.microsoft.com/office/2006/metadata/contentType" xmlns:ma="http://schemas.microsoft.com/office/2006/metadata/properties/metaAttributes" ct:_="" ma:_="" ma:contentTypeName="TemplateFile" ma:contentTypeID="0x0101006EDDDB5EE6D98C44930B742096920B300400F5B6D36B3EF94B4E9A635CDF2A18F5B8" ma:contentTypeVersion="72" ma:contentTypeDescription="Create a new document." ma:contentTypeScope="" ma:versionID="a23e56308344d904b51738559c3d67c9">
   <xsd:schema xmlns:xsd="http://www.w3.org/2001/XMLSchema" xmlns:xs="http://www.w3.org/2001/XMLSchema" xmlns:p="http://schemas.microsoft.com/office/2006/metadata/properties" xmlns:ns2="4873beb7-5857-4685-be1f-d57550cc96cc" targetNamespace="http://schemas.microsoft.com/office/2006/metadata/properties" ma:root="true" ma:fieldsID="cd0908cc4600e77bf5da051303e00c8d" ns2:_="">
     <xsd:import namespace="4873beb7-5857-4685-be1f-d57550cc96cc"/>
@@ -15104,15 +15579,6 @@
 </ct:contentTypeSchema>
 </file>
 
-<file path=customXml/item2.xml><?xml version="1.0" encoding="utf-8"?>
-<?mso-contentType ?>
-<FormTemplates xmlns="http://schemas.microsoft.com/sharepoint/v3/contenttype/forms">
-  <Display>DocumentLibraryForm</Display>
-  <Edit>AssetEditForm</Edit>
-  <New>DocumentLibraryForm</New>
-</FormTemplates>
-</file>
-
 <file path=customXml/item3.xml><?xml version="1.0" encoding="utf-8"?>
 <p:properties xmlns:p="http://schemas.microsoft.com/office/2006/metadata/properties" xmlns:xsi="http://www.w3.org/2001/XMLSchema-instance" xmlns:pc="http://schemas.microsoft.com/office/infopath/2007/PartnerControls">
   <documentManagement>
@@ -15250,6 +15716,14 @@
 </file>
 
 <file path=customXml/itemProps1.xml><?xml version="1.0" encoding="utf-8"?>
+<ds:datastoreItem xmlns:ds="http://schemas.openxmlformats.org/officeDocument/2006/customXml" ds:itemID="{3836F65B-1B07-41EE-A0E8-BC6EF3855225}">
+  <ds:schemaRefs>
+    <ds:schemaRef ds:uri="http://schemas.microsoft.com/sharepoint/v3/contenttype/forms"/>
+  </ds:schemaRefs>
+</ds:datastoreItem>
+</file>
+
+<file path=customXml/itemProps2.xml><?xml version="1.0" encoding="utf-8"?>
 <ds:datastoreItem xmlns:ds="http://schemas.openxmlformats.org/officeDocument/2006/customXml" ds:itemID="{A09BF4D4-EF60-4196-BFC3-9462D607978C}">
   <ds:schemaRefs>
     <ds:schemaRef ds:uri="http://schemas.microsoft.com/office/2006/metadata/contentType"/>
@@ -15263,14 +15737,6 @@
     <ds:schemaRef ds:uri="http://purl.org/dc/elements/1.1/"/>
     <ds:schemaRef ds:uri="http://purl.org/dc/terms/"/>
     <ds:schemaRef ds:uri="http://schemas.microsoft.com/internal/obd"/>
-  </ds:schemaRefs>
-</ds:datastoreItem>
-</file>
-
-<file path=customXml/itemProps2.xml><?xml version="1.0" encoding="utf-8"?>
-<ds:datastoreItem xmlns:ds="http://schemas.openxmlformats.org/officeDocument/2006/customXml" ds:itemID="{3836F65B-1B07-41EE-A0E8-BC6EF3855225}">
-  <ds:schemaRefs>
-    <ds:schemaRef ds:uri="http://schemas.microsoft.com/sharepoint/v3/contenttype/forms"/>
   </ds:schemaRefs>
 </ds:datastoreItem>
 </file>

</xml_diff>

<commit_message>
Se agrega introducción, objetivos y situacion problematica a la presentacion
</commit_message>
<xml_diff>
--- a/EcommerceVideojuegos+HubertFerrer.pptx
+++ b/EcommerceVideojuegos+HubertFerrer.pptx
@@ -5,39 +5,41 @@
     <p:sldMasterId id="2147483660" r:id="rId4"/>
   </p:sldMasterIdLst>
   <p:notesMasterIdLst>
-    <p:notesMasterId r:id="rId32"/>
+    <p:notesMasterId r:id="rId34"/>
   </p:notesMasterIdLst>
   <p:handoutMasterIdLst>
-    <p:handoutMasterId r:id="rId33"/>
+    <p:handoutMasterId r:id="rId35"/>
   </p:handoutMasterIdLst>
   <p:sldIdLst>
     <p:sldId id="257" r:id="rId5"/>
     <p:sldId id="284" r:id="rId6"/>
     <p:sldId id="285" r:id="rId7"/>
-    <p:sldId id="270" r:id="rId8"/>
-    <p:sldId id="271" r:id="rId9"/>
-    <p:sldId id="289" r:id="rId10"/>
-    <p:sldId id="272" r:id="rId11"/>
-    <p:sldId id="273" r:id="rId12"/>
-    <p:sldId id="292" r:id="rId13"/>
-    <p:sldId id="291" r:id="rId14"/>
-    <p:sldId id="274" r:id="rId15"/>
-    <p:sldId id="275" r:id="rId16"/>
-    <p:sldId id="276" r:id="rId17"/>
-    <p:sldId id="277" r:id="rId18"/>
-    <p:sldId id="293" r:id="rId19"/>
-    <p:sldId id="290" r:id="rId20"/>
-    <p:sldId id="278" r:id="rId21"/>
-    <p:sldId id="279" r:id="rId22"/>
-    <p:sldId id="281" r:id="rId23"/>
-    <p:sldId id="295" r:id="rId24"/>
-    <p:sldId id="296" r:id="rId25"/>
-    <p:sldId id="287" r:id="rId26"/>
-    <p:sldId id="283" r:id="rId27"/>
-    <p:sldId id="297" r:id="rId28"/>
-    <p:sldId id="282" r:id="rId29"/>
-    <p:sldId id="298" r:id="rId30"/>
-    <p:sldId id="288" r:id="rId31"/>
+    <p:sldId id="299" r:id="rId8"/>
+    <p:sldId id="270" r:id="rId9"/>
+    <p:sldId id="271" r:id="rId10"/>
+    <p:sldId id="289" r:id="rId11"/>
+    <p:sldId id="272" r:id="rId12"/>
+    <p:sldId id="273" r:id="rId13"/>
+    <p:sldId id="292" r:id="rId14"/>
+    <p:sldId id="291" r:id="rId15"/>
+    <p:sldId id="274" r:id="rId16"/>
+    <p:sldId id="275" r:id="rId17"/>
+    <p:sldId id="276" r:id="rId18"/>
+    <p:sldId id="277" r:id="rId19"/>
+    <p:sldId id="293" r:id="rId20"/>
+    <p:sldId id="290" r:id="rId21"/>
+    <p:sldId id="278" r:id="rId22"/>
+    <p:sldId id="279" r:id="rId23"/>
+    <p:sldId id="281" r:id="rId24"/>
+    <p:sldId id="295" r:id="rId25"/>
+    <p:sldId id="296" r:id="rId26"/>
+    <p:sldId id="297" r:id="rId27"/>
+    <p:sldId id="283" r:id="rId28"/>
+    <p:sldId id="287" r:id="rId29"/>
+    <p:sldId id="300" r:id="rId30"/>
+    <p:sldId id="282" r:id="rId31"/>
+    <p:sldId id="298" r:id="rId32"/>
+    <p:sldId id="288" r:id="rId33"/>
   </p:sldIdLst>
   <p:sldSz cx="12188825" cy="6858000"/>
   <p:notesSz cx="6858000" cy="9144000"/>
@@ -183,20 +185,6 @@
 
 <file path=ppt/comments/comment1.xml><?xml version="1.0" encoding="utf-8"?>
 <p:cmLst xmlns:a="http://schemas.openxmlformats.org/drawingml/2006/main" xmlns:r="http://schemas.openxmlformats.org/officeDocument/2006/relationships" xmlns:p="http://schemas.openxmlformats.org/presentationml/2006/main">
-  <p:cm authorId="1" dt="2022-12-10T18:08:17.172" idx="3">
-    <p:pos x="5290" y="2760"/>
-    <p:text>Link a script unificado de toda la base de datos</p:text>
-    <p:extLst>
-      <p:ext uri="{C676402C-5697-4E1C-873F-D02D1690AC5C}">
-        <p15:threadingInfo xmlns:p15="http://schemas.microsoft.com/office/powerpoint/2012/main" timeZoneBias="180"/>
-      </p:ext>
-    </p:extLst>
-  </p:cm>
-</p:cmLst>
-</file>
-
-<file path=ppt/comments/comment2.xml><?xml version="1.0" encoding="utf-8"?>
-<p:cmLst xmlns:a="http://schemas.openxmlformats.org/drawingml/2006/main" xmlns:r="http://schemas.openxmlformats.org/officeDocument/2006/relationships" xmlns:p="http://schemas.openxmlformats.org/presentationml/2006/main">
   <p:cm authorId="1" dt="2022-12-10T18:13:05.355" idx="4">
     <p:pos x="2578" y="1797"/>
     <p:text>Link a github - creación de tablas</p:text>
@@ -245,6 +233,20 @@
   <p:cm authorId="1" dt="2022-12-10T18:14:09.361" idx="9">
     <p:pos x="7124" y="3516"/>
     <p:text>Link a github - creación de usuarios y brindar permisos</p:text>
+    <p:extLst>
+      <p:ext uri="{C676402C-5697-4E1C-873F-D02D1690AC5C}">
+        <p15:threadingInfo xmlns:p15="http://schemas.microsoft.com/office/powerpoint/2012/main" timeZoneBias="180"/>
+      </p:ext>
+    </p:extLst>
+  </p:cm>
+</p:cmLst>
+</file>
+
+<file path=ppt/comments/comment2.xml><?xml version="1.0" encoding="utf-8"?>
+<p:cmLst xmlns:a="http://schemas.openxmlformats.org/drawingml/2006/main" xmlns:r="http://schemas.openxmlformats.org/officeDocument/2006/relationships" xmlns:p="http://schemas.openxmlformats.org/presentationml/2006/main">
+  <p:cm authorId="1" dt="2022-12-10T18:08:17.172" idx="3">
+    <p:pos x="5290" y="2760"/>
+    <p:text>Link a script unificado de toda la base de datos</p:text>
     <p:extLst>
       <p:ext uri="{C676402C-5697-4E1C-873F-D02D1690AC5C}">
         <p15:threadingInfo xmlns:p15="http://schemas.microsoft.com/office/powerpoint/2012/main" timeZoneBias="180"/>
@@ -1605,458 +1607,6 @@
       <dsp:cNvGrpSpPr/>
     </dsp:nvGrpSpPr>
     <dsp:grpSpPr/>
-    <dsp:sp modelId="{124EF20B-D98C-45B2-BB13-7B93B5373CEB}">
-      <dsp:nvSpPr>
-        <dsp:cNvPr id="0" name=""/>
-        <dsp:cNvSpPr/>
-      </dsp:nvSpPr>
-      <dsp:spPr>
-        <a:xfrm>
-          <a:off x="0" y="0"/>
-          <a:ext cx="4316650" cy="1339691"/>
-        </a:xfrm>
-        <a:prstGeom prst="roundRect">
-          <a:avLst>
-            <a:gd name="adj" fmla="val 10000"/>
-          </a:avLst>
-        </a:prstGeom>
-        <a:gradFill rotWithShape="0">
-          <a:gsLst>
-            <a:gs pos="0">
-              <a:srgbClr val="703000"/>
-            </a:gs>
-            <a:gs pos="50000">
-              <a:srgbClr val="A44A00"/>
-            </a:gs>
-            <a:gs pos="70000">
-              <a:srgbClr val="BC5500"/>
-            </a:gs>
-            <a:gs pos="100000">
-              <a:srgbClr val="F26D00"/>
-            </a:gs>
-          </a:gsLst>
-          <a:lin ang="16200000" scaled="0"/>
-        </a:gradFill>
-        <a:ln>
-          <a:noFill/>
-        </a:ln>
-        <a:effectLst>
-          <a:outerShdw blurRad="38100" dist="25400" dir="2700000" algn="br" rotWithShape="0">
-            <a:srgbClr val="000000">
-              <a:alpha val="60000"/>
-            </a:srgbClr>
-          </a:outerShdw>
-        </a:effectLst>
-      </dsp:spPr>
-      <dsp:style>
-        <a:lnRef idx="0">
-          <a:scrgbClr r="0" g="0" b="0"/>
-        </a:lnRef>
-        <a:fillRef idx="3">
-          <a:scrgbClr r="0" g="0" b="0"/>
-        </a:fillRef>
-        <a:effectRef idx="2">
-          <a:scrgbClr r="0" g="0" b="0"/>
-        </a:effectRef>
-        <a:fontRef idx="minor">
-          <a:schemeClr val="lt1"/>
-        </a:fontRef>
-      </dsp:style>
-      <dsp:txBody>
-        <a:bodyPr spcFirstLastPara="0" vert="horz" wrap="square" lIns="160020" tIns="160020" rIns="160020" bIns="160020" numCol="1" spcCol="1270" rtlCol="0" anchor="ctr" anchorCtr="0">
-          <a:noAutofit/>
-        </a:bodyPr>
-        <a:lstStyle/>
-        <a:p>
-          <a:pPr lvl="0" algn="l" defTabSz="1866900" rtl="0">
-            <a:lnSpc>
-              <a:spcPct val="90000"/>
-            </a:lnSpc>
-            <a:spcBef>
-              <a:spcPct val="0"/>
-            </a:spcBef>
-            <a:spcAft>
-              <a:spcPct val="35000"/>
-            </a:spcAft>
-          </a:pPr>
-          <a:r>
-            <a:rPr lang="es-419" sz="4200" kern="1200" noProof="0" dirty="0" smtClean="0"/>
-            <a:t>Cliente</a:t>
-          </a:r>
-          <a:endParaRPr lang="es-ES" sz="4200" kern="1200" noProof="0" dirty="0"/>
-        </a:p>
-      </dsp:txBody>
-      <dsp:txXfrm>
-        <a:off x="39238" y="39238"/>
-        <a:ext cx="2871019" cy="1261215"/>
-      </dsp:txXfrm>
-    </dsp:sp>
-    <dsp:sp modelId="{CA544AF7-F7B2-4CA5-9251-B4CDB8D06634}">
-      <dsp:nvSpPr>
-        <dsp:cNvPr id="0" name=""/>
-        <dsp:cNvSpPr/>
-      </dsp:nvSpPr>
-      <dsp:spPr>
-        <a:xfrm>
-          <a:off x="380880" y="1562972"/>
-          <a:ext cx="4316650" cy="1339691"/>
-        </a:xfrm>
-        <a:prstGeom prst="roundRect">
-          <a:avLst>
-            <a:gd name="adj" fmla="val 10000"/>
-          </a:avLst>
-        </a:prstGeom>
-        <a:gradFill rotWithShape="0">
-          <a:gsLst>
-            <a:gs pos="0">
-              <a:schemeClr val="accent3">
-                <a:hueOff val="0"/>
-                <a:satOff val="0"/>
-                <a:lumOff val="0"/>
-                <a:alphaOff val="0"/>
-                <a:shade val="15000"/>
-                <a:satMod val="180000"/>
-              </a:schemeClr>
-            </a:gs>
-            <a:gs pos="50000">
-              <a:schemeClr val="accent3">
-                <a:hueOff val="0"/>
-                <a:satOff val="0"/>
-                <a:lumOff val="0"/>
-                <a:alphaOff val="0"/>
-                <a:shade val="45000"/>
-                <a:satMod val="170000"/>
-              </a:schemeClr>
-            </a:gs>
-            <a:gs pos="70000">
-              <a:schemeClr val="accent3">
-                <a:hueOff val="0"/>
-                <a:satOff val="0"/>
-                <a:lumOff val="0"/>
-                <a:alphaOff val="0"/>
-                <a:tint val="99000"/>
-                <a:shade val="65000"/>
-                <a:satMod val="155000"/>
-              </a:schemeClr>
-            </a:gs>
-            <a:gs pos="100000">
-              <a:schemeClr val="accent3">
-                <a:hueOff val="0"/>
-                <a:satOff val="0"/>
-                <a:lumOff val="0"/>
-                <a:alphaOff val="0"/>
-                <a:tint val="100000"/>
-                <a:shade val="100000"/>
-                <a:satMod val="155000"/>
-              </a:schemeClr>
-            </a:gs>
-          </a:gsLst>
-          <a:lin ang="16200000" scaled="0"/>
-        </a:gradFill>
-        <a:ln>
-          <a:noFill/>
-        </a:ln>
-        <a:effectLst>
-          <a:outerShdw blurRad="38100" dist="25400" dir="2700000" algn="br" rotWithShape="0">
-            <a:srgbClr val="000000">
-              <a:alpha val="60000"/>
-            </a:srgbClr>
-          </a:outerShdw>
-        </a:effectLst>
-      </dsp:spPr>
-      <dsp:style>
-        <a:lnRef idx="0">
-          <a:scrgbClr r="0" g="0" b="0"/>
-        </a:lnRef>
-        <a:fillRef idx="3">
-          <a:scrgbClr r="0" g="0" b="0"/>
-        </a:fillRef>
-        <a:effectRef idx="2">
-          <a:scrgbClr r="0" g="0" b="0"/>
-        </a:effectRef>
-        <a:fontRef idx="minor">
-          <a:schemeClr val="lt1"/>
-        </a:fontRef>
-      </dsp:style>
-      <dsp:txBody>
-        <a:bodyPr spcFirstLastPara="0" vert="horz" wrap="square" lIns="160020" tIns="160020" rIns="160020" bIns="160020" numCol="1" spcCol="1270" rtlCol="0" anchor="ctr" anchorCtr="0">
-          <a:noAutofit/>
-        </a:bodyPr>
-        <a:lstStyle/>
-        <a:p>
-          <a:pPr lvl="0" algn="l" defTabSz="1866900" rtl="0">
-            <a:lnSpc>
-              <a:spcPct val="90000"/>
-            </a:lnSpc>
-            <a:spcBef>
-              <a:spcPct val="0"/>
-            </a:spcBef>
-            <a:spcAft>
-              <a:spcPct val="35000"/>
-            </a:spcAft>
-          </a:pPr>
-          <a:r>
-            <a:rPr lang="es-ES" sz="4200" kern="1200" noProof="0" dirty="0" smtClean="0"/>
-            <a:t>Pedido </a:t>
-          </a:r>
-          <a:endParaRPr lang="es-ES" sz="4200" kern="1200" noProof="0" dirty="0"/>
-        </a:p>
-      </dsp:txBody>
-      <dsp:txXfrm>
-        <a:off x="420118" y="1602210"/>
-        <a:ext cx="2986494" cy="1261215"/>
-      </dsp:txXfrm>
-    </dsp:sp>
-    <dsp:sp modelId="{2AE92D3F-F0FA-45DD-BB60-4C6FBC6BC016}">
-      <dsp:nvSpPr>
-        <dsp:cNvPr id="0" name=""/>
-        <dsp:cNvSpPr/>
-      </dsp:nvSpPr>
-      <dsp:spPr>
-        <a:xfrm>
-          <a:off x="761761" y="3125945"/>
-          <a:ext cx="4316650" cy="1339691"/>
-        </a:xfrm>
-        <a:prstGeom prst="roundRect">
-          <a:avLst>
-            <a:gd name="adj" fmla="val 10000"/>
-          </a:avLst>
-        </a:prstGeom>
-        <a:gradFill rotWithShape="0">
-          <a:gsLst>
-            <a:gs pos="0">
-              <a:srgbClr val="394404"/>
-            </a:gs>
-            <a:gs pos="50000">
-              <a:srgbClr val="5F6F0F"/>
-            </a:gs>
-            <a:gs pos="70000">
-              <a:srgbClr val="65741A"/>
-            </a:gs>
-            <a:gs pos="100000">
-              <a:schemeClr val="accent4">
-                <a:hueOff val="0"/>
-                <a:satOff val="0"/>
-                <a:lumOff val="0"/>
-                <a:alphaOff val="0"/>
-                <a:tint val="100000"/>
-                <a:shade val="100000"/>
-                <a:satMod val="155000"/>
-              </a:schemeClr>
-            </a:gs>
-          </a:gsLst>
-          <a:lin ang="16200000" scaled="0"/>
-        </a:gradFill>
-        <a:ln>
-          <a:noFill/>
-        </a:ln>
-        <a:effectLst>
-          <a:outerShdw blurRad="38100" dist="25400" dir="2700000" algn="br" rotWithShape="0">
-            <a:srgbClr val="000000">
-              <a:alpha val="60000"/>
-            </a:srgbClr>
-          </a:outerShdw>
-        </a:effectLst>
-      </dsp:spPr>
-      <dsp:style>
-        <a:lnRef idx="0">
-          <a:scrgbClr r="0" g="0" b="0"/>
-        </a:lnRef>
-        <a:fillRef idx="3">
-          <a:scrgbClr r="0" g="0" b="0"/>
-        </a:fillRef>
-        <a:effectRef idx="2">
-          <a:scrgbClr r="0" g="0" b="0"/>
-        </a:effectRef>
-        <a:fontRef idx="minor">
-          <a:schemeClr val="lt1"/>
-        </a:fontRef>
-      </dsp:style>
-      <dsp:txBody>
-        <a:bodyPr spcFirstLastPara="0" vert="horz" wrap="square" lIns="160020" tIns="160020" rIns="160020" bIns="160020" numCol="1" spcCol="1270" rtlCol="0" anchor="ctr" anchorCtr="0">
-          <a:noAutofit/>
-        </a:bodyPr>
-        <a:lstStyle/>
-        <a:p>
-          <a:pPr lvl="0" algn="l" defTabSz="1866900" rtl="0">
-            <a:lnSpc>
-              <a:spcPct val="90000"/>
-            </a:lnSpc>
-            <a:spcBef>
-              <a:spcPct val="0"/>
-            </a:spcBef>
-            <a:spcAft>
-              <a:spcPct val="35000"/>
-            </a:spcAft>
-          </a:pPr>
-          <a:r>
-            <a:rPr lang="es-419" sz="4200" kern="1200" noProof="0" dirty="0" smtClean="0"/>
-            <a:t>Videojuegos</a:t>
-          </a:r>
-          <a:endParaRPr lang="es-ES" sz="4200" kern="1200" noProof="0" dirty="0"/>
-        </a:p>
-      </dsp:txBody>
-      <dsp:txXfrm>
-        <a:off x="800999" y="3165183"/>
-        <a:ext cx="2986494" cy="1261215"/>
-      </dsp:txXfrm>
-    </dsp:sp>
-    <dsp:sp modelId="{9CA877D8-99F8-40A0-89E9-59A61C9A70F4}">
-      <dsp:nvSpPr>
-        <dsp:cNvPr id="0" name=""/>
-        <dsp:cNvSpPr/>
-      </dsp:nvSpPr>
-      <dsp:spPr>
-        <a:xfrm>
-          <a:off x="3445850" y="1015932"/>
-          <a:ext cx="870799" cy="870799"/>
-        </a:xfrm>
-        <a:prstGeom prst="downArrow">
-          <a:avLst>
-            <a:gd name="adj1" fmla="val 55000"/>
-            <a:gd name="adj2" fmla="val 45000"/>
-          </a:avLst>
-        </a:prstGeom>
-        <a:solidFill>
-          <a:schemeClr val="accent2">
-            <a:tint val="40000"/>
-            <a:alpha val="90000"/>
-            <a:hueOff val="0"/>
-            <a:satOff val="0"/>
-            <a:lumOff val="0"/>
-            <a:alphaOff val="0"/>
-          </a:schemeClr>
-        </a:solidFill>
-        <a:ln w="9525" cap="flat" cmpd="sng" algn="ctr">
-          <a:solidFill>
-            <a:schemeClr val="accent2">
-              <a:tint val="40000"/>
-              <a:alpha val="90000"/>
-              <a:hueOff val="0"/>
-              <a:satOff val="0"/>
-              <a:lumOff val="0"/>
-              <a:alphaOff val="0"/>
-            </a:schemeClr>
-          </a:solidFill>
-          <a:miter lim="800000"/>
-        </a:ln>
-        <a:effectLst/>
-      </dsp:spPr>
-      <dsp:style>
-        <a:lnRef idx="1">
-          <a:scrgbClr r="0" g="0" b="0"/>
-        </a:lnRef>
-        <a:fillRef idx="1">
-          <a:scrgbClr r="0" g="0" b="0"/>
-        </a:fillRef>
-        <a:effectRef idx="0">
-          <a:scrgbClr r="0" g="0" b="0"/>
-        </a:effectRef>
-        <a:fontRef idx="minor"/>
-      </dsp:style>
-      <dsp:txBody>
-        <a:bodyPr spcFirstLastPara="0" vert="horz" wrap="square" lIns="45720" tIns="45720" rIns="45720" bIns="45720" numCol="1" spcCol="1270" rtlCol="0" anchor="ctr" anchorCtr="0">
-          <a:noAutofit/>
-        </a:bodyPr>
-        <a:lstStyle/>
-        <a:p>
-          <a:pPr lvl="0" algn="ctr" defTabSz="1600200" rtl="0">
-            <a:lnSpc>
-              <a:spcPct val="90000"/>
-            </a:lnSpc>
-            <a:spcBef>
-              <a:spcPct val="0"/>
-            </a:spcBef>
-            <a:spcAft>
-              <a:spcPct val="35000"/>
-            </a:spcAft>
-          </a:pPr>
-          <a:endParaRPr lang="en-US" sz="3600" kern="1200"/>
-        </a:p>
-      </dsp:txBody>
-      <dsp:txXfrm>
-        <a:off x="3641780" y="1015932"/>
-        <a:ext cx="478939" cy="655276"/>
-      </dsp:txXfrm>
-    </dsp:sp>
-    <dsp:sp modelId="{62643EF2-016C-41F1-8CBC-398422A85727}">
-      <dsp:nvSpPr>
-        <dsp:cNvPr id="0" name=""/>
-        <dsp:cNvSpPr/>
-      </dsp:nvSpPr>
-      <dsp:spPr>
-        <a:xfrm>
-          <a:off x="3826731" y="2569974"/>
-          <a:ext cx="870799" cy="870799"/>
-        </a:xfrm>
-        <a:prstGeom prst="downArrow">
-          <a:avLst>
-            <a:gd name="adj1" fmla="val 55000"/>
-            <a:gd name="adj2" fmla="val 45000"/>
-          </a:avLst>
-        </a:prstGeom>
-        <a:solidFill>
-          <a:schemeClr val="accent3">
-            <a:tint val="40000"/>
-            <a:alpha val="90000"/>
-            <a:hueOff val="0"/>
-            <a:satOff val="0"/>
-            <a:lumOff val="0"/>
-            <a:alphaOff val="0"/>
-          </a:schemeClr>
-        </a:solidFill>
-        <a:ln w="9525" cap="flat" cmpd="sng" algn="ctr">
-          <a:solidFill>
-            <a:schemeClr val="accent3">
-              <a:tint val="40000"/>
-              <a:alpha val="90000"/>
-              <a:hueOff val="0"/>
-              <a:satOff val="0"/>
-              <a:lumOff val="0"/>
-              <a:alphaOff val="0"/>
-            </a:schemeClr>
-          </a:solidFill>
-          <a:miter lim="800000"/>
-        </a:ln>
-        <a:effectLst/>
-      </dsp:spPr>
-      <dsp:style>
-        <a:lnRef idx="1">
-          <a:scrgbClr r="0" g="0" b="0"/>
-        </a:lnRef>
-        <a:fillRef idx="1">
-          <a:scrgbClr r="0" g="0" b="0"/>
-        </a:fillRef>
-        <a:effectRef idx="0">
-          <a:scrgbClr r="0" g="0" b="0"/>
-        </a:effectRef>
-        <a:fontRef idx="minor"/>
-      </dsp:style>
-      <dsp:txBody>
-        <a:bodyPr spcFirstLastPara="0" vert="horz" wrap="square" lIns="45720" tIns="45720" rIns="45720" bIns="45720" numCol="1" spcCol="1270" rtlCol="0" anchor="ctr" anchorCtr="0">
-          <a:noAutofit/>
-        </a:bodyPr>
-        <a:lstStyle/>
-        <a:p>
-          <a:pPr lvl="0" algn="ctr" defTabSz="1600200" rtl="0">
-            <a:lnSpc>
-              <a:spcPct val="90000"/>
-            </a:lnSpc>
-            <a:spcBef>
-              <a:spcPct val="0"/>
-            </a:spcBef>
-            <a:spcAft>
-              <a:spcPct val="35000"/>
-            </a:spcAft>
-          </a:pPr>
-          <a:endParaRPr lang="en-US" sz="3600" kern="1200"/>
-        </a:p>
-      </dsp:txBody>
-      <dsp:txXfrm>
-        <a:off x="4022661" y="2569974"/>
-        <a:ext cx="478939" cy="655276"/>
-      </dsp:txXfrm>
-    </dsp:sp>
   </dsp:spTree>
 </dsp:drawing>
 </file>
@@ -4405,7 +3955,7 @@
             <a:pPr algn="r" rtl="0"/>
             <a:fld id="{C8F1D84B-F747-4821-8617-FBD61E8F4308}" type="datetime1">
               <a:rPr lang="es-ES" smtClean="0"/>
-              <a:t>10/12/2022</a:t>
+              <a:t>11/12/2022</a:t>
             </a:fld>
             <a:endParaRPr lang="es-ES" dirty="0"/>
           </a:p>
@@ -4575,7 +4125,7 @@
             <a:fld id="{DA87C823-BB9F-45DA-99AB-416A32E1B948}" type="datetime1">
               <a:rPr lang="es-ES" noProof="0" smtClean="0"/>
               <a:pPr/>
-              <a:t>10/12/2022</a:t>
+              <a:t>11/12/2022</a:t>
             </a:fld>
             <a:endParaRPr lang="es-ES" noProof="0" dirty="0"/>
           </a:p>
@@ -4998,7 +4548,7 @@
             <a:pPr rtl="0"/>
             <a:fld id="{3EBA5BD7-F043-4D1B-AA17-CD412FC534DE}" type="slidenum">
               <a:rPr lang="es-ES" smtClean="0"/>
-              <a:t>4</a:t>
+              <a:t>5</a:t>
             </a:fld>
             <a:endParaRPr lang="es-ES" dirty="0"/>
           </a:p>
@@ -5780,7 +5330,7 @@
             <a:fld id="{A042E67D-14C0-4ED9-A218-9C14494A6A84}" type="datetime1">
               <a:rPr lang="es-ES" noProof="0" smtClean="0"/>
               <a:pPr/>
-              <a:t>10/12/2022</a:t>
+              <a:t>11/12/2022</a:t>
             </a:fld>
             <a:endParaRPr lang="es-ES" noProof="0" dirty="0"/>
           </a:p>
@@ -5990,7 +5540,7 @@
             <a:fld id="{40A1DB83-C382-4684-8887-65A03EA4FFF0}" type="datetime1">
               <a:rPr lang="es-ES" noProof="0" smtClean="0"/>
               <a:pPr/>
-              <a:t>10/12/2022</a:t>
+              <a:t>11/12/2022</a:t>
             </a:fld>
             <a:endParaRPr lang="es-ES" noProof="0" dirty="0"/>
           </a:p>
@@ -6206,7 +5756,7 @@
             <a:fld id="{C60E81D3-9B82-44CA-B1F9-FCEFDC87935B}" type="datetime1">
               <a:rPr lang="es-ES" noProof="0" smtClean="0"/>
               <a:pPr/>
-              <a:t>10/12/2022</a:t>
+              <a:t>11/12/2022</a:t>
             </a:fld>
             <a:endParaRPr lang="es-ES" noProof="0" dirty="0"/>
           </a:p>
@@ -6412,7 +5962,7 @@
             <a:fld id="{82E48AAE-5AE8-418A-A225-B506C222F2F9}" type="datetime1">
               <a:rPr lang="es-ES" noProof="0" smtClean="0"/>
               <a:pPr/>
-              <a:t>10/12/2022</a:t>
+              <a:t>11/12/2022</a:t>
             </a:fld>
             <a:endParaRPr lang="es-ES" noProof="0" dirty="0"/>
           </a:p>
@@ -6852,7 +6402,7 @@
             <a:fld id="{AA1D35CA-82F5-4AD4-B9EC-66E805B73542}" type="datetime1">
               <a:rPr lang="es-ES" noProof="0" smtClean="0"/>
               <a:pPr/>
-              <a:t>10/12/2022</a:t>
+              <a:t>11/12/2022</a:t>
             </a:fld>
             <a:endParaRPr lang="es-ES" noProof="0" dirty="0"/>
           </a:p>
@@ -7164,7 +6714,7 @@
             <a:fld id="{834CCE92-710B-4678-B1B1-EFCAA5CDF075}" type="datetime1">
               <a:rPr lang="es-ES" noProof="0" smtClean="0"/>
               <a:pPr/>
-              <a:t>10/12/2022</a:t>
+              <a:t>11/12/2022</a:t>
             </a:fld>
             <a:endParaRPr lang="es-ES" noProof="0" dirty="0"/>
           </a:p>
@@ -7628,7 +7178,7 @@
             <a:fld id="{83FB0F2C-25D9-4D7E-B43A-29A2E16C960D}" type="datetime1">
               <a:rPr lang="es-ES" noProof="0" smtClean="0"/>
               <a:pPr/>
-              <a:t>10/12/2022</a:t>
+              <a:t>11/12/2022</a:t>
             </a:fld>
             <a:endParaRPr lang="es-ES" noProof="0" dirty="0"/>
           </a:p>
@@ -7766,7 +7316,7 @@
             <a:fld id="{FD34687D-B11B-47A5-95F6-B79DA932A6DF}" type="datetime1">
               <a:rPr lang="es-ES" noProof="0" smtClean="0"/>
               <a:pPr/>
-              <a:t>10/12/2022</a:t>
+              <a:t>11/12/2022</a:t>
             </a:fld>
             <a:endParaRPr lang="es-ES" noProof="0" dirty="0"/>
           </a:p>
@@ -7880,7 +7430,7 @@
             <a:fld id="{93C656DE-1E46-4450-9484-A739B4FADFBC}" type="datetime1">
               <a:rPr lang="es-ES" noProof="0" smtClean="0"/>
               <a:pPr/>
-              <a:t>10/12/2022</a:t>
+              <a:t>11/12/2022</a:t>
             </a:fld>
             <a:endParaRPr lang="es-ES" noProof="0" dirty="0"/>
           </a:p>
@@ -8187,7 +7737,7 @@
             <a:fld id="{EEA77F8B-D469-4ECD-B91E-3B01AD692331}" type="datetime1">
               <a:rPr lang="es-ES" noProof="0" smtClean="0"/>
               <a:pPr/>
-              <a:t>10/12/2022</a:t>
+              <a:t>11/12/2022</a:t>
             </a:fld>
             <a:endParaRPr lang="es-ES" noProof="0" dirty="0"/>
           </a:p>
@@ -8484,7 +8034,7 @@
             <a:fld id="{49BA7B1C-709E-4257-93A5-EC2F0807D42F}" type="datetime1">
               <a:rPr lang="es-ES" noProof="0" smtClean="0"/>
               <a:pPr/>
-              <a:t>10/12/2022</a:t>
+              <a:t>11/12/2022</a:t>
             </a:fld>
             <a:endParaRPr lang="es-ES" noProof="0" dirty="0"/>
           </a:p>
@@ -9110,7 +8660,7 @@
             <a:fld id="{35C83AD5-F5AF-4BDC-901E-85A05CCFFAAA}" type="datetime1">
               <a:rPr lang="es-ES" noProof="0" smtClean="0"/>
               <a:pPr/>
-              <a:t>10/12/2022</a:t>
+              <a:t>11/12/2022</a:t>
             </a:fld>
             <a:endParaRPr lang="es-ES" noProof="0" dirty="0"/>
           </a:p>
@@ -9711,7 +9261,7 @@
           <a:p>
             <a:r>
               <a:rPr lang="es-419" dirty="0" smtClean="0"/>
-              <a:t>Cliente</a:t>
+              <a:t>CIUDAD</a:t>
             </a:r>
             <a:endParaRPr lang="es-ES" dirty="0"/>
           </a:p>
@@ -9739,7 +9289,7 @@
           <a:p>
             <a:r>
               <a:rPr lang="es-ES" dirty="0"/>
-              <a:t>Esta tabla esta creada para guardar toda la información relevante del cliente.</a:t>
+              <a:t>Esta tabla esta creada para indicar la ciudad de las partes interesadas (cliente, proveedor, etc.)</a:t>
             </a:r>
           </a:p>
           <a:p>
@@ -9763,8 +9313,8 @@
         </p:blipFill>
         <p:spPr>
           <a:xfrm>
-            <a:off x="5518348" y="1340768"/>
-            <a:ext cx="5962650" cy="4010025"/>
+            <a:off x="5590356" y="2097348"/>
+            <a:ext cx="5934075" cy="1838325"/>
           </a:xfrm>
           <a:prstGeom prst="rect">
             <a:avLst/>
@@ -9774,7 +9324,7 @@
     </p:spTree>
     <p:extLst>
       <p:ext uri="{BB962C8B-B14F-4D97-AF65-F5344CB8AC3E}">
-        <p14:creationId xmlns:p14="http://schemas.microsoft.com/office/powerpoint/2010/main" val="1467829569"/>
+        <p14:creationId xmlns:p14="http://schemas.microsoft.com/office/powerpoint/2010/main" val="3969985584"/>
       </p:ext>
     </p:extLst>
   </p:cSld>
@@ -9815,7 +9365,7 @@
       </p:grpSpPr>
       <p:sp>
         <p:nvSpPr>
-          <p:cNvPr id="2" name="Título 1"/>
+          <p:cNvPr id="4" name="Título 3"/>
           <p:cNvSpPr>
             <a:spLocks noGrp="1"/>
           </p:cNvSpPr>
@@ -9835,7 +9385,7 @@
           <a:p>
             <a:r>
               <a:rPr lang="es-419" dirty="0" smtClean="0"/>
-              <a:t>pedido</a:t>
+              <a:t>Cliente</a:t>
             </a:r>
             <a:endParaRPr lang="es-ES" dirty="0"/>
           </a:p>
@@ -9843,7 +9393,7 @@
       </p:sp>
       <p:sp>
         <p:nvSpPr>
-          <p:cNvPr id="3" name="Marcador de texto 2"/>
+          <p:cNvPr id="6" name="Marcador de texto 5"/>
           <p:cNvSpPr>
             <a:spLocks noGrp="1"/>
           </p:cNvSpPr>
@@ -9853,7 +9403,7 @@
         </p:nvSpPr>
         <p:spPr>
           <a:xfrm>
-            <a:off x="1247196" y="2852936"/>
+            <a:off x="1125860" y="2924944"/>
             <a:ext cx="4062942" cy="1930400"/>
           </a:xfrm>
         </p:spPr>
@@ -9863,7 +9413,7 @@
           <a:p>
             <a:r>
               <a:rPr lang="es-ES" dirty="0"/>
-              <a:t>Esta tabla esta creada para guardar toda la información de los pedidos realizados por los clientes.</a:t>
+              <a:t>Esta tabla esta creada para guardar toda la información relevante del cliente.</a:t>
             </a:r>
           </a:p>
           <a:p>
@@ -9873,13 +9423,11 @@
       </p:sp>
       <p:pic>
         <p:nvPicPr>
-          <p:cNvPr id="5" name="Marcador de contenido 4"/>
+          <p:cNvPr id="2" name="Imagen 1"/>
           <p:cNvPicPr>
-            <a:picLocks noGrp="1" noChangeAspect="1"/>
+            <a:picLocks noChangeAspect="1"/>
           </p:cNvPicPr>
-          <p:nvPr>
-            <p:ph idx="1"/>
-          </p:nvPr>
+          <p:nvPr/>
         </p:nvPicPr>
         <p:blipFill>
           <a:blip r:embed="rId2"/>
@@ -9889,8 +9437,8 @@
         </p:blipFill>
         <p:spPr>
           <a:xfrm>
-            <a:off x="5626894" y="2363787"/>
-            <a:ext cx="5810250" cy="2028825"/>
+            <a:off x="5518348" y="1340768"/>
+            <a:ext cx="5962650" cy="4010025"/>
           </a:xfrm>
           <a:prstGeom prst="rect">
             <a:avLst/>
@@ -9900,7 +9448,7 @@
     </p:spTree>
     <p:extLst>
       <p:ext uri="{BB962C8B-B14F-4D97-AF65-F5344CB8AC3E}">
-        <p14:creationId xmlns:p14="http://schemas.microsoft.com/office/powerpoint/2010/main" val="2904289431"/>
+        <p14:creationId xmlns:p14="http://schemas.microsoft.com/office/powerpoint/2010/main" val="1467829569"/>
       </p:ext>
     </p:extLst>
   </p:cSld>
@@ -9961,7 +9509,7 @@
           <a:p>
             <a:r>
               <a:rPr lang="es-419" dirty="0" smtClean="0"/>
-              <a:t>ENVIO</a:t>
+              <a:t>pedido</a:t>
             </a:r>
             <a:endParaRPr lang="es-ES" dirty="0"/>
           </a:p>
@@ -9989,7 +9537,7 @@
           <a:p>
             <a:r>
               <a:rPr lang="es-ES" dirty="0"/>
-              <a:t>Esta tabla esta creada para guardar toda la información de los envíos que se deben hacer en el ecommerce.</a:t>
+              <a:t>Esta tabla esta creada para guardar toda la información de los pedidos realizados por los clientes.</a:t>
             </a:r>
           </a:p>
           <a:p>
@@ -9999,7 +9547,7 @@
       </p:sp>
       <p:pic>
         <p:nvPicPr>
-          <p:cNvPr id="6" name="Marcador de contenido 5"/>
+          <p:cNvPr id="5" name="Marcador de contenido 4"/>
           <p:cNvPicPr>
             <a:picLocks noGrp="1" noChangeAspect="1"/>
           </p:cNvPicPr>
@@ -10015,8 +9563,8 @@
         </p:blipFill>
         <p:spPr>
           <a:xfrm>
-            <a:off x="5367641" y="2276873"/>
-            <a:ext cx="6079028" cy="2115740"/>
+            <a:off x="5626894" y="2363787"/>
+            <a:ext cx="5810250" cy="2028825"/>
           </a:xfrm>
           <a:prstGeom prst="rect">
             <a:avLst/>
@@ -10026,7 +9574,7 @@
     </p:spTree>
     <p:extLst>
       <p:ext uri="{BB962C8B-B14F-4D97-AF65-F5344CB8AC3E}">
-        <p14:creationId xmlns:p14="http://schemas.microsoft.com/office/powerpoint/2010/main" val="2151429548"/>
+        <p14:creationId xmlns:p14="http://schemas.microsoft.com/office/powerpoint/2010/main" val="2904289431"/>
       </p:ext>
     </p:extLst>
   </p:cSld>
@@ -10087,7 +9635,7 @@
           <a:p>
             <a:r>
               <a:rPr lang="es-419" dirty="0" smtClean="0"/>
-              <a:t>producto</a:t>
+              <a:t>ENVIO</a:t>
             </a:r>
             <a:endParaRPr lang="es-ES" dirty="0"/>
           </a:p>
@@ -10115,7 +9663,7 @@
           <a:p>
             <a:r>
               <a:rPr lang="es-ES" dirty="0"/>
-              <a:t>Esta tabla esta creada para guardar toda la información del listado de productos a la venta.</a:t>
+              <a:t>Esta tabla esta creada para guardar toda la información de los envíos que se deben hacer en el ecommerce.</a:t>
             </a:r>
           </a:p>
           <a:p>
@@ -10125,11 +9673,13 @@
       </p:sp>
       <p:pic>
         <p:nvPicPr>
-          <p:cNvPr id="6" name="Imagen 5"/>
+          <p:cNvPr id="6" name="Marcador de contenido 5"/>
           <p:cNvPicPr>
-            <a:picLocks noChangeAspect="1"/>
+            <a:picLocks noGrp="1" noChangeAspect="1"/>
           </p:cNvPicPr>
-          <p:nvPr/>
+          <p:nvPr>
+            <p:ph idx="1"/>
+          </p:nvPr>
         </p:nvPicPr>
         <p:blipFill>
           <a:blip r:embed="rId2"/>
@@ -10139,8 +9689,8 @@
         </p:blipFill>
         <p:spPr>
           <a:xfrm>
-            <a:off x="5806380" y="1844824"/>
-            <a:ext cx="5867400" cy="2762250"/>
+            <a:off x="5367641" y="2276873"/>
+            <a:ext cx="6079028" cy="2115740"/>
           </a:xfrm>
           <a:prstGeom prst="rect">
             <a:avLst/>
@@ -10150,7 +9700,7 @@
     </p:spTree>
     <p:extLst>
       <p:ext uri="{BB962C8B-B14F-4D97-AF65-F5344CB8AC3E}">
-        <p14:creationId xmlns:p14="http://schemas.microsoft.com/office/powerpoint/2010/main" val="952908357"/>
+        <p14:creationId xmlns:p14="http://schemas.microsoft.com/office/powerpoint/2010/main" val="2151429548"/>
       </p:ext>
     </p:extLst>
   </p:cSld>
@@ -10211,7 +9761,7 @@
           <a:p>
             <a:r>
               <a:rPr lang="es-419" dirty="0" smtClean="0"/>
-              <a:t>categoria</a:t>
+              <a:t>producto</a:t>
             </a:r>
             <a:endParaRPr lang="es-ES" dirty="0"/>
           </a:p>
@@ -10239,7 +9789,7 @@
           <a:p>
             <a:r>
               <a:rPr lang="es-ES" dirty="0"/>
-              <a:t>Esta tabla esta creada para categorizar los productos del ecommerce.</a:t>
+              <a:t>Esta tabla esta creada para guardar toda la información del listado de productos a la venta.</a:t>
             </a:r>
           </a:p>
           <a:p>
@@ -10249,13 +9799,11 @@
       </p:sp>
       <p:pic>
         <p:nvPicPr>
-          <p:cNvPr id="6" name="Marcador de contenido 5"/>
+          <p:cNvPr id="6" name="Imagen 5"/>
           <p:cNvPicPr>
-            <a:picLocks noGrp="1" noChangeAspect="1"/>
+            <a:picLocks noChangeAspect="1"/>
           </p:cNvPicPr>
-          <p:nvPr>
-            <p:ph idx="1"/>
-          </p:nvPr>
+          <p:nvPr/>
         </p:nvPicPr>
         <p:blipFill>
           <a:blip r:embed="rId2"/>
@@ -10265,8 +9813,8 @@
         </p:blipFill>
         <p:spPr>
           <a:xfrm>
-            <a:off x="4942284" y="2636912"/>
-            <a:ext cx="6748969" cy="1308025"/>
+            <a:off x="5806380" y="1844824"/>
+            <a:ext cx="5867400" cy="2762250"/>
           </a:xfrm>
           <a:prstGeom prst="rect">
             <a:avLst/>
@@ -10276,7 +9824,7 @@
     </p:spTree>
     <p:extLst>
       <p:ext uri="{BB962C8B-B14F-4D97-AF65-F5344CB8AC3E}">
-        <p14:creationId xmlns:p14="http://schemas.microsoft.com/office/powerpoint/2010/main" val="2445807200"/>
+        <p14:creationId xmlns:p14="http://schemas.microsoft.com/office/powerpoint/2010/main" val="952908357"/>
       </p:ext>
     </p:extLst>
   </p:cSld>
@@ -10337,6 +9885,132 @@
           <a:p>
             <a:r>
               <a:rPr lang="es-419" dirty="0" smtClean="0"/>
+              <a:t>categoria</a:t>
+            </a:r>
+            <a:endParaRPr lang="es-ES" dirty="0"/>
+          </a:p>
+        </p:txBody>
+      </p:sp>
+      <p:sp>
+        <p:nvSpPr>
+          <p:cNvPr id="3" name="Marcador de texto 2"/>
+          <p:cNvSpPr>
+            <a:spLocks noGrp="1"/>
+          </p:cNvSpPr>
+          <p:nvPr>
+            <p:ph type="body" sz="half" idx="2"/>
+          </p:nvPr>
+        </p:nvSpPr>
+        <p:spPr>
+          <a:xfrm>
+            <a:off x="1247196" y="2852936"/>
+            <a:ext cx="4062942" cy="1930400"/>
+          </a:xfrm>
+        </p:spPr>
+        <p:txBody>
+          <a:bodyPr/>
+          <a:lstStyle/>
+          <a:p>
+            <a:r>
+              <a:rPr lang="es-ES" dirty="0"/>
+              <a:t>Esta tabla esta creada para categorizar los productos del ecommerce.</a:t>
+            </a:r>
+          </a:p>
+          <a:p>
+            <a:endParaRPr lang="es-ES" dirty="0"/>
+          </a:p>
+        </p:txBody>
+      </p:sp>
+      <p:pic>
+        <p:nvPicPr>
+          <p:cNvPr id="6" name="Marcador de contenido 5"/>
+          <p:cNvPicPr>
+            <a:picLocks noGrp="1" noChangeAspect="1"/>
+          </p:cNvPicPr>
+          <p:nvPr>
+            <p:ph idx="1"/>
+          </p:nvPr>
+        </p:nvPicPr>
+        <p:blipFill>
+          <a:blip r:embed="rId2"/>
+          <a:stretch>
+            <a:fillRect/>
+          </a:stretch>
+        </p:blipFill>
+        <p:spPr>
+          <a:xfrm>
+            <a:off x="4942284" y="2636912"/>
+            <a:ext cx="6748969" cy="1308025"/>
+          </a:xfrm>
+          <a:prstGeom prst="rect">
+            <a:avLst/>
+          </a:prstGeom>
+        </p:spPr>
+      </p:pic>
+    </p:spTree>
+    <p:extLst>
+      <p:ext uri="{BB962C8B-B14F-4D97-AF65-F5344CB8AC3E}">
+        <p14:creationId xmlns:p14="http://schemas.microsoft.com/office/powerpoint/2010/main" val="2445807200"/>
+      </p:ext>
+    </p:extLst>
+  </p:cSld>
+  <p:clrMapOvr>
+    <a:masterClrMapping/>
+  </p:clrMapOvr>
+  <mc:AlternateContent xmlns:mc="http://schemas.openxmlformats.org/markup-compatibility/2006" xmlns:p14="http://schemas.microsoft.com/office/powerpoint/2010/main">
+    <mc:Choice Requires="p14">
+      <p:transition spd="med" p14:dur="700">
+        <p:fade/>
+      </p:transition>
+    </mc:Choice>
+    <mc:Fallback xmlns="">
+      <p:transition spd="med">
+        <p:fade/>
+      </p:transition>
+    </mc:Fallback>
+  </mc:AlternateContent>
+</p:sld>
+</file>
+
+<file path=ppt/slides/slide16.xml><?xml version="1.0" encoding="utf-8"?>
+<p:sld xmlns:a="http://schemas.openxmlformats.org/drawingml/2006/main" xmlns:r="http://schemas.openxmlformats.org/officeDocument/2006/relationships" xmlns:p="http://schemas.openxmlformats.org/presentationml/2006/main">
+  <p:cSld>
+    <p:spTree>
+      <p:nvGrpSpPr>
+        <p:cNvPr id="1" name=""/>
+        <p:cNvGrpSpPr/>
+        <p:nvPr/>
+      </p:nvGrpSpPr>
+      <p:grpSpPr>
+        <a:xfrm>
+          <a:off x="0" y="0"/>
+          <a:ext cx="0" cy="0"/>
+          <a:chOff x="0" y="0"/>
+          <a:chExt cx="0" cy="0"/>
+        </a:xfrm>
+      </p:grpSpPr>
+      <p:sp>
+        <p:nvSpPr>
+          <p:cNvPr id="2" name="Título 1"/>
+          <p:cNvSpPr>
+            <a:spLocks noGrp="1"/>
+          </p:cNvSpPr>
+          <p:nvPr>
+            <p:ph type="title"/>
+          </p:nvPr>
+        </p:nvSpPr>
+        <p:spPr>
+          <a:xfrm>
+            <a:off x="1218882" y="1701800"/>
+            <a:ext cx="4062942" cy="791096"/>
+          </a:xfrm>
+        </p:spPr>
+        <p:txBody>
+          <a:bodyPr/>
+          <a:lstStyle/>
+          <a:p>
+            <a:r>
+              <a:rPr lang="es-419" dirty="0" smtClean="0"/>
               <a:t>TIPODEJUEGO</a:t>
             </a:r>
             <a:endParaRPr lang="es-ES" dirty="0"/>
@@ -10427,7 +10101,7 @@
 </p:sld>
 </file>
 
-<file path=ppt/slides/slide16.xml><?xml version="1.0" encoding="utf-8"?>
+<file path=ppt/slides/slide17.xml><?xml version="1.0" encoding="utf-8"?>
 <p:sld xmlns:a="http://schemas.openxmlformats.org/drawingml/2006/main" xmlns:r="http://schemas.openxmlformats.org/officeDocument/2006/relationships" xmlns:p="http://schemas.openxmlformats.org/presentationml/2006/main">
   <p:cSld>
     <p:spTree>
@@ -10518,140 +10192,6 @@
     <p:extLst>
       <p:ext uri="{BB962C8B-B14F-4D97-AF65-F5344CB8AC3E}">
         <p14:creationId xmlns:p14="http://schemas.microsoft.com/office/powerpoint/2010/main" val="1886099592"/>
-      </p:ext>
-    </p:extLst>
-  </p:cSld>
-  <p:clrMapOvr>
-    <a:masterClrMapping/>
-  </p:clrMapOvr>
-  <mc:AlternateContent xmlns:mc="http://schemas.openxmlformats.org/markup-compatibility/2006" xmlns:p14="http://schemas.microsoft.com/office/powerpoint/2010/main">
-    <mc:Choice Requires="p14">
-      <p:transition spd="med" p14:dur="700">
-        <p:fade/>
-      </p:transition>
-    </mc:Choice>
-    <mc:Fallback xmlns="">
-      <p:transition spd="med">
-        <p:fade/>
-      </p:transition>
-    </mc:Fallback>
-  </mc:AlternateContent>
-</p:sld>
-</file>
-
-<file path=ppt/slides/slide17.xml><?xml version="1.0" encoding="utf-8"?>
-<p:sld xmlns:a="http://schemas.openxmlformats.org/drawingml/2006/main" xmlns:r="http://schemas.openxmlformats.org/officeDocument/2006/relationships" xmlns:p="http://schemas.openxmlformats.org/presentationml/2006/main">
-  <p:cSld>
-    <p:spTree>
-      <p:nvGrpSpPr>
-        <p:cNvPr id="1" name=""/>
-        <p:cNvGrpSpPr/>
-        <p:nvPr/>
-      </p:nvGrpSpPr>
-      <p:grpSpPr>
-        <a:xfrm>
-          <a:off x="0" y="0"/>
-          <a:ext cx="0" cy="0"/>
-          <a:chOff x="0" y="0"/>
-          <a:chExt cx="0" cy="0"/>
-        </a:xfrm>
-      </p:grpSpPr>
-      <p:sp>
-        <p:nvSpPr>
-          <p:cNvPr id="2" name="Título 1"/>
-          <p:cNvSpPr>
-            <a:spLocks noGrp="1"/>
-          </p:cNvSpPr>
-          <p:nvPr>
-            <p:ph type="title"/>
-          </p:nvPr>
-        </p:nvSpPr>
-        <p:spPr>
-          <a:xfrm>
-            <a:off x="1218882" y="1701800"/>
-            <a:ext cx="4062942" cy="791096"/>
-          </a:xfrm>
-        </p:spPr>
-        <p:txBody>
-          <a:bodyPr>
-            <a:normAutofit fontScale="90000"/>
-          </a:bodyPr>
-          <a:lstStyle/>
-          <a:p>
-            <a:r>
-              <a:rPr lang="es-ES" b="1" dirty="0"/>
-              <a:t>ProductoProveedor</a:t>
-            </a:r>
-            <a:br>
-              <a:rPr lang="es-ES" b="1" dirty="0"/>
-            </a:br>
-            <a:endParaRPr lang="es-ES" dirty="0"/>
-          </a:p>
-        </p:txBody>
-      </p:sp>
-      <p:sp>
-        <p:nvSpPr>
-          <p:cNvPr id="3" name="Marcador de texto 2"/>
-          <p:cNvSpPr>
-            <a:spLocks noGrp="1"/>
-          </p:cNvSpPr>
-          <p:nvPr>
-            <p:ph type="body" sz="half" idx="2"/>
-          </p:nvPr>
-        </p:nvSpPr>
-        <p:spPr>
-          <a:xfrm>
-            <a:off x="1247196" y="2852936"/>
-            <a:ext cx="4062942" cy="1930400"/>
-          </a:xfrm>
-        </p:spPr>
-        <p:txBody>
-          <a:bodyPr/>
-          <a:lstStyle/>
-          <a:p>
-            <a:r>
-              <a:rPr lang="es-ES" dirty="0"/>
-              <a:t>Esta tabla esta creada </a:t>
-            </a:r>
-            <a:r>
-              <a:rPr lang="es-ES" dirty="0" smtClean="0"/>
-              <a:t>para establecer la relación entre la tabla producto y proveedor</a:t>
-            </a:r>
-            <a:endParaRPr lang="es-ES" dirty="0"/>
-          </a:p>
-          <a:p>
-            <a:endParaRPr lang="es-ES" dirty="0"/>
-          </a:p>
-        </p:txBody>
-      </p:sp>
-      <p:pic>
-        <p:nvPicPr>
-          <p:cNvPr id="5" name="Imagen 4"/>
-          <p:cNvPicPr>
-            <a:picLocks noChangeAspect="1"/>
-          </p:cNvPicPr>
-          <p:nvPr/>
-        </p:nvPicPr>
-        <p:blipFill>
-          <a:blip r:embed="rId2"/>
-          <a:stretch>
-            <a:fillRect/>
-          </a:stretch>
-        </p:blipFill>
-        <p:spPr>
-          <a:xfrm>
-            <a:off x="5683284" y="1701801"/>
-            <a:ext cx="5869721" cy="2447280"/>
-          </a:xfrm>
-          <a:prstGeom prst="rect">
-            <a:avLst/>
-          </a:prstGeom>
-        </p:spPr>
-      </p:pic>
-    </p:spTree>
-    <p:extLst>
-      <p:ext uri="{BB962C8B-B14F-4D97-AF65-F5344CB8AC3E}">
-        <p14:creationId xmlns:p14="http://schemas.microsoft.com/office/powerpoint/2010/main" val="2675120001"/>
       </p:ext>
     </p:extLst>
   </p:cSld>
@@ -10707,13 +10247,18 @@
           </a:xfrm>
         </p:spPr>
         <p:txBody>
-          <a:bodyPr/>
+          <a:bodyPr>
+            <a:normAutofit fontScale="90000"/>
+          </a:bodyPr>
           <a:lstStyle/>
           <a:p>
             <a:r>
-              <a:rPr lang="es-419" dirty="0" smtClean="0"/>
-              <a:t>detallepedido</a:t>
+              <a:rPr lang="es-ES" b="1" dirty="0"/>
+              <a:t>ProductoProveedor</a:t>
             </a:r>
+            <a:br>
+              <a:rPr lang="es-ES" b="1" dirty="0"/>
+            </a:br>
             <a:endParaRPr lang="es-ES" dirty="0"/>
           </a:p>
         </p:txBody>
@@ -10740,8 +10285,13 @@
           <a:p>
             <a:r>
               <a:rPr lang="es-ES" dirty="0"/>
-              <a:t>Esta tabla esta creada para describir el detalle de un pedido.</a:t>
+              <a:t>Esta tabla esta creada </a:t>
             </a:r>
+            <a:r>
+              <a:rPr lang="es-ES" dirty="0" smtClean="0"/>
+              <a:t>para establecer la relación entre la tabla producto y proveedor</a:t>
+            </a:r>
+            <a:endParaRPr lang="es-ES" dirty="0"/>
           </a:p>
           <a:p>
             <a:endParaRPr lang="es-ES" dirty="0"/>
@@ -10750,13 +10300,11 @@
       </p:sp>
       <p:pic>
         <p:nvPicPr>
-          <p:cNvPr id="5" name="Marcador de contenido 4"/>
+          <p:cNvPr id="5" name="Imagen 4"/>
           <p:cNvPicPr>
-            <a:picLocks noGrp="1" noChangeAspect="1"/>
+            <a:picLocks noChangeAspect="1"/>
           </p:cNvPicPr>
-          <p:nvPr>
-            <p:ph idx="1"/>
-          </p:nvPr>
+          <p:nvPr/>
         </p:nvPicPr>
         <p:blipFill>
           <a:blip r:embed="rId2"/>
@@ -10766,8 +10314,8 @@
         </p:blipFill>
         <p:spPr>
           <a:xfrm>
-            <a:off x="5617369" y="2206625"/>
-            <a:ext cx="5829300" cy="2343150"/>
+            <a:off x="5683284" y="1701801"/>
+            <a:ext cx="5869721" cy="2447280"/>
           </a:xfrm>
           <a:prstGeom prst="rect">
             <a:avLst/>
@@ -10777,7 +10325,7 @@
     </p:spTree>
     <p:extLst>
       <p:ext uri="{BB962C8B-B14F-4D97-AF65-F5344CB8AC3E}">
-        <p14:creationId xmlns:p14="http://schemas.microsoft.com/office/powerpoint/2010/main" val="1725642590"/>
+        <p14:creationId xmlns:p14="http://schemas.microsoft.com/office/powerpoint/2010/main" val="2675120001"/>
       </p:ext>
     </p:extLst>
   </p:cSld>
@@ -10838,7 +10386,7 @@
           <a:p>
             <a:r>
               <a:rPr lang="es-419" dirty="0" smtClean="0"/>
-              <a:t>ESTADOENVIO</a:t>
+              <a:t>detallepedido</a:t>
             </a:r>
             <a:endParaRPr lang="es-ES" dirty="0"/>
           </a:p>
@@ -10866,13 +10414,8 @@
           <a:p>
             <a:r>
               <a:rPr lang="es-ES" dirty="0"/>
-              <a:t>Esta tabla esta creada para guardar el estado de los envíos que se </a:t>
+              <a:t>Esta tabla esta creada para describir el detalle de un pedido.</a:t>
             </a:r>
-            <a:r>
-              <a:rPr lang="es-ES" dirty="0" smtClean="0"/>
-              <a:t>realicen.</a:t>
-            </a:r>
-            <a:endParaRPr lang="es-ES" dirty="0"/>
           </a:p>
           <a:p>
             <a:endParaRPr lang="es-ES" dirty="0"/>
@@ -10881,7 +10424,7 @@
       </p:sp>
       <p:pic>
         <p:nvPicPr>
-          <p:cNvPr id="6" name="Marcador de contenido 5"/>
+          <p:cNvPr id="5" name="Marcador de contenido 4"/>
           <p:cNvPicPr>
             <a:picLocks noGrp="1" noChangeAspect="1"/>
           </p:cNvPicPr>
@@ -10897,8 +10440,8 @@
         </p:blipFill>
         <p:spPr>
           <a:xfrm>
-            <a:off x="5622131" y="2459037"/>
-            <a:ext cx="5819775" cy="1838325"/>
+            <a:off x="5617369" y="2206625"/>
+            <a:ext cx="5829300" cy="2343150"/>
           </a:xfrm>
           <a:prstGeom prst="rect">
             <a:avLst/>
@@ -10908,7 +10451,7 @@
     </p:spTree>
     <p:extLst>
       <p:ext uri="{BB962C8B-B14F-4D97-AF65-F5344CB8AC3E}">
-        <p14:creationId xmlns:p14="http://schemas.microsoft.com/office/powerpoint/2010/main" val="3551851017"/>
+        <p14:creationId xmlns:p14="http://schemas.microsoft.com/office/powerpoint/2010/main" val="1725642590"/>
       </p:ext>
     </p:extLst>
   </p:cSld>
@@ -10927,13 +10470,6 @@
       </p:transition>
     </mc:Fallback>
   </mc:AlternateContent>
-  <p:timing>
-    <p:tnLst>
-      <p:par>
-        <p:cTn id="1" dur="indefinite" restart="never" nodeType="tmRoot"/>
-      </p:par>
-    </p:tnLst>
-  </p:timing>
 </p:sld>
 </file>
 
@@ -10979,7 +10515,7 @@
       </p:sp>
       <p:sp>
         <p:nvSpPr>
-          <p:cNvPr id="3" name="Marcador de contenido 2"/>
+          <p:cNvPr id="4" name="Marcador de contenido 3"/>
           <p:cNvSpPr>
             <a:spLocks noGrp="1"/>
           </p:cNvSpPr>
@@ -10989,10 +10525,30 @@
         </p:nvSpPr>
         <p:spPr/>
         <p:txBody>
-          <a:bodyPr/>
+          <a:bodyPr>
+            <a:normAutofit/>
+          </a:bodyPr>
           <a:lstStyle/>
           <a:p>
-            <a:endParaRPr lang="es-ES"/>
+            <a:r>
+              <a:rPr lang="es-419" dirty="0" smtClean="0"/>
+              <a:t>El presente proyecto trata de dar respuesta a una problemática encontrada en un negocio de videojuegos que resguarda la información de sus pedidos de forma manual en un archivo Excel.</a:t>
+            </a:r>
+          </a:p>
+          <a:p>
+            <a:r>
+              <a:rPr lang="es-419" dirty="0" smtClean="0"/>
+              <a:t>Para el manejo de datos de una forma más eficiente se ideó la creación de una base de datos, donde podrá ver todos los pedidos, información de clientes, productos y mejorar la calidad de sus informes.</a:t>
+            </a:r>
+          </a:p>
+          <a:p>
+            <a:r>
+              <a:rPr lang="es-419" dirty="0" smtClean="0"/>
+              <a:t>En las siguientes diapositivas podrá observar a detalle la estructura de esta base de datos.</a:t>
+            </a:r>
+          </a:p>
+          <a:p>
+            <a:endParaRPr lang="es-ES" dirty="0"/>
           </a:p>
         </p:txBody>
       </p:sp>
@@ -11050,19 +10606,17 @@
         </p:nvSpPr>
         <p:spPr>
           <a:xfrm>
-            <a:off x="1218882" y="1340768"/>
-            <a:ext cx="4062942" cy="1152128"/>
+            <a:off x="1218882" y="1701800"/>
+            <a:ext cx="4062942" cy="791096"/>
           </a:xfrm>
         </p:spPr>
         <p:txBody>
-          <a:bodyPr>
-            <a:normAutofit/>
-          </a:bodyPr>
+          <a:bodyPr/>
           <a:lstStyle/>
           <a:p>
             <a:r>
               <a:rPr lang="es-419" dirty="0" smtClean="0"/>
-              <a:t>HISTORIAL_CAMBIOS_ENVIOS</a:t>
+              <a:t>ESTADOENVIO</a:t>
             </a:r>
             <a:endParaRPr lang="es-ES" dirty="0"/>
           </a:p>
@@ -11090,16 +10644,13 @@
           <a:p>
             <a:r>
               <a:rPr lang="es-ES" dirty="0"/>
-              <a:t>Esta tabla esta creada para guardar los cambios realizados en la tabla </a:t>
+              <a:t>Esta tabla esta creada para guardar el estado de los envíos que se </a:t>
             </a:r>
             <a:r>
               <a:rPr lang="es-ES" dirty="0" smtClean="0"/>
-              <a:t>envíos </a:t>
+              <a:t>realicen.</a:t>
             </a:r>
-            <a:r>
-              <a:rPr lang="es-ES" dirty="0"/>
-              <a:t>mediante triggers.</a:t>
-            </a:r>
+            <a:endParaRPr lang="es-ES" dirty="0"/>
           </a:p>
           <a:p>
             <a:endParaRPr lang="es-ES" dirty="0"/>
@@ -11108,11 +10659,13 @@
       </p:sp>
       <p:pic>
         <p:nvPicPr>
-          <p:cNvPr id="5" name="Imagen 4"/>
+          <p:cNvPr id="6" name="Marcador de contenido 5"/>
           <p:cNvPicPr>
-            <a:picLocks noChangeAspect="1"/>
+            <a:picLocks noGrp="1" noChangeAspect="1"/>
           </p:cNvPicPr>
-          <p:nvPr/>
+          <p:nvPr>
+            <p:ph idx="1"/>
+          </p:nvPr>
         </p:nvPicPr>
         <p:blipFill>
           <a:blip r:embed="rId2"/>
@@ -11122,8 +10675,8 @@
         </p:blipFill>
         <p:spPr>
           <a:xfrm>
-            <a:off x="6094412" y="692696"/>
-            <a:ext cx="4824536" cy="5321342"/>
+            <a:off x="5622131" y="2459037"/>
+            <a:ext cx="5819775" cy="1838325"/>
           </a:xfrm>
           <a:prstGeom prst="rect">
             <a:avLst/>
@@ -11133,7 +10686,7 @@
     </p:spTree>
     <p:extLst>
       <p:ext uri="{BB962C8B-B14F-4D97-AF65-F5344CB8AC3E}">
-        <p14:creationId xmlns:p14="http://schemas.microsoft.com/office/powerpoint/2010/main" val="3056316281"/>
+        <p14:creationId xmlns:p14="http://schemas.microsoft.com/office/powerpoint/2010/main" val="3551851017"/>
       </p:ext>
     </p:extLst>
   </p:cSld>
@@ -11203,6 +10756,147 @@
           <a:p>
             <a:r>
               <a:rPr lang="es-419" dirty="0" smtClean="0"/>
+              <a:t>HISTORIAL_CAMBIOS_ENVIOS</a:t>
+            </a:r>
+            <a:endParaRPr lang="es-ES" dirty="0"/>
+          </a:p>
+        </p:txBody>
+      </p:sp>
+      <p:sp>
+        <p:nvSpPr>
+          <p:cNvPr id="3" name="Marcador de texto 2"/>
+          <p:cNvSpPr>
+            <a:spLocks noGrp="1"/>
+          </p:cNvSpPr>
+          <p:nvPr>
+            <p:ph type="body" sz="half" idx="2"/>
+          </p:nvPr>
+        </p:nvSpPr>
+        <p:spPr>
+          <a:xfrm>
+            <a:off x="1247196" y="2852936"/>
+            <a:ext cx="4062942" cy="1930400"/>
+          </a:xfrm>
+        </p:spPr>
+        <p:txBody>
+          <a:bodyPr/>
+          <a:lstStyle/>
+          <a:p>
+            <a:r>
+              <a:rPr lang="es-ES" dirty="0"/>
+              <a:t>Esta tabla esta creada para guardar los cambios realizados en la tabla </a:t>
+            </a:r>
+            <a:r>
+              <a:rPr lang="es-ES" dirty="0" smtClean="0"/>
+              <a:t>envíos </a:t>
+            </a:r>
+            <a:r>
+              <a:rPr lang="es-ES" dirty="0"/>
+              <a:t>mediante triggers.</a:t>
+            </a:r>
+          </a:p>
+          <a:p>
+            <a:endParaRPr lang="es-ES" dirty="0"/>
+          </a:p>
+        </p:txBody>
+      </p:sp>
+      <p:pic>
+        <p:nvPicPr>
+          <p:cNvPr id="5" name="Imagen 4"/>
+          <p:cNvPicPr>
+            <a:picLocks noChangeAspect="1"/>
+          </p:cNvPicPr>
+          <p:nvPr/>
+        </p:nvPicPr>
+        <p:blipFill>
+          <a:blip r:embed="rId2"/>
+          <a:stretch>
+            <a:fillRect/>
+          </a:stretch>
+        </p:blipFill>
+        <p:spPr>
+          <a:xfrm>
+            <a:off x="6094412" y="692696"/>
+            <a:ext cx="4824536" cy="5321342"/>
+          </a:xfrm>
+          <a:prstGeom prst="rect">
+            <a:avLst/>
+          </a:prstGeom>
+        </p:spPr>
+      </p:pic>
+    </p:spTree>
+    <p:extLst>
+      <p:ext uri="{BB962C8B-B14F-4D97-AF65-F5344CB8AC3E}">
+        <p14:creationId xmlns:p14="http://schemas.microsoft.com/office/powerpoint/2010/main" val="3056316281"/>
+      </p:ext>
+    </p:extLst>
+  </p:cSld>
+  <p:clrMapOvr>
+    <a:masterClrMapping/>
+  </p:clrMapOvr>
+  <mc:AlternateContent xmlns:mc="http://schemas.openxmlformats.org/markup-compatibility/2006" xmlns:p14="http://schemas.microsoft.com/office/powerpoint/2010/main">
+    <mc:Choice Requires="p14">
+      <p:transition spd="med" p14:dur="700">
+        <p:fade/>
+      </p:transition>
+    </mc:Choice>
+    <mc:Fallback xmlns="">
+      <p:transition spd="med">
+        <p:fade/>
+      </p:transition>
+    </mc:Fallback>
+  </mc:AlternateContent>
+  <p:timing>
+    <p:tnLst>
+      <p:par>
+        <p:cTn id="1" dur="indefinite" restart="never" nodeType="tmRoot"/>
+      </p:par>
+    </p:tnLst>
+  </p:timing>
+</p:sld>
+</file>
+
+<file path=ppt/slides/slide22.xml><?xml version="1.0" encoding="utf-8"?>
+<p:sld xmlns:a="http://schemas.openxmlformats.org/drawingml/2006/main" xmlns:r="http://schemas.openxmlformats.org/officeDocument/2006/relationships" xmlns:p="http://schemas.openxmlformats.org/presentationml/2006/main">
+  <p:cSld>
+    <p:spTree>
+      <p:nvGrpSpPr>
+        <p:cNvPr id="1" name=""/>
+        <p:cNvGrpSpPr/>
+        <p:nvPr/>
+      </p:nvGrpSpPr>
+      <p:grpSpPr>
+        <a:xfrm>
+          <a:off x="0" y="0"/>
+          <a:ext cx="0" cy="0"/>
+          <a:chOff x="0" y="0"/>
+          <a:chExt cx="0" cy="0"/>
+        </a:xfrm>
+      </p:grpSpPr>
+      <p:sp>
+        <p:nvSpPr>
+          <p:cNvPr id="2" name="Título 1"/>
+          <p:cNvSpPr>
+            <a:spLocks noGrp="1"/>
+          </p:cNvSpPr>
+          <p:nvPr>
+            <p:ph type="title"/>
+          </p:nvPr>
+        </p:nvSpPr>
+        <p:spPr>
+          <a:xfrm>
+            <a:off x="1218882" y="1340768"/>
+            <a:ext cx="4062942" cy="1152128"/>
+          </a:xfrm>
+        </p:spPr>
+        <p:txBody>
+          <a:bodyPr>
+            <a:normAutofit/>
+          </a:bodyPr>
+          <a:lstStyle/>
+          <a:p>
+            <a:r>
+              <a:rPr lang="es-419" dirty="0" smtClean="0"/>
               <a:t>HISTORIAL_CAMBIOS_PEDIDOS</a:t>
             </a:r>
             <a:endParaRPr lang="es-ES" dirty="0"/>
@@ -11303,7 +10997,7 @@
 </p:sld>
 </file>
 
-<file path=ppt/slides/slide22.xml><?xml version="1.0" encoding="utf-8"?>
+<file path=ppt/slides/slide23.xml><?xml version="1.0" encoding="utf-8"?>
 <p:sld xmlns:a="http://schemas.openxmlformats.org/drawingml/2006/main" xmlns:r="http://schemas.openxmlformats.org/officeDocument/2006/relationships" xmlns:p="http://schemas.openxmlformats.org/presentationml/2006/main">
   <p:cSld>
     <p:spTree>
@@ -11332,7 +11026,7 @@
         </p:nvSpPr>
         <p:spPr>
           <a:xfrm>
-            <a:off x="2998068" y="1844824"/>
+            <a:off x="3286100" y="2852936"/>
             <a:ext cx="7069519" cy="1220933"/>
           </a:xfrm>
         </p:spPr>
@@ -11346,106 +11040,16 @@
             </a:r>
             <a:r>
               <a:rPr lang="es-419" dirty="0" smtClean="0"/>
-              <a:t>creación de objetos</a:t>
+              <a:t>CREACIÓN DE OBJETOS</a:t>
             </a:r>
             <a:endParaRPr lang="es-ES" dirty="0"/>
           </a:p>
         </p:txBody>
       </p:sp>
-      <p:grpSp>
-        <p:nvGrpSpPr>
-          <p:cNvPr id="2" name="Grupo 1"/>
-          <p:cNvGrpSpPr/>
-          <p:nvPr/>
-        </p:nvGrpSpPr>
-        <p:grpSpPr>
-          <a:xfrm>
-            <a:off x="5086300" y="3085341"/>
-            <a:ext cx="3312368" cy="1634698"/>
-            <a:chOff x="4876643" y="2924944"/>
-            <a:chExt cx="3312368" cy="1634698"/>
-          </a:xfrm>
-        </p:grpSpPr>
-        <p:pic>
-          <p:nvPicPr>
-            <p:cNvPr id="3" name="Picture 2" descr="GitHub - Apps on Google Play">
-              <a:hlinkClick r:id="rId2"/>
-            </p:cNvPr>
-            <p:cNvPicPr>
-              <a:picLocks noChangeAspect="1" noChangeArrowheads="1"/>
-            </p:cNvPicPr>
-            <p:nvPr/>
-          </p:nvPicPr>
-          <p:blipFill>
-            <a:blip r:embed="rId3" cstate="print">
-              <a:extLst>
-                <a:ext uri="{28A0092B-C50C-407E-A947-70E740481C1C}">
-                  <a14:useLocalDpi xmlns:a14="http://schemas.microsoft.com/office/drawing/2010/main" val="0"/>
-                </a:ext>
-              </a:extLst>
-            </a:blip>
-            <a:srcRect/>
-            <a:stretch>
-              <a:fillRect/>
-            </a:stretch>
-          </p:blipFill>
-          <p:spPr bwMode="auto">
-            <a:xfrm>
-              <a:off x="5446340" y="2924944"/>
-              <a:ext cx="1098203" cy="1098203"/>
-            </a:xfrm>
-            <a:prstGeom prst="rect">
-              <a:avLst/>
-            </a:prstGeom>
-            <a:noFill/>
-            <a:extLst>
-              <a:ext uri="{909E8E84-426E-40DD-AFC4-6F175D3DCCD1}">
-                <a14:hiddenFill xmlns:a14="http://schemas.microsoft.com/office/drawing/2010/main">
-                  <a:solidFill>
-                    <a:srgbClr val="FFFFFF"/>
-                  </a:solidFill>
-                </a14:hiddenFill>
-              </a:ext>
-            </a:extLst>
-          </p:spPr>
-        </p:pic>
-        <p:sp>
-          <p:nvSpPr>
-            <p:cNvPr id="4" name="CuadroTexto 3">
-              <a:hlinkClick r:id="rId2"/>
-            </p:cNvPr>
-            <p:cNvSpPr txBox="1"/>
-            <p:nvPr/>
-          </p:nvSpPr>
-          <p:spPr>
-            <a:xfrm>
-              <a:off x="4876643" y="4221088"/>
-              <a:ext cx="3312368" cy="338554"/>
-            </a:xfrm>
-            <a:prstGeom prst="rect">
-              <a:avLst/>
-            </a:prstGeom>
-            <a:noFill/>
-          </p:spPr>
-          <p:txBody>
-            <a:bodyPr wrap="square" rtlCol="0">
-              <a:spAutoFit/>
-            </a:bodyPr>
-            <a:lstStyle/>
-            <a:p>
-              <a:r>
-                <a:rPr lang="es-419" sz="1600" dirty="0" smtClean="0"/>
-                <a:t>Script Base de Dato unificado</a:t>
-              </a:r>
-              <a:endParaRPr lang="es-ES" sz="1600" dirty="0"/>
-            </a:p>
-          </p:txBody>
-        </p:sp>
-      </p:grpSp>
     </p:spTree>
     <p:extLst>
       <p:ext uri="{BB962C8B-B14F-4D97-AF65-F5344CB8AC3E}">
-        <p14:creationId xmlns:p14="http://schemas.microsoft.com/office/powerpoint/2010/main" val="2794907005"/>
+        <p14:creationId xmlns:p14="http://schemas.microsoft.com/office/powerpoint/2010/main" val="713166292"/>
       </p:ext>
     </p:extLst>
   </p:cSld>
@@ -11467,7 +11071,7 @@
 </p:sld>
 </file>
 
-<file path=ppt/slides/slide23.xml><?xml version="1.0" encoding="utf-8"?>
+<file path=ppt/slides/slide24.xml><?xml version="1.0" encoding="utf-8"?>
 <p:sld xmlns:a="http://schemas.openxmlformats.org/drawingml/2006/main" xmlns:r="http://schemas.openxmlformats.org/officeDocument/2006/relationships" xmlns:p="http://schemas.openxmlformats.org/presentationml/2006/main">
   <p:cSld>
     <p:spTree>
@@ -11681,15 +11285,7 @@
             <a:p>
               <a:r>
                 <a:rPr lang="es-419" sz="1600" dirty="0" smtClean="0"/>
-                <a:t>Creación </a:t>
-              </a:r>
-              <a:r>
-                <a:rPr lang="es-419" sz="1600" dirty="0" smtClean="0"/>
-                <a:t>de informes/ </a:t>
-              </a:r>
-              <a:r>
-                <a:rPr lang="es-419" sz="1600" dirty="0" smtClean="0"/>
-                <a:t>vistas</a:t>
+                <a:t>Creación de informes/ vistas</a:t>
               </a:r>
               <a:endParaRPr lang="es-ES" sz="1600" dirty="0"/>
             </a:p>
@@ -12088,7 +11684,167 @@
 </p:sld>
 </file>
 
-<file path=ppt/slides/slide24.xml><?xml version="1.0" encoding="utf-8"?>
+<file path=ppt/slides/slide25.xml><?xml version="1.0" encoding="utf-8"?>
+<p:sld xmlns:a="http://schemas.openxmlformats.org/drawingml/2006/main" xmlns:r="http://schemas.openxmlformats.org/officeDocument/2006/relationships" xmlns:p="http://schemas.openxmlformats.org/presentationml/2006/main">
+  <p:cSld>
+    <p:spTree>
+      <p:nvGrpSpPr>
+        <p:cNvPr id="1" name=""/>
+        <p:cNvGrpSpPr/>
+        <p:nvPr/>
+      </p:nvGrpSpPr>
+      <p:grpSpPr>
+        <a:xfrm>
+          <a:off x="0" y="0"/>
+          <a:ext cx="0" cy="0"/>
+          <a:chOff x="0" y="0"/>
+          <a:chExt cx="0" cy="0"/>
+        </a:xfrm>
+      </p:grpSpPr>
+      <p:grpSp>
+        <p:nvGrpSpPr>
+          <p:cNvPr id="2" name="Grupo 1"/>
+          <p:cNvGrpSpPr/>
+          <p:nvPr/>
+        </p:nvGrpSpPr>
+        <p:grpSpPr>
+          <a:xfrm>
+            <a:off x="5086300" y="3085341"/>
+            <a:ext cx="3312368" cy="1634698"/>
+            <a:chOff x="4876643" y="2924944"/>
+            <a:chExt cx="3312368" cy="1634698"/>
+          </a:xfrm>
+        </p:grpSpPr>
+        <p:pic>
+          <p:nvPicPr>
+            <p:cNvPr id="3" name="Picture 2" descr="GitHub - Apps on Google Play">
+              <a:hlinkClick r:id="rId2"/>
+            </p:cNvPr>
+            <p:cNvPicPr>
+              <a:picLocks noChangeAspect="1" noChangeArrowheads="1"/>
+            </p:cNvPicPr>
+            <p:nvPr/>
+          </p:nvPicPr>
+          <p:blipFill>
+            <a:blip r:embed="rId3" cstate="print">
+              <a:extLst>
+                <a:ext uri="{28A0092B-C50C-407E-A947-70E740481C1C}">
+                  <a14:useLocalDpi xmlns:a14="http://schemas.microsoft.com/office/drawing/2010/main" val="0"/>
+                </a:ext>
+              </a:extLst>
+            </a:blip>
+            <a:srcRect/>
+            <a:stretch>
+              <a:fillRect/>
+            </a:stretch>
+          </p:blipFill>
+          <p:spPr bwMode="auto">
+            <a:xfrm>
+              <a:off x="5446340" y="2924944"/>
+              <a:ext cx="1098203" cy="1098203"/>
+            </a:xfrm>
+            <a:prstGeom prst="rect">
+              <a:avLst/>
+            </a:prstGeom>
+            <a:noFill/>
+            <a:extLst>
+              <a:ext uri="{909E8E84-426E-40DD-AFC4-6F175D3DCCD1}">
+                <a14:hiddenFill xmlns:a14="http://schemas.microsoft.com/office/drawing/2010/main">
+                  <a:solidFill>
+                    <a:srgbClr val="FFFFFF"/>
+                  </a:solidFill>
+                </a14:hiddenFill>
+              </a:ext>
+            </a:extLst>
+          </p:spPr>
+        </p:pic>
+        <p:sp>
+          <p:nvSpPr>
+            <p:cNvPr id="4" name="CuadroTexto 3">
+              <a:hlinkClick r:id="rId2"/>
+            </p:cNvPr>
+            <p:cNvSpPr txBox="1"/>
+            <p:nvPr/>
+          </p:nvSpPr>
+          <p:spPr>
+            <a:xfrm>
+              <a:off x="4876643" y="4221088"/>
+              <a:ext cx="3312368" cy="338554"/>
+            </a:xfrm>
+            <a:prstGeom prst="rect">
+              <a:avLst/>
+            </a:prstGeom>
+            <a:noFill/>
+          </p:spPr>
+          <p:txBody>
+            <a:bodyPr wrap="square" rtlCol="0">
+              <a:spAutoFit/>
+            </a:bodyPr>
+            <a:lstStyle/>
+            <a:p>
+              <a:r>
+                <a:rPr lang="es-419" sz="1600" dirty="0" smtClean="0"/>
+                <a:t>Script base de datos completa</a:t>
+              </a:r>
+              <a:endParaRPr lang="es-ES" sz="1600" dirty="0"/>
+            </a:p>
+          </p:txBody>
+        </p:sp>
+      </p:grpSp>
+      <p:sp>
+        <p:nvSpPr>
+          <p:cNvPr id="6" name="Marcador de texto 5"/>
+          <p:cNvSpPr>
+            <a:spLocks noGrp="1"/>
+          </p:cNvSpPr>
+          <p:nvPr>
+            <p:ph type="body" idx="1"/>
+          </p:nvPr>
+        </p:nvSpPr>
+        <p:spPr>
+          <a:xfrm>
+            <a:off x="4366220" y="1154971"/>
+            <a:ext cx="7069519" cy="1220933"/>
+          </a:xfrm>
+        </p:spPr>
+        <p:txBody>
+          <a:bodyPr/>
+          <a:lstStyle/>
+          <a:p>
+            <a:r>
+              <a:rPr lang="es-419" dirty="0" smtClean="0"/>
+              <a:t>SCRIPTS UNIFICADOS</a:t>
+            </a:r>
+            <a:endParaRPr lang="es-ES" dirty="0"/>
+          </a:p>
+        </p:txBody>
+      </p:sp>
+    </p:spTree>
+    <p:extLst>
+      <p:ext uri="{BB962C8B-B14F-4D97-AF65-F5344CB8AC3E}">
+        <p14:creationId xmlns:p14="http://schemas.microsoft.com/office/powerpoint/2010/main" val="2794907005"/>
+      </p:ext>
+    </p:extLst>
+  </p:cSld>
+  <p:clrMapOvr>
+    <a:masterClrMapping/>
+  </p:clrMapOvr>
+  <mc:AlternateContent xmlns:mc="http://schemas.openxmlformats.org/markup-compatibility/2006" xmlns:p14="http://schemas.microsoft.com/office/powerpoint/2010/main">
+    <mc:Choice Requires="p14">
+      <p:transition spd="med" p14:dur="700">
+        <p:fade/>
+      </p:transition>
+    </mc:Choice>
+    <mc:Fallback xmlns="">
+      <p:transition spd="med">
+        <p:fade/>
+      </p:transition>
+    </mc:Fallback>
+  </mc:AlternateContent>
+</p:sld>
+</file>
+
+<file path=ppt/slides/slide26.xml><?xml version="1.0" encoding="utf-8"?>
 <p:sld xmlns:a="http://schemas.openxmlformats.org/drawingml/2006/main" xmlns:r="http://schemas.openxmlformats.org/officeDocument/2006/relationships" xmlns:p="http://schemas.openxmlformats.org/presentationml/2006/main">
   <p:cSld>
     <p:spTree>
@@ -12136,7 +11892,7 @@
     </p:spTree>
     <p:extLst>
       <p:ext uri="{BB962C8B-B14F-4D97-AF65-F5344CB8AC3E}">
-        <p14:creationId xmlns:p14="http://schemas.microsoft.com/office/powerpoint/2010/main" val="713166292"/>
+        <p14:creationId xmlns:p14="http://schemas.microsoft.com/office/powerpoint/2010/main" val="2020010344"/>
       </p:ext>
     </p:extLst>
   </p:cSld>
@@ -12158,7 +11914,7 @@
 </p:sld>
 </file>
 
-<file path=ppt/slides/slide25.xml><?xml version="1.0" encoding="utf-8"?>
+<file path=ppt/slides/slide27.xml><?xml version="1.0" encoding="utf-8"?>
 <p:sld xmlns:a="http://schemas.openxmlformats.org/drawingml/2006/main" xmlns:r="http://schemas.openxmlformats.org/officeDocument/2006/relationships" xmlns:p="http://schemas.openxmlformats.org/presentationml/2006/main">
   <p:cSld>
     <p:spTree>
@@ -12308,7 +12064,7 @@
 </p:sld>
 </file>
 
-<file path=ppt/slides/slide26.xml><?xml version="1.0" encoding="utf-8"?>
+<file path=ppt/slides/slide28.xml><?xml version="1.0" encoding="utf-8"?>
 <p:sld xmlns:a="http://schemas.openxmlformats.org/drawingml/2006/main" xmlns:r="http://schemas.openxmlformats.org/officeDocument/2006/relationships" xmlns:p="http://schemas.openxmlformats.org/presentationml/2006/main">
   <p:cSld>
     <p:spTree>
@@ -12432,11 +12188,7 @@
             <a:p>
               <a:r>
                 <a:rPr lang="es-419" sz="1600" dirty="0" smtClean="0"/>
-                <a:t>Script </a:t>
-              </a:r>
-              <a:r>
-                <a:rPr lang="es-419" sz="1600" dirty="0" smtClean="0"/>
-                <a:t>inserción de datos</a:t>
+                <a:t>Script inserción de datos</a:t>
               </a:r>
               <a:endParaRPr lang="es-ES" sz="1600" dirty="0"/>
             </a:p>
@@ -12569,7 +12321,7 @@
 </p:sld>
 </file>
 
-<file path=ppt/slides/slide27.xml><?xml version="1.0" encoding="utf-8"?>
+<file path=ppt/slides/slide29.xml><?xml version="1.0" encoding="utf-8"?>
 <p:sld xmlns:a="http://schemas.openxmlformats.org/drawingml/2006/main" xmlns:r="http://schemas.openxmlformats.org/officeDocument/2006/relationships" xmlns:p="http://schemas.openxmlformats.org/presentationml/2006/main">
   <p:cSld>
     <p:spTree>
@@ -12905,7 +12657,7 @@
           <a:p>
             <a:r>
               <a:rPr lang="es-419" dirty="0" smtClean="0"/>
-              <a:t>Objetivo</a:t>
+              <a:t>Objetivos</a:t>
             </a:r>
             <a:endParaRPr lang="es-ES" dirty="0"/>
           </a:p>
@@ -12926,7 +12678,17 @@
           <a:bodyPr/>
           <a:lstStyle/>
           <a:p>
-            <a:endParaRPr lang="es-ES"/>
+            <a:r>
+              <a:rPr lang="es-419" dirty="0" smtClean="0"/>
+              <a:t>Crear una base de datos relacional basado en una tienda online (ecommerce) de videojuegos.</a:t>
+            </a:r>
+          </a:p>
+          <a:p>
+            <a:r>
+              <a:rPr lang="es-419" dirty="0" smtClean="0"/>
+              <a:t>Generar informes a partir de consultas a la base de datos.</a:t>
+            </a:r>
+            <a:endParaRPr lang="es-ES" dirty="0"/>
           </a:p>
         </p:txBody>
       </p:sp>
@@ -12984,6 +12746,112 @@
         </p:nvSpPr>
         <p:spPr/>
         <p:txBody>
+          <a:bodyPr/>
+          <a:lstStyle/>
+          <a:p>
+            <a:r>
+              <a:rPr lang="es-419" dirty="0" smtClean="0"/>
+              <a:t>Situación problemática</a:t>
+            </a:r>
+            <a:endParaRPr lang="es-ES" dirty="0"/>
+          </a:p>
+        </p:txBody>
+      </p:sp>
+      <p:sp>
+        <p:nvSpPr>
+          <p:cNvPr id="3" name="Marcador de contenido 2"/>
+          <p:cNvSpPr>
+            <a:spLocks noGrp="1"/>
+          </p:cNvSpPr>
+          <p:nvPr>
+            <p:ph idx="1"/>
+          </p:nvPr>
+        </p:nvSpPr>
+        <p:spPr/>
+        <p:txBody>
+          <a:bodyPr>
+            <a:normAutofit fontScale="92500"/>
+          </a:bodyPr>
+          <a:lstStyle/>
+          <a:p>
+            <a:r>
+              <a:rPr lang="es-419" dirty="0" smtClean="0"/>
+              <a:t>A nivel mundial todo negocio esta migrando a la tecnología online, desde la pandemia ha avanzado en forma exponencial el método de compra ecommerce con el fin de tener al alcance de su mano los artículos sin necesidad de salir de casa. Por este motivo en pro de seguir adelante es necesario incorporar este tipo de tecnología al comercio.</a:t>
+            </a:r>
+          </a:p>
+          <a:p>
+            <a:r>
+              <a:rPr lang="es-419" dirty="0" smtClean="0"/>
+              <a:t>Actualmente toda la información se lleva de manera manual en un Excel por lo que no se confía plenamente en la calidad de datos resguardados.</a:t>
+            </a:r>
+            <a:endParaRPr lang="es-419" dirty="0" smtClean="0"/>
+          </a:p>
+          <a:p>
+            <a:r>
+              <a:rPr lang="es-419" dirty="0" smtClean="0"/>
+              <a:t>Para este proyecto se realizará la adecuación de la base de datos para un nuevo negocio incorporándose en esta área con el fin de avanzar.</a:t>
+            </a:r>
+            <a:endParaRPr lang="es-419" dirty="0" smtClean="0"/>
+          </a:p>
+          <a:p>
+            <a:endParaRPr lang="es-ES" dirty="0"/>
+          </a:p>
+        </p:txBody>
+      </p:sp>
+    </p:spTree>
+    <p:extLst>
+      <p:ext uri="{BB962C8B-B14F-4D97-AF65-F5344CB8AC3E}">
+        <p14:creationId xmlns:p14="http://schemas.microsoft.com/office/powerpoint/2010/main" val="681712451"/>
+      </p:ext>
+    </p:extLst>
+  </p:cSld>
+  <p:clrMapOvr>
+    <a:masterClrMapping/>
+  </p:clrMapOvr>
+  <mc:AlternateContent xmlns:mc="http://schemas.openxmlformats.org/markup-compatibility/2006" xmlns:p14="http://schemas.microsoft.com/office/powerpoint/2010/main">
+    <mc:Choice Requires="p14">
+      <p:transition spd="med" p14:dur="700">
+        <p:fade/>
+      </p:transition>
+    </mc:Choice>
+    <mc:Fallback xmlns="">
+      <p:transition spd="med">
+        <p:fade/>
+      </p:transition>
+    </mc:Fallback>
+  </mc:AlternateContent>
+</p:sld>
+</file>
+
+<file path=ppt/slides/slide5.xml><?xml version="1.0" encoding="utf-8"?>
+<p:sld xmlns:a="http://schemas.openxmlformats.org/drawingml/2006/main" xmlns:r="http://schemas.openxmlformats.org/officeDocument/2006/relationships" xmlns:p="http://schemas.openxmlformats.org/presentationml/2006/main">
+  <p:cSld>
+    <p:spTree>
+      <p:nvGrpSpPr>
+        <p:cNvPr id="1" name=""/>
+        <p:cNvGrpSpPr/>
+        <p:nvPr/>
+      </p:nvGrpSpPr>
+      <p:grpSpPr>
+        <a:xfrm>
+          <a:off x="0" y="0"/>
+          <a:ext cx="0" cy="0"/>
+          <a:chOff x="0" y="0"/>
+          <a:chExt cx="0" cy="0"/>
+        </a:xfrm>
+      </p:grpSpPr>
+      <p:sp>
+        <p:nvSpPr>
+          <p:cNvPr id="2" name="Título 1"/>
+          <p:cNvSpPr>
+            <a:spLocks noGrp="1"/>
+          </p:cNvSpPr>
+          <p:nvPr>
+            <p:ph type="title"/>
+          </p:nvPr>
+        </p:nvSpPr>
+        <p:spPr/>
+        <p:txBody>
           <a:bodyPr rtlCol="0"/>
           <a:lstStyle/>
           <a:p>
@@ -13020,21 +12888,8 @@
             <a:pPr rtl="0"/>
             <a:r>
               <a:rPr lang="es-419" dirty="0" smtClean="0"/>
-              <a:t>Base de datos que tiene como </a:t>
+              <a:t>Base de datos que tiene como objetivo permitir registrar toda la información del cliente, información del pedido que realice y del listado de productos, así mismo permite el manejo de proveedores, los envíos de los pedidos y el estado de los envíos.</a:t>
             </a:r>
-            <a:r>
-              <a:rPr lang="es-419" dirty="0" smtClean="0"/>
-              <a:t>objetivo permitir </a:t>
-            </a:r>
-            <a:r>
-              <a:rPr lang="es-419" dirty="0" smtClean="0"/>
-              <a:t>registrar toda la información del cliente, información del pedido que realice y del listado de productos, así mismo permite el manejo de proveedores, los envíos de los pedidos y el estado de los envíos</a:t>
-            </a:r>
-            <a:r>
-              <a:rPr lang="es-419" dirty="0" smtClean="0"/>
-              <a:t>.</a:t>
-            </a:r>
-            <a:endParaRPr lang="es-419" dirty="0" smtClean="0"/>
           </a:p>
         </p:txBody>
       </p:sp>
@@ -13088,7 +12943,7 @@
 </p:sld>
 </file>
 
-<file path=ppt/slides/slide5.xml><?xml version="1.0" encoding="utf-8"?>
+<file path=ppt/slides/slide6.xml><?xml version="1.0" encoding="utf-8"?>
 <p:sld xmlns:a="http://schemas.openxmlformats.org/drawingml/2006/main" xmlns:r="http://schemas.openxmlformats.org/officeDocument/2006/relationships" xmlns:p="http://schemas.openxmlformats.org/presentationml/2006/main">
   <p:cSld>
     <p:spTree>
@@ -13158,7 +13013,7 @@
 </p:sld>
 </file>
 
-<file path=ppt/slides/slide6.xml><?xml version="1.0" encoding="utf-8"?>
+<file path=ppt/slides/slide7.xml><?xml version="1.0" encoding="utf-8"?>
 <p:sld xmlns:a="http://schemas.openxmlformats.org/drawingml/2006/main" xmlns:r="http://schemas.openxmlformats.org/officeDocument/2006/relationships" xmlns:p="http://schemas.openxmlformats.org/presentationml/2006/main">
   <p:cSld>
     <p:spTree>
@@ -13255,7 +13110,7 @@
 </p:sld>
 </file>
 
-<file path=ppt/slides/slide7.xml><?xml version="1.0" encoding="utf-8"?>
+<file path=ppt/slides/slide8.xml><?xml version="1.0" encoding="utf-8"?>
 <p:sld xmlns:a="http://schemas.openxmlformats.org/drawingml/2006/main" xmlns:r="http://schemas.openxmlformats.org/officeDocument/2006/relationships" xmlns:p="http://schemas.openxmlformats.org/presentationml/2006/main">
   <p:cSld>
     <p:spTree>
@@ -13329,130 +13184,6 @@
       </p:par>
     </p:tnLst>
   </p:timing>
-</p:sld>
-</file>
-
-<file path=ppt/slides/slide8.xml><?xml version="1.0" encoding="utf-8"?>
-<p:sld xmlns:a="http://schemas.openxmlformats.org/drawingml/2006/main" xmlns:r="http://schemas.openxmlformats.org/officeDocument/2006/relationships" xmlns:p="http://schemas.openxmlformats.org/presentationml/2006/main">
-  <p:cSld>
-    <p:spTree>
-      <p:nvGrpSpPr>
-        <p:cNvPr id="1" name=""/>
-        <p:cNvGrpSpPr/>
-        <p:nvPr/>
-      </p:nvGrpSpPr>
-      <p:grpSpPr>
-        <a:xfrm>
-          <a:off x="0" y="0"/>
-          <a:ext cx="0" cy="0"/>
-          <a:chOff x="0" y="0"/>
-          <a:chExt cx="0" cy="0"/>
-        </a:xfrm>
-      </p:grpSpPr>
-      <p:sp>
-        <p:nvSpPr>
-          <p:cNvPr id="4" name="Título 3"/>
-          <p:cNvSpPr>
-            <a:spLocks noGrp="1"/>
-          </p:cNvSpPr>
-          <p:nvPr>
-            <p:ph type="title"/>
-          </p:nvPr>
-        </p:nvSpPr>
-        <p:spPr>
-          <a:xfrm>
-            <a:off x="1218882" y="1701800"/>
-            <a:ext cx="4062942" cy="791096"/>
-          </a:xfrm>
-        </p:spPr>
-        <p:txBody>
-          <a:bodyPr/>
-          <a:lstStyle/>
-          <a:p>
-            <a:r>
-              <a:rPr lang="es-419" dirty="0" smtClean="0"/>
-              <a:t>PAIS</a:t>
-            </a:r>
-            <a:endParaRPr lang="es-ES" dirty="0"/>
-          </a:p>
-        </p:txBody>
-      </p:sp>
-      <p:sp>
-        <p:nvSpPr>
-          <p:cNvPr id="6" name="Marcador de texto 5"/>
-          <p:cNvSpPr>
-            <a:spLocks noGrp="1"/>
-          </p:cNvSpPr>
-          <p:nvPr>
-            <p:ph type="body" sz="half" idx="2"/>
-          </p:nvPr>
-        </p:nvSpPr>
-        <p:spPr>
-          <a:xfrm>
-            <a:off x="1125860" y="2924944"/>
-            <a:ext cx="4062942" cy="1930400"/>
-          </a:xfrm>
-        </p:spPr>
-        <p:txBody>
-          <a:bodyPr/>
-          <a:lstStyle/>
-          <a:p>
-            <a:r>
-              <a:rPr lang="es-ES" dirty="0"/>
-              <a:t>Esta tabla esta creada para indicar el país de las partes interesadas (cliente, proveedor, etc.)</a:t>
-            </a:r>
-          </a:p>
-          <a:p>
-            <a:endParaRPr lang="es-ES" dirty="0"/>
-          </a:p>
-        </p:txBody>
-      </p:sp>
-      <p:pic>
-        <p:nvPicPr>
-          <p:cNvPr id="5" name="Imagen 4"/>
-          <p:cNvPicPr>
-            <a:picLocks noChangeAspect="1"/>
-          </p:cNvPicPr>
-          <p:nvPr/>
-        </p:nvPicPr>
-        <p:blipFill>
-          <a:blip r:embed="rId2"/>
-          <a:stretch>
-            <a:fillRect/>
-          </a:stretch>
-        </p:blipFill>
-        <p:spPr>
-          <a:xfrm>
-            <a:off x="5590356" y="2301056"/>
-            <a:ext cx="5962650" cy="1247775"/>
-          </a:xfrm>
-          <a:prstGeom prst="rect">
-            <a:avLst/>
-          </a:prstGeom>
-        </p:spPr>
-      </p:pic>
-    </p:spTree>
-    <p:extLst>
-      <p:ext uri="{BB962C8B-B14F-4D97-AF65-F5344CB8AC3E}">
-        <p14:creationId xmlns:p14="http://schemas.microsoft.com/office/powerpoint/2010/main" val="2857499387"/>
-      </p:ext>
-    </p:extLst>
-  </p:cSld>
-  <p:clrMapOvr>
-    <a:masterClrMapping/>
-  </p:clrMapOvr>
-  <mc:AlternateContent xmlns:mc="http://schemas.openxmlformats.org/markup-compatibility/2006" xmlns:p14="http://schemas.microsoft.com/office/powerpoint/2010/main">
-    <mc:Choice Requires="p14">
-      <p:transition spd="med" p14:dur="700">
-        <p:fade/>
-      </p:transition>
-    </mc:Choice>
-    <mc:Fallback xmlns="">
-      <p:transition spd="med">
-        <p:fade/>
-      </p:transition>
-    </mc:Fallback>
-  </mc:AlternateContent>
 </p:sld>
 </file>
 
@@ -13495,7 +13226,7 @@
           <a:p>
             <a:r>
               <a:rPr lang="es-419" dirty="0" smtClean="0"/>
-              <a:t>CIUDAD</a:t>
+              <a:t>PAIS</a:t>
             </a:r>
             <a:endParaRPr lang="es-ES" dirty="0"/>
           </a:p>
@@ -13523,7 +13254,7 @@
           <a:p>
             <a:r>
               <a:rPr lang="es-ES" dirty="0"/>
-              <a:t>Esta tabla esta creada para indicar la ciudad de las partes interesadas (cliente, proveedor, etc.)</a:t>
+              <a:t>Esta tabla esta creada para indicar el país de las partes interesadas (cliente, proveedor, etc.)</a:t>
             </a:r>
           </a:p>
           <a:p>
@@ -13533,7 +13264,7 @@
       </p:sp>
       <p:pic>
         <p:nvPicPr>
-          <p:cNvPr id="2" name="Imagen 1"/>
+          <p:cNvPr id="5" name="Imagen 4"/>
           <p:cNvPicPr>
             <a:picLocks noChangeAspect="1"/>
           </p:cNvPicPr>
@@ -13547,8 +13278,8 @@
         </p:blipFill>
         <p:spPr>
           <a:xfrm>
-            <a:off x="5590356" y="2097348"/>
-            <a:ext cx="5934075" cy="1838325"/>
+            <a:off x="5590356" y="2301056"/>
+            <a:ext cx="5962650" cy="1247775"/>
           </a:xfrm>
           <a:prstGeom prst="rect">
             <a:avLst/>
@@ -13558,7 +13289,7 @@
     </p:spTree>
     <p:extLst>
       <p:ext uri="{BB962C8B-B14F-4D97-AF65-F5344CB8AC3E}">
-        <p14:creationId xmlns:p14="http://schemas.microsoft.com/office/powerpoint/2010/main" val="3969985584"/>
+        <p14:creationId xmlns:p14="http://schemas.microsoft.com/office/powerpoint/2010/main" val="2857499387"/>
       </p:ext>
     </p:extLst>
   </p:cSld>
@@ -14540,6 +14271,142 @@
 </file>
 
 <file path=customXml/item2.xml><?xml version="1.0" encoding="utf-8"?>
+<p:properties xmlns:p="http://schemas.microsoft.com/office/2006/metadata/properties" xmlns:xsi="http://www.w3.org/2001/XMLSchema-instance" xmlns:pc="http://schemas.microsoft.com/office/infopath/2007/PartnerControls">
+  <documentManagement>
+    <LocPublishedLinkedAssetsLookup xmlns="4873beb7-5857-4685-be1f-d57550cc96cc" xsi:nil="true"/>
+    <ApprovalStatus xmlns="4873beb7-5857-4685-be1f-d57550cc96cc">InProgress</ApprovalStatus>
+    <MarketSpecific xmlns="4873beb7-5857-4685-be1f-d57550cc96cc">false</MarketSpecific>
+    <LocComments xmlns="4873beb7-5857-4685-be1f-d57550cc96cc" xsi:nil="true"/>
+    <LocLastLocAttemptVersionTypeLookup xmlns="4873beb7-5857-4685-be1f-d57550cc96cc" xsi:nil="true"/>
+    <DirectSourceMarket xmlns="4873beb7-5857-4685-be1f-d57550cc96cc" xsi:nil="true"/>
+    <ThumbnailAssetId xmlns="4873beb7-5857-4685-be1f-d57550cc96cc" xsi:nil="true"/>
+    <PrimaryImageGen xmlns="4873beb7-5857-4685-be1f-d57550cc96cc">false</PrimaryImageGen>
+    <LocNewPublishedVersionLookup xmlns="4873beb7-5857-4685-be1f-d57550cc96cc" xsi:nil="true"/>
+    <LegacyData xmlns="4873beb7-5857-4685-be1f-d57550cc96cc" xsi:nil="true"/>
+    <LocRecommendedHandoff xmlns="4873beb7-5857-4685-be1f-d57550cc96cc" xsi:nil="true"/>
+    <BusinessGroup xmlns="4873beb7-5857-4685-be1f-d57550cc96cc" xsi:nil="true"/>
+    <BlockPublish xmlns="4873beb7-5857-4685-be1f-d57550cc96cc">false</BlockPublish>
+    <TPFriendlyName xmlns="4873beb7-5857-4685-be1f-d57550cc96cc" xsi:nil="true"/>
+    <LocOverallPublishStatusLookup xmlns="4873beb7-5857-4685-be1f-d57550cc96cc" xsi:nil="true"/>
+    <NumericId xmlns="4873beb7-5857-4685-be1f-d57550cc96cc" xsi:nil="true"/>
+    <APEditor xmlns="4873beb7-5857-4685-be1f-d57550cc96cc">
+      <UserInfo>
+        <DisplayName/>
+        <AccountId xsi:nil="true"/>
+        <AccountType/>
+      </UserInfo>
+    </APEditor>
+    <SourceTitle xmlns="4873beb7-5857-4685-be1f-d57550cc96cc" xsi:nil="true"/>
+    <OpenTemplate xmlns="4873beb7-5857-4685-be1f-d57550cc96cc">true</OpenTemplate>
+    <LocOverallLocStatusLookup xmlns="4873beb7-5857-4685-be1f-d57550cc96cc" xsi:nil="true"/>
+    <UALocComments xmlns="4873beb7-5857-4685-be1f-d57550cc96cc" xsi:nil="true"/>
+    <ParentAssetId xmlns="4873beb7-5857-4685-be1f-d57550cc96cc" xsi:nil="true"/>
+    <IntlLangReviewDate xmlns="4873beb7-5857-4685-be1f-d57550cc96cc" xsi:nil="true"/>
+    <FeatureTagsTaxHTField0 xmlns="4873beb7-5857-4685-be1f-d57550cc96cc">
+      <Terms xmlns="http://schemas.microsoft.com/office/infopath/2007/PartnerControls"/>
+    </FeatureTagsTaxHTField0>
+    <PublishStatusLookup xmlns="4873beb7-5857-4685-be1f-d57550cc96cc">
+      <Value>1345093</Value>
+    </PublishStatusLookup>
+    <Providers xmlns="4873beb7-5857-4685-be1f-d57550cc96cc" xsi:nil="true"/>
+    <MachineTranslated xmlns="4873beb7-5857-4685-be1f-d57550cc96cc">false</MachineTranslated>
+    <OriginalSourceMarket xmlns="4873beb7-5857-4685-be1f-d57550cc96cc" xsi:nil="true"/>
+    <APDescription xmlns="4873beb7-5857-4685-be1f-d57550cc96cc">This simple template design works for technology and  businesses, but it's versatile enough to use in other contexts.  It features multiple slide layouts designed for widescreen (16x9 resolution) and includes a sample SmartArt list and chart that are easily editable.</APDescription>
+    <ClipArtFilename xmlns="4873beb7-5857-4685-be1f-d57550cc96cc" xsi:nil="true"/>
+    <ContentItem xmlns="4873beb7-5857-4685-be1f-d57550cc96cc" xsi:nil="true"/>
+    <TPInstallLocation xmlns="4873beb7-5857-4685-be1f-d57550cc96cc" xsi:nil="true"/>
+    <PublishTargets xmlns="4873beb7-5857-4685-be1f-d57550cc96cc">OfficeOnlineVNext</PublishTargets>
+    <TimesCloned xmlns="4873beb7-5857-4685-be1f-d57550cc96cc" xsi:nil="true"/>
+    <AssetStart xmlns="4873beb7-5857-4685-be1f-d57550cc96cc">2011-11-26T00:30:00+00:00</AssetStart>
+    <Provider xmlns="4873beb7-5857-4685-be1f-d57550cc96cc" xsi:nil="true"/>
+    <AcquiredFrom xmlns="4873beb7-5857-4685-be1f-d57550cc96cc">Internal MS</AcquiredFrom>
+    <FriendlyTitle xmlns="4873beb7-5857-4685-be1f-d57550cc96cc" xsi:nil="true"/>
+    <LastHandOff xmlns="4873beb7-5857-4685-be1f-d57550cc96cc" xsi:nil="true"/>
+    <TPClientViewer xmlns="4873beb7-5857-4685-be1f-d57550cc96cc" xsi:nil="true"/>
+    <TemplateStatus xmlns="4873beb7-5857-4685-be1f-d57550cc96cc">Complete</TemplateStatus>
+    <Downloads xmlns="4873beb7-5857-4685-be1f-d57550cc96cc">0</Downloads>
+    <OOCacheId xmlns="4873beb7-5857-4685-be1f-d57550cc96cc" xsi:nil="true"/>
+    <IsDeleted xmlns="4873beb7-5857-4685-be1f-d57550cc96cc">false</IsDeleted>
+    <LocPublishedDependentAssetsLookup xmlns="4873beb7-5857-4685-be1f-d57550cc96cc" xsi:nil="true"/>
+    <TPExecutable xmlns="4873beb7-5857-4685-be1f-d57550cc96cc" xsi:nil="true"/>
+    <EditorialTags xmlns="4873beb7-5857-4685-be1f-d57550cc96cc" xsi:nil="true"/>
+    <SubmitterId xmlns="4873beb7-5857-4685-be1f-d57550cc96cc" xsi:nil="true"/>
+    <ApprovalLog xmlns="4873beb7-5857-4685-be1f-d57550cc96cc" xsi:nil="true"/>
+    <AssetType xmlns="4873beb7-5857-4685-be1f-d57550cc96cc">TP</AssetType>
+    <BugNumber xmlns="4873beb7-5857-4685-be1f-d57550cc96cc" xsi:nil="true"/>
+    <CSXSubmissionDate xmlns="4873beb7-5857-4685-be1f-d57550cc96cc" xsi:nil="true"/>
+    <CSXUpdate xmlns="4873beb7-5857-4685-be1f-d57550cc96cc">false</CSXUpdate>
+    <Milestone xmlns="4873beb7-5857-4685-be1f-d57550cc96cc" xsi:nil="true"/>
+    <RecommendationsModifier xmlns="4873beb7-5857-4685-be1f-d57550cc96cc" xsi:nil="true"/>
+    <OriginAsset xmlns="4873beb7-5857-4685-be1f-d57550cc96cc" xsi:nil="true"/>
+    <TPComponent xmlns="4873beb7-5857-4685-be1f-d57550cc96cc" xsi:nil="true"/>
+    <AssetId xmlns="4873beb7-5857-4685-be1f-d57550cc96cc">TP102787989</AssetId>
+    <IntlLocPriority xmlns="4873beb7-5857-4685-be1f-d57550cc96cc" xsi:nil="true"/>
+    <PolicheckWords xmlns="4873beb7-5857-4685-be1f-d57550cc96cc" xsi:nil="true"/>
+    <TPLaunchHelpLink xmlns="4873beb7-5857-4685-be1f-d57550cc96cc" xsi:nil="true"/>
+    <TPApplication xmlns="4873beb7-5857-4685-be1f-d57550cc96cc" xsi:nil="true"/>
+    <CrawlForDependencies xmlns="4873beb7-5857-4685-be1f-d57550cc96cc">false</CrawlForDependencies>
+    <HandoffToMSDN xmlns="4873beb7-5857-4685-be1f-d57550cc96cc" xsi:nil="true"/>
+    <PlannedPubDate xmlns="4873beb7-5857-4685-be1f-d57550cc96cc" xsi:nil="true"/>
+    <IntlLangReviewer xmlns="4873beb7-5857-4685-be1f-d57550cc96cc" xsi:nil="true"/>
+    <TrustLevel xmlns="4873beb7-5857-4685-be1f-d57550cc96cc">1 Microsoft Managed Content</TrustLevel>
+    <LocLastLocAttemptVersionLookup xmlns="4873beb7-5857-4685-be1f-d57550cc96cc">694266</LocLastLocAttemptVersionLookup>
+    <LocProcessedForHandoffsLookup xmlns="4873beb7-5857-4685-be1f-d57550cc96cc" xsi:nil="true"/>
+    <IsSearchable xmlns="4873beb7-5857-4685-be1f-d57550cc96cc">true</IsSearchable>
+    <TemplateTemplateType xmlns="4873beb7-5857-4685-be1f-d57550cc96cc">PowerPoint Presentation Template</TemplateTemplateType>
+    <CampaignTagsTaxHTField0 xmlns="4873beb7-5857-4685-be1f-d57550cc96cc">
+      <Terms xmlns="http://schemas.microsoft.com/office/infopath/2007/PartnerControls"/>
+    </CampaignTagsTaxHTField0>
+    <TPNamespace xmlns="4873beb7-5857-4685-be1f-d57550cc96cc" xsi:nil="true"/>
+    <LocOverallPreviewStatusLookup xmlns="4873beb7-5857-4685-be1f-d57550cc96cc" xsi:nil="true"/>
+    <TaxCatchAll xmlns="4873beb7-5857-4685-be1f-d57550cc96cc"/>
+    <Markets xmlns="4873beb7-5857-4685-be1f-d57550cc96cc"/>
+    <UAProjectedTotalWords xmlns="4873beb7-5857-4685-be1f-d57550cc96cc" xsi:nil="true"/>
+    <IntlLangReview xmlns="4873beb7-5857-4685-be1f-d57550cc96cc" xsi:nil="true"/>
+    <OutputCachingOn xmlns="4873beb7-5857-4685-be1f-d57550cc96cc">false</OutputCachingOn>
+    <AverageRating xmlns="4873beb7-5857-4685-be1f-d57550cc96cc" xsi:nil="true"/>
+    <APAuthor xmlns="4873beb7-5857-4685-be1f-d57550cc96cc">
+      <UserInfo>
+        <DisplayName>REDMOND\kristaa</DisplayName>
+        <AccountId>136</AccountId>
+        <AccountType/>
+      </UserInfo>
+    </APAuthor>
+    <LocManualTestRequired xmlns="4873beb7-5857-4685-be1f-d57550cc96cc">false</LocManualTestRequired>
+    <TPCommandLine xmlns="4873beb7-5857-4685-be1f-d57550cc96cc" xsi:nil="true"/>
+    <TPAppVersion xmlns="4873beb7-5857-4685-be1f-d57550cc96cc" xsi:nil="true"/>
+    <EditorialStatus xmlns="4873beb7-5857-4685-be1f-d57550cc96cc">Complete</EditorialStatus>
+    <LastModifiedDateTime xmlns="4873beb7-5857-4685-be1f-d57550cc96cc" xsi:nil="true"/>
+    <ScenarioTagsTaxHTField0 xmlns="4873beb7-5857-4685-be1f-d57550cc96cc">
+      <Terms xmlns="http://schemas.microsoft.com/office/infopath/2007/PartnerControls"/>
+    </ScenarioTagsTaxHTField0>
+    <LocProcessedForMarketsLookup xmlns="4873beb7-5857-4685-be1f-d57550cc96cc" xsi:nil="true"/>
+    <TPLaunchHelpLinkType xmlns="4873beb7-5857-4685-be1f-d57550cc96cc">Template</TPLaunchHelpLinkType>
+    <OriginalRelease xmlns="4873beb7-5857-4685-be1f-d57550cc96cc">15</OriginalRelease>
+    <LocalizationTagsTaxHTField0 xmlns="4873beb7-5857-4685-be1f-d57550cc96cc">
+      <Terms xmlns="http://schemas.microsoft.com/office/infopath/2007/PartnerControls"/>
+    </LocalizationTagsTaxHTField0>
+    <UACurrentWords xmlns="4873beb7-5857-4685-be1f-d57550cc96cc" xsi:nil="true"/>
+    <ArtSampleDocs xmlns="4873beb7-5857-4685-be1f-d57550cc96cc" xsi:nil="true"/>
+    <UALocRecommendation xmlns="4873beb7-5857-4685-be1f-d57550cc96cc">Localize</UALocRecommendation>
+    <Manager xmlns="4873beb7-5857-4685-be1f-d57550cc96cc" xsi:nil="true"/>
+    <LocOverallHandbackStatusLookup xmlns="4873beb7-5857-4685-be1f-d57550cc96cc" xsi:nil="true"/>
+    <ShowIn xmlns="4873beb7-5857-4685-be1f-d57550cc96cc">Show everywhere</ShowIn>
+    <UANotes xmlns="4873beb7-5857-4685-be1f-d57550cc96cc" xsi:nil="true"/>
+    <InternalTagsTaxHTField0 xmlns="4873beb7-5857-4685-be1f-d57550cc96cc">
+      <Terms xmlns="http://schemas.microsoft.com/office/infopath/2007/PartnerControls"/>
+    </InternalTagsTaxHTField0>
+    <CSXHash xmlns="4873beb7-5857-4685-be1f-d57550cc96cc" xsi:nil="true"/>
+    <VoteCount xmlns="4873beb7-5857-4685-be1f-d57550cc96cc" xsi:nil="true"/>
+    <AssetExpire xmlns="4873beb7-5857-4685-be1f-d57550cc96cc">2029-05-12T07:00:00+00:00</AssetExpire>
+    <DSATActionTaken xmlns="4873beb7-5857-4685-be1f-d57550cc96cc" xsi:nil="true"/>
+    <CSXSubmissionMarket xmlns="4873beb7-5857-4685-be1f-d57550cc96cc" xsi:nil="true"/>
+    <LocMarketGroupTiers2 xmlns="4873beb7-5857-4685-be1f-d57550cc96cc" xsi:nil="true"/>
+  </documentManagement>
+</p:properties>
+</file>
+
+<file path=customXml/item3.xml><?xml version="1.0" encoding="utf-8"?>
 <ct:contentTypeSchema xmlns:ct="http://schemas.microsoft.com/office/2006/metadata/contentType" xmlns:ma="http://schemas.microsoft.com/office/2006/metadata/properties/metaAttributes" ct:_="" ma:_="" ma:contentTypeName="TemplateFile" ma:contentTypeID="0x0101006EDDDB5EE6D98C44930B742096920B300400F5B6D36B3EF94B4E9A635CDF2A18F5B8" ma:contentTypeVersion="72" ma:contentTypeDescription="Create a new document." ma:contentTypeScope="" ma:versionID="a23e56308344d904b51738559c3d67c9">
   <xsd:schema xmlns:xsd="http://www.w3.org/2001/XMLSchema" xmlns:xs="http://www.w3.org/2001/XMLSchema" xmlns:p="http://schemas.microsoft.com/office/2006/metadata/properties" xmlns:ns2="4873beb7-5857-4685-be1f-d57550cc96cc" targetNamespace="http://schemas.microsoft.com/office/2006/metadata/properties" ma:root="true" ma:fieldsID="cd0908cc4600e77bf5da051303e00c8d" ns2:_="">
     <xsd:import namespace="4873beb7-5857-4685-be1f-d57550cc96cc"/>
@@ -15579,142 +15446,6 @@
 </ct:contentTypeSchema>
 </file>
 
-<file path=customXml/item3.xml><?xml version="1.0" encoding="utf-8"?>
-<p:properties xmlns:p="http://schemas.microsoft.com/office/2006/metadata/properties" xmlns:xsi="http://www.w3.org/2001/XMLSchema-instance" xmlns:pc="http://schemas.microsoft.com/office/infopath/2007/PartnerControls">
-  <documentManagement>
-    <LocPublishedLinkedAssetsLookup xmlns="4873beb7-5857-4685-be1f-d57550cc96cc" xsi:nil="true"/>
-    <ApprovalStatus xmlns="4873beb7-5857-4685-be1f-d57550cc96cc">InProgress</ApprovalStatus>
-    <MarketSpecific xmlns="4873beb7-5857-4685-be1f-d57550cc96cc">false</MarketSpecific>
-    <LocComments xmlns="4873beb7-5857-4685-be1f-d57550cc96cc" xsi:nil="true"/>
-    <LocLastLocAttemptVersionTypeLookup xmlns="4873beb7-5857-4685-be1f-d57550cc96cc" xsi:nil="true"/>
-    <DirectSourceMarket xmlns="4873beb7-5857-4685-be1f-d57550cc96cc" xsi:nil="true"/>
-    <ThumbnailAssetId xmlns="4873beb7-5857-4685-be1f-d57550cc96cc" xsi:nil="true"/>
-    <PrimaryImageGen xmlns="4873beb7-5857-4685-be1f-d57550cc96cc">false</PrimaryImageGen>
-    <LocNewPublishedVersionLookup xmlns="4873beb7-5857-4685-be1f-d57550cc96cc" xsi:nil="true"/>
-    <LegacyData xmlns="4873beb7-5857-4685-be1f-d57550cc96cc" xsi:nil="true"/>
-    <LocRecommendedHandoff xmlns="4873beb7-5857-4685-be1f-d57550cc96cc" xsi:nil="true"/>
-    <BusinessGroup xmlns="4873beb7-5857-4685-be1f-d57550cc96cc" xsi:nil="true"/>
-    <BlockPublish xmlns="4873beb7-5857-4685-be1f-d57550cc96cc">false</BlockPublish>
-    <TPFriendlyName xmlns="4873beb7-5857-4685-be1f-d57550cc96cc" xsi:nil="true"/>
-    <LocOverallPublishStatusLookup xmlns="4873beb7-5857-4685-be1f-d57550cc96cc" xsi:nil="true"/>
-    <NumericId xmlns="4873beb7-5857-4685-be1f-d57550cc96cc" xsi:nil="true"/>
-    <APEditor xmlns="4873beb7-5857-4685-be1f-d57550cc96cc">
-      <UserInfo>
-        <DisplayName/>
-        <AccountId xsi:nil="true"/>
-        <AccountType/>
-      </UserInfo>
-    </APEditor>
-    <SourceTitle xmlns="4873beb7-5857-4685-be1f-d57550cc96cc" xsi:nil="true"/>
-    <OpenTemplate xmlns="4873beb7-5857-4685-be1f-d57550cc96cc">true</OpenTemplate>
-    <LocOverallLocStatusLookup xmlns="4873beb7-5857-4685-be1f-d57550cc96cc" xsi:nil="true"/>
-    <UALocComments xmlns="4873beb7-5857-4685-be1f-d57550cc96cc" xsi:nil="true"/>
-    <ParentAssetId xmlns="4873beb7-5857-4685-be1f-d57550cc96cc" xsi:nil="true"/>
-    <IntlLangReviewDate xmlns="4873beb7-5857-4685-be1f-d57550cc96cc" xsi:nil="true"/>
-    <FeatureTagsTaxHTField0 xmlns="4873beb7-5857-4685-be1f-d57550cc96cc">
-      <Terms xmlns="http://schemas.microsoft.com/office/infopath/2007/PartnerControls"/>
-    </FeatureTagsTaxHTField0>
-    <PublishStatusLookup xmlns="4873beb7-5857-4685-be1f-d57550cc96cc">
-      <Value>1345093</Value>
-    </PublishStatusLookup>
-    <Providers xmlns="4873beb7-5857-4685-be1f-d57550cc96cc" xsi:nil="true"/>
-    <MachineTranslated xmlns="4873beb7-5857-4685-be1f-d57550cc96cc">false</MachineTranslated>
-    <OriginalSourceMarket xmlns="4873beb7-5857-4685-be1f-d57550cc96cc" xsi:nil="true"/>
-    <APDescription xmlns="4873beb7-5857-4685-be1f-d57550cc96cc">This simple template design works for technology and  businesses, but it's versatile enough to use in other contexts.  It features multiple slide layouts designed for widescreen (16x9 resolution) and includes a sample SmartArt list and chart that are easily editable.</APDescription>
-    <ClipArtFilename xmlns="4873beb7-5857-4685-be1f-d57550cc96cc" xsi:nil="true"/>
-    <ContentItem xmlns="4873beb7-5857-4685-be1f-d57550cc96cc" xsi:nil="true"/>
-    <TPInstallLocation xmlns="4873beb7-5857-4685-be1f-d57550cc96cc" xsi:nil="true"/>
-    <PublishTargets xmlns="4873beb7-5857-4685-be1f-d57550cc96cc">OfficeOnlineVNext</PublishTargets>
-    <TimesCloned xmlns="4873beb7-5857-4685-be1f-d57550cc96cc" xsi:nil="true"/>
-    <AssetStart xmlns="4873beb7-5857-4685-be1f-d57550cc96cc">2011-11-26T00:30:00+00:00</AssetStart>
-    <Provider xmlns="4873beb7-5857-4685-be1f-d57550cc96cc" xsi:nil="true"/>
-    <AcquiredFrom xmlns="4873beb7-5857-4685-be1f-d57550cc96cc">Internal MS</AcquiredFrom>
-    <FriendlyTitle xmlns="4873beb7-5857-4685-be1f-d57550cc96cc" xsi:nil="true"/>
-    <LastHandOff xmlns="4873beb7-5857-4685-be1f-d57550cc96cc" xsi:nil="true"/>
-    <TPClientViewer xmlns="4873beb7-5857-4685-be1f-d57550cc96cc" xsi:nil="true"/>
-    <TemplateStatus xmlns="4873beb7-5857-4685-be1f-d57550cc96cc">Complete</TemplateStatus>
-    <Downloads xmlns="4873beb7-5857-4685-be1f-d57550cc96cc">0</Downloads>
-    <OOCacheId xmlns="4873beb7-5857-4685-be1f-d57550cc96cc" xsi:nil="true"/>
-    <IsDeleted xmlns="4873beb7-5857-4685-be1f-d57550cc96cc">false</IsDeleted>
-    <LocPublishedDependentAssetsLookup xmlns="4873beb7-5857-4685-be1f-d57550cc96cc" xsi:nil="true"/>
-    <TPExecutable xmlns="4873beb7-5857-4685-be1f-d57550cc96cc" xsi:nil="true"/>
-    <EditorialTags xmlns="4873beb7-5857-4685-be1f-d57550cc96cc" xsi:nil="true"/>
-    <SubmitterId xmlns="4873beb7-5857-4685-be1f-d57550cc96cc" xsi:nil="true"/>
-    <ApprovalLog xmlns="4873beb7-5857-4685-be1f-d57550cc96cc" xsi:nil="true"/>
-    <AssetType xmlns="4873beb7-5857-4685-be1f-d57550cc96cc">TP</AssetType>
-    <BugNumber xmlns="4873beb7-5857-4685-be1f-d57550cc96cc" xsi:nil="true"/>
-    <CSXSubmissionDate xmlns="4873beb7-5857-4685-be1f-d57550cc96cc" xsi:nil="true"/>
-    <CSXUpdate xmlns="4873beb7-5857-4685-be1f-d57550cc96cc">false</CSXUpdate>
-    <Milestone xmlns="4873beb7-5857-4685-be1f-d57550cc96cc" xsi:nil="true"/>
-    <RecommendationsModifier xmlns="4873beb7-5857-4685-be1f-d57550cc96cc" xsi:nil="true"/>
-    <OriginAsset xmlns="4873beb7-5857-4685-be1f-d57550cc96cc" xsi:nil="true"/>
-    <TPComponent xmlns="4873beb7-5857-4685-be1f-d57550cc96cc" xsi:nil="true"/>
-    <AssetId xmlns="4873beb7-5857-4685-be1f-d57550cc96cc">TP102787989</AssetId>
-    <IntlLocPriority xmlns="4873beb7-5857-4685-be1f-d57550cc96cc" xsi:nil="true"/>
-    <PolicheckWords xmlns="4873beb7-5857-4685-be1f-d57550cc96cc" xsi:nil="true"/>
-    <TPLaunchHelpLink xmlns="4873beb7-5857-4685-be1f-d57550cc96cc" xsi:nil="true"/>
-    <TPApplication xmlns="4873beb7-5857-4685-be1f-d57550cc96cc" xsi:nil="true"/>
-    <CrawlForDependencies xmlns="4873beb7-5857-4685-be1f-d57550cc96cc">false</CrawlForDependencies>
-    <HandoffToMSDN xmlns="4873beb7-5857-4685-be1f-d57550cc96cc" xsi:nil="true"/>
-    <PlannedPubDate xmlns="4873beb7-5857-4685-be1f-d57550cc96cc" xsi:nil="true"/>
-    <IntlLangReviewer xmlns="4873beb7-5857-4685-be1f-d57550cc96cc" xsi:nil="true"/>
-    <TrustLevel xmlns="4873beb7-5857-4685-be1f-d57550cc96cc">1 Microsoft Managed Content</TrustLevel>
-    <LocLastLocAttemptVersionLookup xmlns="4873beb7-5857-4685-be1f-d57550cc96cc">694266</LocLastLocAttemptVersionLookup>
-    <LocProcessedForHandoffsLookup xmlns="4873beb7-5857-4685-be1f-d57550cc96cc" xsi:nil="true"/>
-    <IsSearchable xmlns="4873beb7-5857-4685-be1f-d57550cc96cc">true</IsSearchable>
-    <TemplateTemplateType xmlns="4873beb7-5857-4685-be1f-d57550cc96cc">PowerPoint Presentation Template</TemplateTemplateType>
-    <CampaignTagsTaxHTField0 xmlns="4873beb7-5857-4685-be1f-d57550cc96cc">
-      <Terms xmlns="http://schemas.microsoft.com/office/infopath/2007/PartnerControls"/>
-    </CampaignTagsTaxHTField0>
-    <TPNamespace xmlns="4873beb7-5857-4685-be1f-d57550cc96cc" xsi:nil="true"/>
-    <LocOverallPreviewStatusLookup xmlns="4873beb7-5857-4685-be1f-d57550cc96cc" xsi:nil="true"/>
-    <TaxCatchAll xmlns="4873beb7-5857-4685-be1f-d57550cc96cc"/>
-    <Markets xmlns="4873beb7-5857-4685-be1f-d57550cc96cc"/>
-    <UAProjectedTotalWords xmlns="4873beb7-5857-4685-be1f-d57550cc96cc" xsi:nil="true"/>
-    <IntlLangReview xmlns="4873beb7-5857-4685-be1f-d57550cc96cc" xsi:nil="true"/>
-    <OutputCachingOn xmlns="4873beb7-5857-4685-be1f-d57550cc96cc">false</OutputCachingOn>
-    <AverageRating xmlns="4873beb7-5857-4685-be1f-d57550cc96cc" xsi:nil="true"/>
-    <APAuthor xmlns="4873beb7-5857-4685-be1f-d57550cc96cc">
-      <UserInfo>
-        <DisplayName>REDMOND\kristaa</DisplayName>
-        <AccountId>136</AccountId>
-        <AccountType/>
-      </UserInfo>
-    </APAuthor>
-    <LocManualTestRequired xmlns="4873beb7-5857-4685-be1f-d57550cc96cc">false</LocManualTestRequired>
-    <TPCommandLine xmlns="4873beb7-5857-4685-be1f-d57550cc96cc" xsi:nil="true"/>
-    <TPAppVersion xmlns="4873beb7-5857-4685-be1f-d57550cc96cc" xsi:nil="true"/>
-    <EditorialStatus xmlns="4873beb7-5857-4685-be1f-d57550cc96cc">Complete</EditorialStatus>
-    <LastModifiedDateTime xmlns="4873beb7-5857-4685-be1f-d57550cc96cc" xsi:nil="true"/>
-    <ScenarioTagsTaxHTField0 xmlns="4873beb7-5857-4685-be1f-d57550cc96cc">
-      <Terms xmlns="http://schemas.microsoft.com/office/infopath/2007/PartnerControls"/>
-    </ScenarioTagsTaxHTField0>
-    <LocProcessedForMarketsLookup xmlns="4873beb7-5857-4685-be1f-d57550cc96cc" xsi:nil="true"/>
-    <TPLaunchHelpLinkType xmlns="4873beb7-5857-4685-be1f-d57550cc96cc">Template</TPLaunchHelpLinkType>
-    <OriginalRelease xmlns="4873beb7-5857-4685-be1f-d57550cc96cc">15</OriginalRelease>
-    <LocalizationTagsTaxHTField0 xmlns="4873beb7-5857-4685-be1f-d57550cc96cc">
-      <Terms xmlns="http://schemas.microsoft.com/office/infopath/2007/PartnerControls"/>
-    </LocalizationTagsTaxHTField0>
-    <UACurrentWords xmlns="4873beb7-5857-4685-be1f-d57550cc96cc" xsi:nil="true"/>
-    <ArtSampleDocs xmlns="4873beb7-5857-4685-be1f-d57550cc96cc" xsi:nil="true"/>
-    <UALocRecommendation xmlns="4873beb7-5857-4685-be1f-d57550cc96cc">Localize</UALocRecommendation>
-    <Manager xmlns="4873beb7-5857-4685-be1f-d57550cc96cc" xsi:nil="true"/>
-    <LocOverallHandbackStatusLookup xmlns="4873beb7-5857-4685-be1f-d57550cc96cc" xsi:nil="true"/>
-    <ShowIn xmlns="4873beb7-5857-4685-be1f-d57550cc96cc">Show everywhere</ShowIn>
-    <UANotes xmlns="4873beb7-5857-4685-be1f-d57550cc96cc" xsi:nil="true"/>
-    <InternalTagsTaxHTField0 xmlns="4873beb7-5857-4685-be1f-d57550cc96cc">
-      <Terms xmlns="http://schemas.microsoft.com/office/infopath/2007/PartnerControls"/>
-    </InternalTagsTaxHTField0>
-    <CSXHash xmlns="4873beb7-5857-4685-be1f-d57550cc96cc" xsi:nil="true"/>
-    <VoteCount xmlns="4873beb7-5857-4685-be1f-d57550cc96cc" xsi:nil="true"/>
-    <AssetExpire xmlns="4873beb7-5857-4685-be1f-d57550cc96cc">2029-05-12T07:00:00+00:00</AssetExpire>
-    <DSATActionTaken xmlns="4873beb7-5857-4685-be1f-d57550cc96cc" xsi:nil="true"/>
-    <CSXSubmissionMarket xmlns="4873beb7-5857-4685-be1f-d57550cc96cc" xsi:nil="true"/>
-    <LocMarketGroupTiers2 xmlns="4873beb7-5857-4685-be1f-d57550cc96cc" xsi:nil="true"/>
-  </documentManagement>
-</p:properties>
-</file>
-
 <file path=customXml/itemProps1.xml><?xml version="1.0" encoding="utf-8"?>
 <ds:datastoreItem xmlns:ds="http://schemas.openxmlformats.org/officeDocument/2006/customXml" ds:itemID="{3836F65B-1B07-41EE-A0E8-BC6EF3855225}">
   <ds:schemaRefs>
@@ -15724,6 +15455,22 @@
 </file>
 
 <file path=customXml/itemProps2.xml><?xml version="1.0" encoding="utf-8"?>
+<ds:datastoreItem xmlns:ds="http://schemas.openxmlformats.org/officeDocument/2006/customXml" ds:itemID="{60C67BEE-D13F-4BD2-98A5-34D8A0977F68}">
+  <ds:schemaRefs>
+    <ds:schemaRef ds:uri="http://www.w3.org/XML/1998/namespace"/>
+    <ds:schemaRef ds:uri="http://schemas.microsoft.com/office/infopath/2007/PartnerControls"/>
+    <ds:schemaRef ds:uri="http://purl.org/dc/elements/1.1/"/>
+    <ds:schemaRef ds:uri="http://purl.org/dc/terms/"/>
+    <ds:schemaRef ds:uri="4873beb7-5857-4685-be1f-d57550cc96cc"/>
+    <ds:schemaRef ds:uri="http://schemas.microsoft.com/office/2006/documentManagement/types"/>
+    <ds:schemaRef ds:uri="http://schemas.openxmlformats.org/package/2006/metadata/core-properties"/>
+    <ds:schemaRef ds:uri="http://schemas.microsoft.com/office/2006/metadata/properties"/>
+    <ds:schemaRef ds:uri="http://purl.org/dc/dcmitype/"/>
+  </ds:schemaRefs>
+</ds:datastoreItem>
+</file>
+
+<file path=customXml/itemProps3.xml><?xml version="1.0" encoding="utf-8"?>
 <ds:datastoreItem xmlns:ds="http://schemas.openxmlformats.org/officeDocument/2006/customXml" ds:itemID="{A09BF4D4-EF60-4196-BFC3-9462D607978C}">
   <ds:schemaRefs>
     <ds:schemaRef ds:uri="http://schemas.microsoft.com/office/2006/metadata/contentType"/>
@@ -15739,20 +15486,4 @@
     <ds:schemaRef ds:uri="http://schemas.microsoft.com/internal/obd"/>
   </ds:schemaRefs>
 </ds:datastoreItem>
-</file>
-
-<file path=customXml/itemProps3.xml><?xml version="1.0" encoding="utf-8"?>
-<ds:datastoreItem xmlns:ds="http://schemas.openxmlformats.org/officeDocument/2006/customXml" ds:itemID="{60C67BEE-D13F-4BD2-98A5-34D8A0977F68}">
-  <ds:schemaRefs>
-    <ds:schemaRef ds:uri="http://www.w3.org/XML/1998/namespace"/>
-    <ds:schemaRef ds:uri="http://schemas.microsoft.com/office/infopath/2007/PartnerControls"/>
-    <ds:schemaRef ds:uri="http://purl.org/dc/elements/1.1/"/>
-    <ds:schemaRef ds:uri="http://purl.org/dc/terms/"/>
-    <ds:schemaRef ds:uri="4873beb7-5857-4685-be1f-d57550cc96cc"/>
-    <ds:schemaRef ds:uri="http://schemas.microsoft.com/office/2006/documentManagement/types"/>
-    <ds:schemaRef ds:uri="http://schemas.openxmlformats.org/package/2006/metadata/core-properties"/>
-    <ds:schemaRef ds:uri="http://schemas.microsoft.com/office/2006/metadata/properties"/>
-    <ds:schemaRef ds:uri="http://purl.org/dc/dcmitype/"/>
-  </ds:schemaRefs>
-</ds:datastoreItem>
 </file>
</xml_diff>